<commit_message>
more detailed explanation for labels
</commit_message>
<xml_diff>
--- a/kubernetes/03_labels_and_deployments.pptx
+++ b/kubernetes/03_labels_and_deployments.pptx
@@ -5,21 +5,22 @@
     <p:sldMasterId id="2147483733" r:id="rId1"/>
   </p:sldMasterIdLst>
   <p:notesMasterIdLst>
-    <p:notesMasterId r:id="rId11"/>
+    <p:notesMasterId r:id="rId12"/>
   </p:notesMasterIdLst>
   <p:handoutMasterIdLst>
-    <p:handoutMasterId r:id="rId12"/>
+    <p:handoutMasterId r:id="rId13"/>
   </p:handoutMasterIdLst>
   <p:sldIdLst>
     <p:sldId id="433" r:id="rId2"/>
     <p:sldId id="442" r:id="rId3"/>
-    <p:sldId id="443" r:id="rId4"/>
-    <p:sldId id="444" r:id="rId5"/>
-    <p:sldId id="445" r:id="rId6"/>
-    <p:sldId id="364" r:id="rId7"/>
-    <p:sldId id="440" r:id="rId8"/>
-    <p:sldId id="436" r:id="rId9"/>
-    <p:sldId id="265" r:id="rId10"/>
+    <p:sldId id="446" r:id="rId4"/>
+    <p:sldId id="443" r:id="rId5"/>
+    <p:sldId id="444" r:id="rId6"/>
+    <p:sldId id="445" r:id="rId7"/>
+    <p:sldId id="364" r:id="rId8"/>
+    <p:sldId id="440" r:id="rId9"/>
+    <p:sldId id="436" r:id="rId10"/>
+    <p:sldId id="265" r:id="rId11"/>
   </p:sldIdLst>
   <p:sldSz cx="12195175" cy="6858000"/>
   <p:notesSz cx="6858000" cy="9144000"/>
@@ -542,6 +543,83 @@
       </p:grpSpPr>
       <p:sp>
         <p:nvSpPr>
+          <p:cNvPr id="2" name="Slide Image Placeholder 1"/>
+          <p:cNvSpPr>
+            <a:spLocks noGrp="1" noRot="1" noChangeAspect="1"/>
+          </p:cNvSpPr>
+          <p:nvPr>
+            <p:ph type="sldImg"/>
+          </p:nvPr>
+        </p:nvSpPr>
+        <p:spPr/>
+      </p:sp>
+      <p:sp>
+        <p:nvSpPr>
+          <p:cNvPr id="3" name="Notes Placeholder 2"/>
+          <p:cNvSpPr>
+            <a:spLocks noGrp="1"/>
+          </p:cNvSpPr>
+          <p:nvPr>
+            <p:ph type="body" idx="1"/>
+          </p:nvPr>
+        </p:nvSpPr>
+        <p:spPr/>
+        <p:txBody>
+          <a:bodyPr/>
+          <a:lstStyle/>
+          <a:p>
+            <a:r>
+              <a:rPr lang="en-US" dirty="0"/>
+              <a:t>How labels &amp; selectors work here:</a:t>
+            </a:r>
+          </a:p>
+          <a:p>
+            <a:pPr marL="285750" indent="-285750">
+              <a:buFontTx/>
+              <a:buChar char="-"/>
+            </a:pPr>
+            <a:r>
+              <a:rPr lang="en-US" dirty="0"/>
+              <a:t>Names of pods can change</a:t>
+            </a:r>
+          </a:p>
+          <a:p>
+            <a:pPr marL="285750" indent="-285750">
+              <a:buFontTx/>
+              <a:buChar char="-"/>
+            </a:pPr>
+            <a:r>
+              <a:rPr lang="en-US" dirty="0"/>
+              <a:t>Labels stay</a:t>
+            </a:r>
+            <a:r>
+              <a:rPr lang="en-US" baseline="0" dirty="0"/>
+              <a:t> the same</a:t>
+            </a:r>
+          </a:p>
+          <a:p>
+            <a:pPr marL="285750" indent="-285750">
+              <a:buFontTx/>
+              <a:buChar char="-"/>
+            </a:pPr>
+            <a:r>
+              <a:rPr lang="en-US" baseline="0" dirty="0"/>
+              <a:t>Only with labels pods related to </a:t>
+            </a:r>
+            <a:r>
+              <a:rPr lang="en-US" baseline="0" dirty="0" err="1"/>
+              <a:t>rs</a:t>
+            </a:r>
+            <a:r>
+              <a:rPr lang="en-US" baseline="0" dirty="0"/>
+              <a:t>/deployment can be determined reliably</a:t>
+            </a:r>
+            <a:endParaRPr lang="en-US" dirty="0"/>
+          </a:p>
+        </p:txBody>
+      </p:sp>
+      <p:sp>
+        <p:nvSpPr>
           <p:cNvPr id="4" name="Slide Number Placeholder 3"/>
           <p:cNvSpPr>
             <a:spLocks noGrp="1"/>
@@ -564,48 +642,10 @@
           </a:p>
         </p:txBody>
       </p:sp>
-      <p:sp>
-        <p:nvSpPr>
-          <p:cNvPr id="9" name="Slide Image Placeholder 8"/>
-          <p:cNvSpPr>
-            <a:spLocks noGrp="1" noRot="1" noChangeAspect="1"/>
-          </p:cNvSpPr>
-          <p:nvPr>
-            <p:ph type="sldImg"/>
-          </p:nvPr>
-        </p:nvSpPr>
-        <p:spPr>
-          <a:xfrm>
-            <a:off x="547688" y="612775"/>
-            <a:ext cx="5762625" cy="3241675"/>
-          </a:xfrm>
-        </p:spPr>
-      </p:sp>
-      <p:sp>
-        <p:nvSpPr>
-          <p:cNvPr id="10" name="Notes Placeholder 9"/>
-          <p:cNvSpPr>
-            <a:spLocks noGrp="1"/>
-          </p:cNvSpPr>
-          <p:nvPr>
-            <p:ph type="body" idx="1"/>
-          </p:nvPr>
-        </p:nvSpPr>
-        <p:spPr/>
-        <p:txBody>
-          <a:bodyPr>
-            <a:normAutofit/>
-          </a:bodyPr>
-          <a:lstStyle/>
-          <a:p>
-            <a:endParaRPr lang="en-US"/>
-          </a:p>
-        </p:txBody>
-      </p:sp>
     </p:spTree>
     <p:extLst>
       <p:ext uri="{BB962C8B-B14F-4D97-AF65-F5344CB8AC3E}">
-        <p14:creationId xmlns:p14="http://schemas.microsoft.com/office/powerpoint/2010/main" val="3094605481"/>
+        <p14:creationId xmlns:p14="http://schemas.microsoft.com/office/powerpoint/2010/main" val="2647646029"/>
       </p:ext>
     </p:extLst>
   </p:cSld>
@@ -651,6 +691,98 @@
               <a:rPr lang="de-DE" smtClean="0"/>
               <a:pPr/>
               <a:t>9</a:t>
+            </a:fld>
+            <a:endParaRPr lang="de-DE" dirty="0"/>
+          </a:p>
+        </p:txBody>
+      </p:sp>
+      <p:sp>
+        <p:nvSpPr>
+          <p:cNvPr id="9" name="Slide Image Placeholder 8"/>
+          <p:cNvSpPr>
+            <a:spLocks noGrp="1" noRot="1" noChangeAspect="1"/>
+          </p:cNvSpPr>
+          <p:nvPr>
+            <p:ph type="sldImg"/>
+          </p:nvPr>
+        </p:nvSpPr>
+        <p:spPr>
+          <a:xfrm>
+            <a:off x="547688" y="612775"/>
+            <a:ext cx="5762625" cy="3241675"/>
+          </a:xfrm>
+        </p:spPr>
+      </p:sp>
+      <p:sp>
+        <p:nvSpPr>
+          <p:cNvPr id="10" name="Notes Placeholder 9"/>
+          <p:cNvSpPr>
+            <a:spLocks noGrp="1"/>
+          </p:cNvSpPr>
+          <p:nvPr>
+            <p:ph type="body" idx="1"/>
+          </p:nvPr>
+        </p:nvSpPr>
+        <p:spPr/>
+        <p:txBody>
+          <a:bodyPr>
+            <a:normAutofit/>
+          </a:bodyPr>
+          <a:lstStyle/>
+          <a:p>
+            <a:endParaRPr lang="en-US"/>
+          </a:p>
+        </p:txBody>
+      </p:sp>
+    </p:spTree>
+    <p:extLst>
+      <p:ext uri="{BB962C8B-B14F-4D97-AF65-F5344CB8AC3E}">
+        <p14:creationId xmlns:p14="http://schemas.microsoft.com/office/powerpoint/2010/main" val="3094605481"/>
+      </p:ext>
+    </p:extLst>
+  </p:cSld>
+  <p:clrMapOvr>
+    <a:masterClrMapping/>
+  </p:clrMapOvr>
+</p:notes>
+</file>
+
+<file path=ppt/notesSlides/notesSlide3.xml><?xml version="1.0" encoding="utf-8"?>
+<p:notes xmlns:a="http://schemas.openxmlformats.org/drawingml/2006/main" xmlns:r="http://schemas.openxmlformats.org/officeDocument/2006/relationships" xmlns:p="http://schemas.openxmlformats.org/presentationml/2006/main">
+  <p:cSld>
+    <p:spTree>
+      <p:nvGrpSpPr>
+        <p:cNvPr id="1" name=""/>
+        <p:cNvGrpSpPr/>
+        <p:nvPr/>
+      </p:nvGrpSpPr>
+      <p:grpSpPr>
+        <a:xfrm>
+          <a:off x="0" y="0"/>
+          <a:ext cx="0" cy="0"/>
+          <a:chOff x="0" y="0"/>
+          <a:chExt cx="0" cy="0"/>
+        </a:xfrm>
+      </p:grpSpPr>
+      <p:sp>
+        <p:nvSpPr>
+          <p:cNvPr id="4" name="Slide Number Placeholder 3"/>
+          <p:cNvSpPr>
+            <a:spLocks noGrp="1"/>
+          </p:cNvSpPr>
+          <p:nvPr>
+            <p:ph type="sldNum" sz="quarter" idx="10"/>
+          </p:nvPr>
+        </p:nvSpPr>
+        <p:spPr/>
+        <p:txBody>
+          <a:bodyPr/>
+          <a:lstStyle/>
+          <a:p>
+            <a:fld id="{7D8C2C35-2B8A-446E-BEC0-FD36716C29AC}" type="slidenum">
+              <a:rPr lang="de-DE" smtClean="0"/>
+              <a:pPr/>
+              <a:t>10</a:t>
             </a:fld>
             <a:endParaRPr lang="de-DE" dirty="0"/>
           </a:p>
@@ -8281,6 +8413,32 @@
 </p:sld>
 </file>
 
+<file path=ppt/slides/slide10.xml><?xml version="1.0" encoding="utf-8"?>
+<p:sld xmlns:a="http://schemas.openxmlformats.org/drawingml/2006/main" xmlns:r="http://schemas.openxmlformats.org/officeDocument/2006/relationships" xmlns:p="http://schemas.openxmlformats.org/presentationml/2006/main" show="0">
+  <p:cSld>
+    <p:spTree>
+      <p:nvGrpSpPr>
+        <p:cNvPr id="1" name=""/>
+        <p:cNvGrpSpPr/>
+        <p:nvPr/>
+      </p:nvGrpSpPr>
+      <p:grpSpPr>
+        <a:xfrm>
+          <a:off x="0" y="0"/>
+          <a:ext cx="0" cy="0"/>
+          <a:chOff x="0" y="0"/>
+          <a:chExt cx="0" cy="0"/>
+        </a:xfrm>
+      </p:grpSpPr>
+    </p:spTree>
+  </p:cSld>
+  <p:clrMapOvr>
+    <a:masterClrMapping/>
+  </p:clrMapOvr>
+  <p:transition spd="med"/>
+</p:sld>
+</file>
+
 <file path=ppt/slides/slide2.xml><?xml version="1.0" encoding="utf-8"?>
 <p:sld xmlns:a="http://schemas.openxmlformats.org/drawingml/2006/main" xmlns:r="http://schemas.openxmlformats.org/officeDocument/2006/relationships" xmlns:p="http://schemas.openxmlformats.org/presentationml/2006/main">
   <p:cSld>
@@ -8754,6 +8912,72 @@
       </p:grpSpPr>
       <p:sp>
         <p:nvSpPr>
+          <p:cNvPr id="11" name="Rectangle: Rounded Corners 10"/>
+          <p:cNvSpPr/>
+          <p:nvPr/>
+        </p:nvSpPr>
+        <p:spPr bwMode="gray">
+          <a:xfrm>
+            <a:off x="1313895" y="3231470"/>
+            <a:ext cx="8904303" cy="2476870"/>
+          </a:xfrm>
+          <a:prstGeom prst="roundRect">
+            <a:avLst/>
+          </a:prstGeom>
+          <a:ln>
+            <a:headEnd/>
+            <a:tailEnd/>
+          </a:ln>
+        </p:spPr>
+        <p:style>
+          <a:lnRef idx="2">
+            <a:schemeClr val="accent2"/>
+          </a:lnRef>
+          <a:fillRef idx="1">
+            <a:schemeClr val="lt1"/>
+          </a:fillRef>
+          <a:effectRef idx="0">
+            <a:schemeClr val="accent2"/>
+          </a:effectRef>
+          <a:fontRef idx="minor">
+            <a:schemeClr val="dk1"/>
+          </a:fontRef>
+        </p:style>
+        <p:txBody>
+          <a:bodyPr lIns="90000" tIns="72000" rIns="90000" bIns="72000" rtlCol="0" anchor="ctr"/>
+          <a:lstStyle/>
+          <a:p>
+            <a:pPr marR="0" algn="ctr" defTabSz="914400" eaLnBrk="1" fontAlgn="base" latinLnBrk="0" hangingPunct="1">
+              <a:lnSpc>
+                <a:spcPct val="100000"/>
+              </a:lnSpc>
+              <a:spcBef>
+                <a:spcPct val="50000"/>
+              </a:spcBef>
+              <a:spcAft>
+                <a:spcPct val="0"/>
+              </a:spcAft>
+              <a:buClr>
+                <a:srgbClr val="F0AB00"/>
+              </a:buClr>
+              <a:buSzPct val="80000"/>
+              <a:tabLst/>
+            </a:pPr>
+            <a:endParaRPr kumimoji="0" lang="en-US" sz="1800" b="0" i="0" u="none" strike="noStrike" kern="0" cap="none" spc="0" normalizeH="0" baseline="0" noProof="0" dirty="0" err="1">
+              <a:ln>
+                <a:noFill/>
+              </a:ln>
+              <a:effectLst/>
+              <a:uLnTx/>
+              <a:uFillTx/>
+              <a:ea typeface="Arial Unicode MS" pitchFamily="34" charset="-128"/>
+              <a:cs typeface="Arial Unicode MS" pitchFamily="34" charset="-128"/>
+            </a:endParaRPr>
+          </a:p>
+        </p:txBody>
+      </p:sp>
+      <p:sp>
+        <p:nvSpPr>
           <p:cNvPr id="2" name="Title 1"/>
           <p:cNvSpPr>
             <a:spLocks noGrp="1"/>
@@ -8768,26 +8992,9 @@
           <a:lstStyle/>
           <a:p>
             <a:r>
-              <a:rPr lang="de-DE" dirty="0" err="1"/>
-              <a:t>Using</a:t>
-            </a:r>
-            <a:r>
-              <a:rPr lang="de-DE" dirty="0"/>
-              <a:t> </a:t>
-            </a:r>
-            <a:r>
-              <a:rPr lang="de-DE" dirty="0" err="1"/>
-              <a:t>labels</a:t>
-            </a:r>
-            <a:r>
-              <a:rPr lang="de-DE" dirty="0"/>
-              <a:t> &amp; </a:t>
-            </a:r>
-            <a:r>
-              <a:rPr lang="de-DE" dirty="0" err="1"/>
-              <a:t>selectors</a:t>
-            </a:r>
-            <a:endParaRPr lang="de-DE" dirty="0"/>
+              <a:rPr lang="en-US" dirty="0"/>
+              <a:t>Why do we need labels &amp; selectors?</a:t>
+            </a:r>
           </a:p>
         </p:txBody>
       </p:sp>
@@ -8801,8 +9008,8 @@
         </p:nvSpPr>
         <p:spPr>
           <a:xfrm>
-            <a:off x="504000" y="1124700"/>
-            <a:ext cx="8159939" cy="4727460"/>
+            <a:off x="1640342" y="1497562"/>
+            <a:ext cx="8728777" cy="997063"/>
           </a:xfrm>
           <a:prstGeom prst="rect">
             <a:avLst/>
@@ -8968,114 +9175,1139 @@
             </a:lvl9pPr>
           </a:lstStyle>
           <a:p>
-            <a:pPr lvl="1"/>
-            <a:r>
-              <a:rPr lang="en-US" dirty="0"/>
-              <a:t>With </a:t>
-            </a:r>
-            <a:r>
-              <a:rPr lang="en-US" dirty="0" err="1"/>
-              <a:t>kubectl</a:t>
-            </a:r>
-            <a:r>
-              <a:rPr lang="en-US" dirty="0"/>
-              <a:t>:</a:t>
-            </a:r>
-          </a:p>
-          <a:p>
-            <a:pPr lvl="2"/>
-            <a:r>
-              <a:rPr lang="en-US" dirty="0"/>
-              <a:t>Attach a label to a resource: “</a:t>
-            </a:r>
-            <a:r>
-              <a:rPr lang="en-US" dirty="0" err="1"/>
-              <a:t>kubectl</a:t>
-            </a:r>
-            <a:r>
-              <a:rPr lang="en-US" dirty="0"/>
-              <a:t> label pod </a:t>
-            </a:r>
-            <a:r>
-              <a:rPr lang="en-US" dirty="0" err="1"/>
-              <a:t>mypod</a:t>
-            </a:r>
-            <a:r>
-              <a:rPr lang="en-US" dirty="0"/>
-              <a:t> status=awesome”</a:t>
-            </a:r>
-          </a:p>
-          <a:p>
-            <a:pPr lvl="2"/>
-            <a:r>
-              <a:rPr lang="en-US" dirty="0"/>
-              <a:t>Filter for labels: “</a:t>
-            </a:r>
-            <a:r>
-              <a:rPr lang="en-US" dirty="0" err="1"/>
-              <a:t>kubectl</a:t>
-            </a:r>
-            <a:r>
-              <a:rPr lang="en-US" dirty="0"/>
-              <a:t> get pods –l status=awesome”</a:t>
-            </a:r>
-          </a:p>
-          <a:p>
-            <a:pPr lvl="1"/>
-            <a:endParaRPr lang="en-US" dirty="0"/>
-          </a:p>
-          <a:p>
-            <a:pPr lvl="1"/>
-            <a:r>
-              <a:rPr lang="en-US" dirty="0"/>
-              <a:t>Labels &amp; selectors in resources</a:t>
-            </a:r>
-          </a:p>
-          <a:p>
-            <a:pPr lvl="2"/>
-            <a:r>
-              <a:rPr lang="en-US" dirty="0" err="1"/>
-              <a:t>metadata.labels</a:t>
-            </a:r>
-            <a:r>
-              <a:rPr lang="en-US" dirty="0"/>
+            <a:pPr marL="0" lvl="1" indent="0">
+              <a:buNone/>
+            </a:pPr>
+            <a:r>
+              <a:rPr lang="en-US" b="1" dirty="0"/>
+              <a:t>“In an environment, where names can change and most thing are ephemeral, we need a mechanism to identify a single or a set of objects reliably”</a:t>
+            </a:r>
+          </a:p>
+        </p:txBody>
+      </p:sp>
+      <p:sp>
+        <p:nvSpPr>
+          <p:cNvPr id="4" name="Rectangle 3"/>
+          <p:cNvSpPr/>
+          <p:nvPr/>
+        </p:nvSpPr>
+        <p:spPr bwMode="gray">
+          <a:xfrm>
+            <a:off x="2595087" y="4195241"/>
+            <a:ext cx="1208595" cy="773906"/>
+          </a:xfrm>
+          <a:prstGeom prst="rect">
+            <a:avLst/>
+          </a:prstGeom>
+          <a:ln>
+            <a:headEnd/>
+            <a:tailEnd/>
+          </a:ln>
+        </p:spPr>
+        <p:style>
+          <a:lnRef idx="2">
+            <a:schemeClr val="accent2">
+              <a:shade val="50000"/>
+            </a:schemeClr>
+          </a:lnRef>
+          <a:fillRef idx="1">
+            <a:schemeClr val="accent2"/>
+          </a:fillRef>
+          <a:effectRef idx="0">
+            <a:schemeClr val="accent2"/>
+          </a:effectRef>
+          <a:fontRef idx="minor">
+            <a:schemeClr val="lt1"/>
+          </a:fontRef>
+        </p:style>
+        <p:txBody>
+          <a:bodyPr lIns="90000" tIns="72000" rIns="90000" bIns="72000" rtlCol="0" anchor="ctr"/>
+          <a:lstStyle/>
+          <a:p>
+            <a:pPr marR="0" algn="ctr" defTabSz="914400" eaLnBrk="1" fontAlgn="base" latinLnBrk="0" hangingPunct="1">
+              <a:lnSpc>
+                <a:spcPct val="100000"/>
+              </a:lnSpc>
+              <a:spcBef>
+                <a:spcPct val="50000"/>
+              </a:spcBef>
+              <a:spcAft>
+                <a:spcPct val="0"/>
+              </a:spcAft>
+              <a:buClr>
+                <a:srgbClr val="F0AB00"/>
+              </a:buClr>
+              <a:buSzPct val="80000"/>
+              <a:tabLst/>
+            </a:pPr>
+            <a:r>
+              <a:rPr lang="de-DE" sz="1600" b="1" kern="0" noProof="0" dirty="0" err="1">
+                <a:ea typeface="Arial Unicode MS" pitchFamily="34" charset="-128"/>
+                <a:cs typeface="Arial Unicode MS" pitchFamily="34" charset="-128"/>
+              </a:rPr>
+              <a:t>Pod</a:t>
+            </a:r>
+            <a:r>
+              <a:rPr lang="de-DE" sz="1600" b="1" kern="0" noProof="0" dirty="0">
+                <a:ea typeface="Arial Unicode MS" pitchFamily="34" charset="-128"/>
+                <a:cs typeface="Arial Unicode MS" pitchFamily="34" charset="-128"/>
+              </a:rPr>
+              <a:t>-A</a:t>
+            </a:r>
+            <a:endParaRPr kumimoji="0" lang="de-DE" sz="1600" b="1" i="0" u="none" strike="noStrike" kern="0" cap="none" spc="0" normalizeH="0" baseline="0" noProof="0" dirty="0">
+              <a:ln>
+                <a:noFill/>
+              </a:ln>
+              <a:effectLst/>
+              <a:uLnTx/>
+              <a:uFillTx/>
+              <a:ea typeface="Arial Unicode MS" pitchFamily="34" charset="-128"/>
+              <a:cs typeface="Arial Unicode MS" pitchFamily="34" charset="-128"/>
+            </a:endParaRPr>
+          </a:p>
+        </p:txBody>
+      </p:sp>
+      <p:sp>
+        <p:nvSpPr>
+          <p:cNvPr id="5" name="Rectangle 4"/>
+          <p:cNvSpPr/>
+          <p:nvPr/>
+        </p:nvSpPr>
+        <p:spPr bwMode="gray">
+          <a:xfrm>
+            <a:off x="1576038" y="4012361"/>
+            <a:ext cx="1645920" cy="365760"/>
+          </a:xfrm>
+          <a:prstGeom prst="rect">
+            <a:avLst/>
+          </a:prstGeom>
+          <a:ln>
+            <a:headEnd/>
+            <a:tailEnd/>
+          </a:ln>
+        </p:spPr>
+        <p:style>
+          <a:lnRef idx="2">
+            <a:schemeClr val="accent2"/>
+          </a:lnRef>
+          <a:fillRef idx="1">
+            <a:schemeClr val="lt1"/>
+          </a:fillRef>
+          <a:effectRef idx="0">
+            <a:schemeClr val="accent2"/>
+          </a:effectRef>
+          <a:fontRef idx="minor">
+            <a:schemeClr val="dk1"/>
+          </a:fontRef>
+        </p:style>
+        <p:txBody>
+          <a:bodyPr lIns="90000" tIns="72000" rIns="90000" bIns="72000" rtlCol="0" anchor="ctr"/>
+          <a:lstStyle/>
+          <a:p>
+            <a:pPr marR="0" algn="ctr" defTabSz="914400" eaLnBrk="1" fontAlgn="base" latinLnBrk="0" hangingPunct="1">
+              <a:lnSpc>
+                <a:spcPct val="100000"/>
+              </a:lnSpc>
+              <a:spcBef>
+                <a:spcPct val="50000"/>
+              </a:spcBef>
+              <a:spcAft>
+                <a:spcPct val="0"/>
+              </a:spcAft>
+              <a:buClr>
+                <a:srgbClr val="F0AB00"/>
+              </a:buClr>
+              <a:buSzPct val="80000"/>
+              <a:tabLst/>
+            </a:pPr>
+            <a:r>
+              <a:rPr lang="de-DE" sz="1800" kern="0" dirty="0" err="1">
+                <a:ea typeface="Arial Unicode MS" pitchFamily="34" charset="-128"/>
+                <a:cs typeface="Arial Unicode MS" pitchFamily="34" charset="-128"/>
+              </a:rPr>
+              <a:t>app</a:t>
+            </a:r>
+            <a:r>
+              <a:rPr lang="de-DE" sz="1800" kern="0" dirty="0">
+                <a:ea typeface="Arial Unicode MS" pitchFamily="34" charset="-128"/>
+                <a:cs typeface="Arial Unicode MS" pitchFamily="34" charset="-128"/>
+              </a:rPr>
+              <a:t>: </a:t>
+            </a:r>
+            <a:r>
+              <a:rPr lang="de-DE" sz="1800" kern="0" dirty="0" err="1">
+                <a:ea typeface="Arial Unicode MS" pitchFamily="34" charset="-128"/>
+                <a:cs typeface="Arial Unicode MS" pitchFamily="34" charset="-128"/>
+              </a:rPr>
+              <a:t>nginx</a:t>
+            </a:r>
+            <a:endParaRPr kumimoji="0" lang="de-DE" sz="1800" b="0" i="0" u="none" strike="noStrike" kern="0" cap="none" spc="0" normalizeH="0" baseline="0" noProof="0" dirty="0">
+              <a:ln>
+                <a:noFill/>
+              </a:ln>
+              <a:effectLst/>
+              <a:uLnTx/>
+              <a:uFillTx/>
+              <a:ea typeface="Arial Unicode MS" pitchFamily="34" charset="-128"/>
+              <a:cs typeface="Arial Unicode MS" pitchFamily="34" charset="-128"/>
+            </a:endParaRPr>
+          </a:p>
+        </p:txBody>
+      </p:sp>
+      <p:sp>
+        <p:nvSpPr>
+          <p:cNvPr id="6" name="Rectangle 5"/>
+          <p:cNvSpPr/>
+          <p:nvPr/>
+        </p:nvSpPr>
+        <p:spPr bwMode="gray">
+          <a:xfrm>
+            <a:off x="5400432" y="4195241"/>
+            <a:ext cx="1208595" cy="773906"/>
+          </a:xfrm>
+          <a:prstGeom prst="rect">
+            <a:avLst/>
+          </a:prstGeom>
+          <a:ln>
+            <a:headEnd/>
+            <a:tailEnd/>
+          </a:ln>
+        </p:spPr>
+        <p:style>
+          <a:lnRef idx="2">
+            <a:schemeClr val="accent2">
+              <a:shade val="50000"/>
+            </a:schemeClr>
+          </a:lnRef>
+          <a:fillRef idx="1">
+            <a:schemeClr val="accent2"/>
+          </a:fillRef>
+          <a:effectRef idx="0">
+            <a:schemeClr val="accent2"/>
+          </a:effectRef>
+          <a:fontRef idx="minor">
+            <a:schemeClr val="lt1"/>
+          </a:fontRef>
+        </p:style>
+        <p:txBody>
+          <a:bodyPr lIns="90000" tIns="72000" rIns="90000" bIns="72000" rtlCol="0" anchor="ctr"/>
+          <a:lstStyle/>
+          <a:p>
+            <a:pPr marR="0" algn="ctr" defTabSz="914400" eaLnBrk="1" fontAlgn="base" latinLnBrk="0" hangingPunct="1">
+              <a:lnSpc>
+                <a:spcPct val="100000"/>
+              </a:lnSpc>
+              <a:spcBef>
+                <a:spcPct val="50000"/>
+              </a:spcBef>
+              <a:spcAft>
+                <a:spcPct val="0"/>
+              </a:spcAft>
+              <a:buClr>
+                <a:srgbClr val="F0AB00"/>
+              </a:buClr>
+              <a:buSzPct val="80000"/>
+              <a:tabLst/>
+            </a:pPr>
+            <a:r>
+              <a:rPr lang="de-DE" sz="1600" b="1" kern="0" noProof="0" dirty="0" err="1">
+                <a:ea typeface="Arial Unicode MS" pitchFamily="34" charset="-128"/>
+                <a:cs typeface="Arial Unicode MS" pitchFamily="34" charset="-128"/>
+              </a:rPr>
+              <a:t>Pod</a:t>
+            </a:r>
+            <a:r>
+              <a:rPr lang="de-DE" sz="1600" b="1" kern="0" noProof="0" dirty="0">
+                <a:ea typeface="Arial Unicode MS" pitchFamily="34" charset="-128"/>
+                <a:cs typeface="Arial Unicode MS" pitchFamily="34" charset="-128"/>
+              </a:rPr>
+              <a:t>-B</a:t>
+            </a:r>
+            <a:endParaRPr kumimoji="0" lang="de-DE" sz="1600" b="1" i="0" u="none" strike="noStrike" kern="0" cap="none" spc="0" normalizeH="0" baseline="0" noProof="0" dirty="0">
+              <a:ln>
+                <a:noFill/>
+              </a:ln>
+              <a:effectLst/>
+              <a:uLnTx/>
+              <a:uFillTx/>
+              <a:ea typeface="Arial Unicode MS" pitchFamily="34" charset="-128"/>
+              <a:cs typeface="Arial Unicode MS" pitchFamily="34" charset="-128"/>
+            </a:endParaRPr>
+          </a:p>
+        </p:txBody>
+      </p:sp>
+      <p:sp>
+        <p:nvSpPr>
+          <p:cNvPr id="7" name="Rectangle 6"/>
+          <p:cNvSpPr/>
+          <p:nvPr/>
+        </p:nvSpPr>
+        <p:spPr bwMode="gray">
+          <a:xfrm>
+            <a:off x="4381383" y="4012361"/>
+            <a:ext cx="1645920" cy="365760"/>
+          </a:xfrm>
+          <a:prstGeom prst="rect">
+            <a:avLst/>
+          </a:prstGeom>
+          <a:ln>
+            <a:headEnd/>
+            <a:tailEnd/>
+          </a:ln>
+        </p:spPr>
+        <p:style>
+          <a:lnRef idx="2">
+            <a:schemeClr val="accent2"/>
+          </a:lnRef>
+          <a:fillRef idx="1">
+            <a:schemeClr val="lt1"/>
+          </a:fillRef>
+          <a:effectRef idx="0">
+            <a:schemeClr val="accent2"/>
+          </a:effectRef>
+          <a:fontRef idx="minor">
+            <a:schemeClr val="dk1"/>
+          </a:fontRef>
+        </p:style>
+        <p:txBody>
+          <a:bodyPr lIns="90000" tIns="72000" rIns="90000" bIns="72000" rtlCol="0" anchor="ctr"/>
+          <a:lstStyle/>
+          <a:p>
+            <a:pPr marR="0" algn="ctr" defTabSz="914400" eaLnBrk="1" fontAlgn="base" latinLnBrk="0" hangingPunct="1">
+              <a:lnSpc>
+                <a:spcPct val="100000"/>
+              </a:lnSpc>
+              <a:spcBef>
+                <a:spcPct val="50000"/>
+              </a:spcBef>
+              <a:spcAft>
+                <a:spcPct val="0"/>
+              </a:spcAft>
+              <a:buClr>
+                <a:srgbClr val="F0AB00"/>
+              </a:buClr>
+              <a:buSzPct val="80000"/>
+              <a:tabLst/>
+            </a:pPr>
+            <a:r>
+              <a:rPr lang="de-DE" sz="1800" kern="0" dirty="0" err="1">
+                <a:ea typeface="Arial Unicode MS" pitchFamily="34" charset="-128"/>
+                <a:cs typeface="Arial Unicode MS" pitchFamily="34" charset="-128"/>
+              </a:rPr>
+              <a:t>app</a:t>
+            </a:r>
+            <a:r>
+              <a:rPr lang="de-DE" sz="1800" kern="0" dirty="0">
+                <a:ea typeface="Arial Unicode MS" pitchFamily="34" charset="-128"/>
+                <a:cs typeface="Arial Unicode MS" pitchFamily="34" charset="-128"/>
+              </a:rPr>
+              <a:t>: </a:t>
+            </a:r>
+            <a:r>
+              <a:rPr lang="de-DE" sz="1800" kern="0" dirty="0" err="1">
+                <a:ea typeface="Arial Unicode MS" pitchFamily="34" charset="-128"/>
+                <a:cs typeface="Arial Unicode MS" pitchFamily="34" charset="-128"/>
+              </a:rPr>
+              <a:t>nginx</a:t>
+            </a:r>
+            <a:endParaRPr kumimoji="0" lang="de-DE" sz="1800" b="0" i="0" u="none" strike="noStrike" kern="0" cap="none" spc="0" normalizeH="0" baseline="0" noProof="0" dirty="0">
+              <a:ln>
+                <a:noFill/>
+              </a:ln>
+              <a:effectLst/>
+              <a:uLnTx/>
+              <a:uFillTx/>
+              <a:ea typeface="Arial Unicode MS" pitchFamily="34" charset="-128"/>
+              <a:cs typeface="Arial Unicode MS" pitchFamily="34" charset="-128"/>
+            </a:endParaRPr>
+          </a:p>
+        </p:txBody>
+      </p:sp>
+      <p:sp>
+        <p:nvSpPr>
+          <p:cNvPr id="8" name="Rectangle 7"/>
+          <p:cNvSpPr/>
+          <p:nvPr/>
+        </p:nvSpPr>
+        <p:spPr bwMode="gray">
+          <a:xfrm>
+            <a:off x="8205777" y="4195241"/>
+            <a:ext cx="1208595" cy="773906"/>
+          </a:xfrm>
+          <a:prstGeom prst="rect">
+            <a:avLst/>
+          </a:prstGeom>
+          <a:ln>
+            <a:headEnd/>
+            <a:tailEnd/>
+          </a:ln>
+        </p:spPr>
+        <p:style>
+          <a:lnRef idx="2">
+            <a:schemeClr val="accent2">
+              <a:shade val="50000"/>
+            </a:schemeClr>
+          </a:lnRef>
+          <a:fillRef idx="1">
+            <a:schemeClr val="accent2"/>
+          </a:fillRef>
+          <a:effectRef idx="0">
+            <a:schemeClr val="accent2"/>
+          </a:effectRef>
+          <a:fontRef idx="minor">
+            <a:schemeClr val="lt1"/>
+          </a:fontRef>
+        </p:style>
+        <p:txBody>
+          <a:bodyPr lIns="90000" tIns="72000" rIns="90000" bIns="72000" rtlCol="0" anchor="ctr"/>
+          <a:lstStyle/>
+          <a:p>
+            <a:pPr marR="0" algn="ctr" defTabSz="914400" eaLnBrk="1" fontAlgn="base" latinLnBrk="0" hangingPunct="1">
+              <a:lnSpc>
+                <a:spcPct val="100000"/>
+              </a:lnSpc>
+              <a:spcBef>
+                <a:spcPct val="50000"/>
+              </a:spcBef>
+              <a:spcAft>
+                <a:spcPct val="0"/>
+              </a:spcAft>
+              <a:buClr>
+                <a:srgbClr val="F0AB00"/>
+              </a:buClr>
+              <a:buSzPct val="80000"/>
+              <a:tabLst/>
+            </a:pPr>
+            <a:r>
+              <a:rPr lang="de-DE" sz="1600" b="1" kern="0" noProof="0" dirty="0" err="1">
+                <a:ea typeface="Arial Unicode MS" pitchFamily="34" charset="-128"/>
+                <a:cs typeface="Arial Unicode MS" pitchFamily="34" charset="-128"/>
+              </a:rPr>
+              <a:t>Pod</a:t>
+            </a:r>
+            <a:r>
+              <a:rPr lang="de-DE" sz="1600" b="1" kern="0" noProof="0" dirty="0">
+                <a:ea typeface="Arial Unicode MS" pitchFamily="34" charset="-128"/>
+                <a:cs typeface="Arial Unicode MS" pitchFamily="34" charset="-128"/>
+              </a:rPr>
+              <a:t>-C</a:t>
+            </a:r>
+            <a:endParaRPr kumimoji="0" lang="de-DE" sz="1600" b="1" i="0" u="none" strike="noStrike" kern="0" cap="none" spc="0" normalizeH="0" baseline="0" noProof="0" dirty="0">
+              <a:ln>
+                <a:noFill/>
+              </a:ln>
+              <a:effectLst/>
+              <a:uLnTx/>
+              <a:uFillTx/>
+              <a:ea typeface="Arial Unicode MS" pitchFamily="34" charset="-128"/>
+              <a:cs typeface="Arial Unicode MS" pitchFamily="34" charset="-128"/>
+            </a:endParaRPr>
+          </a:p>
+        </p:txBody>
+      </p:sp>
+      <p:sp>
+        <p:nvSpPr>
+          <p:cNvPr id="9" name="Rectangle 8"/>
+          <p:cNvSpPr/>
+          <p:nvPr/>
+        </p:nvSpPr>
+        <p:spPr bwMode="gray">
+          <a:xfrm>
+            <a:off x="7186728" y="4012361"/>
+            <a:ext cx="1645920" cy="365760"/>
+          </a:xfrm>
+          <a:prstGeom prst="rect">
+            <a:avLst/>
+          </a:prstGeom>
+          <a:ln>
+            <a:headEnd/>
+            <a:tailEnd/>
+          </a:ln>
+        </p:spPr>
+        <p:style>
+          <a:lnRef idx="2">
+            <a:schemeClr val="accent2"/>
+          </a:lnRef>
+          <a:fillRef idx="1">
+            <a:schemeClr val="lt1"/>
+          </a:fillRef>
+          <a:effectRef idx="0">
+            <a:schemeClr val="accent2"/>
+          </a:effectRef>
+          <a:fontRef idx="minor">
+            <a:schemeClr val="dk1"/>
+          </a:fontRef>
+        </p:style>
+        <p:txBody>
+          <a:bodyPr lIns="90000" tIns="72000" rIns="90000" bIns="72000" rtlCol="0" anchor="ctr"/>
+          <a:lstStyle/>
+          <a:p>
+            <a:pPr marR="0" algn="ctr" defTabSz="914400" eaLnBrk="1" fontAlgn="base" latinLnBrk="0" hangingPunct="1">
+              <a:lnSpc>
+                <a:spcPct val="100000"/>
+              </a:lnSpc>
+              <a:spcBef>
+                <a:spcPct val="50000"/>
+              </a:spcBef>
+              <a:spcAft>
+                <a:spcPct val="0"/>
+              </a:spcAft>
+              <a:buClr>
+                <a:srgbClr val="F0AB00"/>
+              </a:buClr>
+              <a:buSzPct val="80000"/>
+              <a:tabLst/>
+            </a:pPr>
+            <a:r>
+              <a:rPr lang="de-DE" sz="1800" kern="0" dirty="0" err="1">
+                <a:ea typeface="Arial Unicode MS" pitchFamily="34" charset="-128"/>
+                <a:cs typeface="Arial Unicode MS" pitchFamily="34" charset="-128"/>
+              </a:rPr>
+              <a:t>app</a:t>
+            </a:r>
+            <a:r>
+              <a:rPr lang="de-DE" sz="1800" kern="0" dirty="0">
+                <a:ea typeface="Arial Unicode MS" pitchFamily="34" charset="-128"/>
+                <a:cs typeface="Arial Unicode MS" pitchFamily="34" charset="-128"/>
+              </a:rPr>
+              <a:t>: </a:t>
+            </a:r>
+            <a:r>
+              <a:rPr lang="de-DE" sz="1800" kern="0" dirty="0" err="1">
+                <a:ea typeface="Arial Unicode MS" pitchFamily="34" charset="-128"/>
+                <a:cs typeface="Arial Unicode MS" pitchFamily="34" charset="-128"/>
+              </a:rPr>
+              <a:t>nginx</a:t>
+            </a:r>
+            <a:endParaRPr kumimoji="0" lang="de-DE" sz="1800" b="0" i="0" u="none" strike="noStrike" kern="0" cap="none" spc="0" normalizeH="0" baseline="0" noProof="0" dirty="0">
+              <a:ln>
+                <a:noFill/>
+              </a:ln>
+              <a:effectLst/>
+              <a:uLnTx/>
+              <a:uFillTx/>
+              <a:ea typeface="Arial Unicode MS" pitchFamily="34" charset="-128"/>
+              <a:cs typeface="Arial Unicode MS" pitchFamily="34" charset="-128"/>
+            </a:endParaRPr>
+          </a:p>
+        </p:txBody>
+      </p:sp>
+      <p:sp>
+        <p:nvSpPr>
+          <p:cNvPr id="10" name="Flowchart: Document 9"/>
+          <p:cNvSpPr/>
+          <p:nvPr/>
+        </p:nvSpPr>
+        <p:spPr bwMode="gray">
+          <a:xfrm>
+            <a:off x="892415" y="3000650"/>
+            <a:ext cx="1506583" cy="766354"/>
+          </a:xfrm>
+          <a:prstGeom prst="flowChartDocument">
+            <a:avLst/>
+          </a:prstGeom>
+          <a:ln>
+            <a:headEnd/>
+            <a:tailEnd/>
+          </a:ln>
+        </p:spPr>
+        <p:style>
+          <a:lnRef idx="2">
+            <a:schemeClr val="accent5"/>
+          </a:lnRef>
+          <a:fillRef idx="1">
+            <a:schemeClr val="lt1"/>
+          </a:fillRef>
+          <a:effectRef idx="0">
+            <a:schemeClr val="accent5"/>
+          </a:effectRef>
+          <a:fontRef idx="minor">
+            <a:schemeClr val="dk1"/>
+          </a:fontRef>
+        </p:style>
+        <p:txBody>
+          <a:bodyPr lIns="90000" tIns="72000" rIns="90000" bIns="72000" rtlCol="0" anchor="ctr"/>
+          <a:lstStyle/>
+          <a:p>
+            <a:pPr algn="ctr" defTabSz="914400" fontAlgn="base">
+              <a:spcBef>
+                <a:spcPct val="50000"/>
+              </a:spcBef>
+              <a:spcAft>
+                <a:spcPct val="0"/>
+              </a:spcAft>
+              <a:buClr>
+                <a:srgbClr val="F0AB00"/>
+              </a:buClr>
+              <a:buSzPct val="80000"/>
+            </a:pPr>
+            <a:r>
+              <a:rPr lang="en-US" sz="1800" kern="0" dirty="0">
+                <a:ea typeface="Arial Unicode MS" pitchFamily="34" charset="-128"/>
+                <a:cs typeface="Arial Unicode MS" pitchFamily="34" charset="-128"/>
+              </a:rPr>
+              <a:t>Selector: </a:t>
+            </a:r>
+            <a:r>
+              <a:rPr lang="en-US" sz="1800" kern="0" dirty="0" err="1">
+                <a:ea typeface="Arial Unicode MS" pitchFamily="34" charset="-128"/>
+                <a:cs typeface="Arial Unicode MS" pitchFamily="34" charset="-128"/>
+              </a:rPr>
+              <a:t>app:nginx</a:t>
+            </a:r>
+            <a:endParaRPr lang="en-US" sz="1800" kern="0" dirty="0">
+              <a:ea typeface="Arial Unicode MS" pitchFamily="34" charset="-128"/>
+              <a:cs typeface="Arial Unicode MS" pitchFamily="34" charset="-128"/>
+            </a:endParaRPr>
+          </a:p>
+        </p:txBody>
+      </p:sp>
+      <p:sp>
+        <p:nvSpPr>
+          <p:cNvPr id="12" name="Rectangle 11"/>
+          <p:cNvSpPr/>
+          <p:nvPr/>
+        </p:nvSpPr>
+        <p:spPr bwMode="gray">
+          <a:xfrm>
+            <a:off x="8201754" y="4195241"/>
+            <a:ext cx="1208595" cy="773906"/>
+          </a:xfrm>
+          <a:prstGeom prst="rect">
+            <a:avLst/>
+          </a:prstGeom>
+          <a:ln>
+            <a:headEnd/>
+            <a:tailEnd/>
+          </a:ln>
+        </p:spPr>
+        <p:style>
+          <a:lnRef idx="2">
+            <a:schemeClr val="accent2">
+              <a:shade val="50000"/>
+            </a:schemeClr>
+          </a:lnRef>
+          <a:fillRef idx="1">
+            <a:schemeClr val="accent2"/>
+          </a:fillRef>
+          <a:effectRef idx="0">
+            <a:schemeClr val="accent2"/>
+          </a:effectRef>
+          <a:fontRef idx="minor">
+            <a:schemeClr val="lt1"/>
+          </a:fontRef>
+        </p:style>
+        <p:txBody>
+          <a:bodyPr lIns="90000" tIns="72000" rIns="90000" bIns="72000" rtlCol="0" anchor="ctr"/>
+          <a:lstStyle/>
+          <a:p>
+            <a:pPr marR="0" algn="ctr" defTabSz="914400" eaLnBrk="1" fontAlgn="base" latinLnBrk="0" hangingPunct="1">
+              <a:lnSpc>
+                <a:spcPct val="100000"/>
+              </a:lnSpc>
+              <a:spcBef>
+                <a:spcPct val="50000"/>
+              </a:spcBef>
+              <a:spcAft>
+                <a:spcPct val="0"/>
+              </a:spcAft>
+              <a:buClr>
+                <a:srgbClr val="F0AB00"/>
+              </a:buClr>
+              <a:buSzPct val="80000"/>
+              <a:tabLst/>
+            </a:pPr>
+            <a:r>
+              <a:rPr lang="de-DE" sz="1600" b="1" kern="0" noProof="0" dirty="0">
+                <a:ea typeface="Arial Unicode MS" pitchFamily="34" charset="-128"/>
+                <a:cs typeface="Arial Unicode MS" pitchFamily="34" charset="-128"/>
+              </a:rPr>
+              <a:t>New-</a:t>
+            </a:r>
+            <a:r>
+              <a:rPr lang="de-DE" sz="1600" b="1" kern="0" noProof="0" dirty="0" err="1">
+                <a:ea typeface="Arial Unicode MS" pitchFamily="34" charset="-128"/>
+                <a:cs typeface="Arial Unicode MS" pitchFamily="34" charset="-128"/>
+              </a:rPr>
+              <a:t>Pod</a:t>
+            </a:r>
+            <a:endParaRPr kumimoji="0" lang="de-DE" sz="1600" b="1" i="0" u="none" strike="noStrike" kern="0" cap="none" spc="0" normalizeH="0" baseline="0" noProof="0" dirty="0">
+              <a:ln>
+                <a:noFill/>
+              </a:ln>
+              <a:effectLst/>
+              <a:uLnTx/>
+              <a:uFillTx/>
+              <a:ea typeface="Arial Unicode MS" pitchFamily="34" charset="-128"/>
+              <a:cs typeface="Arial Unicode MS" pitchFamily="34" charset="-128"/>
+            </a:endParaRPr>
+          </a:p>
+        </p:txBody>
+      </p:sp>
+    </p:spTree>
+    <p:extLst>
+      <p:ext uri="{BB962C8B-B14F-4D97-AF65-F5344CB8AC3E}">
+        <p14:creationId xmlns:p14="http://schemas.microsoft.com/office/powerpoint/2010/main" val="597418374"/>
+      </p:ext>
+    </p:extLst>
+  </p:cSld>
+  <p:clrMapOvr>
+    <a:masterClrMapping/>
+  </p:clrMapOvr>
+  <p:timing>
+    <p:tnLst>
+      <p:par>
+        <p:cTn id="1" dur="indefinite" restart="never" nodeType="tmRoot">
+          <p:childTnLst>
+            <p:seq concurrent="1" nextAc="seek">
+              <p:cTn id="2" dur="indefinite" nodeType="mainSeq">
+                <p:childTnLst>
+                  <p:par>
+                    <p:cTn id="3" fill="hold">
+                      <p:stCondLst>
+                        <p:cond delay="indefinite"/>
+                      </p:stCondLst>
+                      <p:childTnLst>
+                        <p:par>
+                          <p:cTn id="4" fill="hold">
+                            <p:stCondLst>
+                              <p:cond delay="0"/>
+                            </p:stCondLst>
+                            <p:childTnLst>
+                              <p:par>
+                                <p:cTn id="5" presetID="1" presetClass="entr" presetSubtype="0" fill="hold" grpId="0" nodeType="clickEffect">
+                                  <p:stCondLst>
+                                    <p:cond delay="0"/>
+                                  </p:stCondLst>
+                                  <p:childTnLst>
+                                    <p:set>
+                                      <p:cBhvr>
+                                        <p:cTn id="6" dur="1" fill="hold">
+                                          <p:stCondLst>
+                                            <p:cond delay="0"/>
+                                          </p:stCondLst>
+                                        </p:cTn>
+                                        <p:tgtEl>
+                                          <p:spTgt spid="12"/>
+                                        </p:tgtEl>
+                                        <p:attrNameLst>
+                                          <p:attrName>style.visibility</p:attrName>
+                                        </p:attrNameLst>
+                                      </p:cBhvr>
+                                      <p:to>
+                                        <p:strVal val="visible"/>
+                                      </p:to>
+                                    </p:set>
+                                  </p:childTnLst>
+                                </p:cTn>
+                              </p:par>
+                            </p:childTnLst>
+                          </p:cTn>
+                        </p:par>
+                      </p:childTnLst>
+                    </p:cTn>
+                  </p:par>
+                </p:childTnLst>
+              </p:cTn>
+              <p:prevCondLst>
+                <p:cond evt="onPrev" delay="0">
+                  <p:tgtEl>
+                    <p:sldTgt/>
+                  </p:tgtEl>
+                </p:cond>
+              </p:prevCondLst>
+              <p:nextCondLst>
+                <p:cond evt="onNext" delay="0">
+                  <p:tgtEl>
+                    <p:sldTgt/>
+                  </p:tgtEl>
+                </p:cond>
+              </p:nextCondLst>
+            </p:seq>
+          </p:childTnLst>
+        </p:cTn>
+      </p:par>
+    </p:tnLst>
+    <p:bldLst>
+      <p:bldP spid="12" grpId="0" animBg="1"/>
+    </p:bldLst>
+  </p:timing>
+</p:sld>
+</file>
+
+<file path=ppt/slides/slide4.xml><?xml version="1.0" encoding="utf-8"?>
+<p:sld xmlns:a="http://schemas.openxmlformats.org/drawingml/2006/main" xmlns:r="http://schemas.openxmlformats.org/officeDocument/2006/relationships" xmlns:p="http://schemas.openxmlformats.org/presentationml/2006/main">
+  <p:cSld>
+    <p:spTree>
+      <p:nvGrpSpPr>
+        <p:cNvPr id="1" name=""/>
+        <p:cNvGrpSpPr/>
+        <p:nvPr/>
+      </p:nvGrpSpPr>
+      <p:grpSpPr>
+        <a:xfrm>
+          <a:off x="0" y="0"/>
+          <a:ext cx="0" cy="0"/>
+          <a:chOff x="0" y="0"/>
+          <a:chExt cx="0" cy="0"/>
+        </a:xfrm>
+      </p:grpSpPr>
+      <p:sp>
+        <p:nvSpPr>
+          <p:cNvPr id="2" name="Title 1"/>
+          <p:cNvSpPr>
+            <a:spLocks noGrp="1"/>
+          </p:cNvSpPr>
+          <p:nvPr>
+            <p:ph type="title"/>
+          </p:nvPr>
+        </p:nvSpPr>
+        <p:spPr/>
+        <p:txBody>
+          <a:bodyPr/>
+          <a:lstStyle/>
+          <a:p>
+            <a:r>
+              <a:rPr lang="de-DE" dirty="0" err="1"/>
+              <a:t>Using</a:t>
+            </a:r>
+            <a:r>
+              <a:rPr lang="de-DE" dirty="0"/>
               <a:t> </a:t>
             </a:r>
-          </a:p>
-          <a:p>
-            <a:pPr lvl="2"/>
-            <a:r>
-              <a:rPr lang="en-US" dirty="0"/>
-              <a:t>selector</a:t>
-            </a:r>
-          </a:p>
-          <a:p>
-            <a:pPr lvl="2"/>
-            <a:r>
-              <a:rPr lang="en-US" dirty="0" err="1"/>
-              <a:t>selector.matchLabel</a:t>
-            </a:r>
-            <a:r>
-              <a:rPr lang="en-US" dirty="0"/>
-              <a:t> / </a:t>
-            </a:r>
-            <a:r>
-              <a:rPr lang="en-US" dirty="0" err="1"/>
-              <a:t>selector.matchExpression</a:t>
-            </a:r>
-            <a:endParaRPr lang="en-US" dirty="0"/>
-          </a:p>
+            <a:r>
+              <a:rPr lang="de-DE" dirty="0" err="1"/>
+              <a:t>labels</a:t>
+            </a:r>
+            <a:r>
+              <a:rPr lang="de-DE" dirty="0"/>
+              <a:t> &amp; </a:t>
+            </a:r>
+            <a:r>
+              <a:rPr lang="de-DE" dirty="0" err="1"/>
+              <a:t>selectors</a:t>
+            </a:r>
+            <a:endParaRPr lang="de-DE" dirty="0"/>
+          </a:p>
+        </p:txBody>
+      </p:sp>
+      <p:sp>
+        <p:nvSpPr>
+          <p:cNvPr id="3" name="Text Placeholder 2"/>
+          <p:cNvSpPr txBox="1">
+            <a:spLocks/>
+          </p:cNvSpPr>
+          <p:nvPr/>
+        </p:nvSpPr>
+        <p:spPr>
+          <a:xfrm>
+            <a:off x="504000" y="1124700"/>
+            <a:ext cx="8159939" cy="4727460"/>
+          </a:xfrm>
+          <a:prstGeom prst="rect">
+            <a:avLst/>
+          </a:prstGeom>
+        </p:spPr>
+        <p:txBody>
+          <a:bodyPr/>
+          <a:lstStyle>
+            <a:lvl1pPr marL="0" indent="0" algn="l" defTabSz="1088558" rtl="0" eaLnBrk="1" latinLnBrk="0" hangingPunct="1">
+              <a:spcBef>
+                <a:spcPts val="1800"/>
+              </a:spcBef>
+              <a:buClr>
+                <a:schemeClr val="accent1"/>
+              </a:buClr>
+              <a:buSzPct val="80000"/>
+              <a:buFontTx/>
+              <a:buNone/>
+              <a:defRPr sz="2000" b="0" kern="1200">
+                <a:solidFill>
+                  <a:schemeClr val="tx1"/>
+                </a:solidFill>
+                <a:latin typeface="+mn-lt"/>
+                <a:ea typeface="+mn-ea"/>
+                <a:cs typeface="+mn-cs"/>
+              </a:defRPr>
+            </a:lvl1pPr>
+            <a:lvl2pPr marL="179964" indent="-179964" algn="l" defTabSz="1088558" rtl="0" eaLnBrk="1" latinLnBrk="0" hangingPunct="1">
+              <a:spcBef>
+                <a:spcPts val="600"/>
+              </a:spcBef>
+              <a:buClr>
+                <a:schemeClr val="accent1"/>
+              </a:buClr>
+              <a:buSzPct val="100000"/>
+              <a:buFont typeface="Wingdings" pitchFamily="2" charset="2"/>
+              <a:buChar char="§"/>
+              <a:defRPr sz="1800" kern="1200">
+                <a:solidFill>
+                  <a:schemeClr val="tx1"/>
+                </a:solidFill>
+                <a:latin typeface="+mn-lt"/>
+                <a:ea typeface="+mn-ea"/>
+                <a:cs typeface="+mn-cs"/>
+              </a:defRPr>
+            </a:lvl2pPr>
+            <a:lvl3pPr marL="358775" indent="-179388" algn="l" defTabSz="1088558" rtl="0" eaLnBrk="1" latinLnBrk="0" hangingPunct="1">
+              <a:spcBef>
+                <a:spcPts val="300"/>
+              </a:spcBef>
+              <a:buClr>
+                <a:schemeClr val="tx1"/>
+              </a:buClr>
+              <a:buSzPct val="100000"/>
+              <a:buFont typeface="Arial" panose="020B0604020202020204" pitchFamily="34" charset="0"/>
+              <a:buChar char="–"/>
+              <a:defRPr lang="en-US" sz="1800" kern="1200" noProof="0" dirty="0" smtClean="0">
+                <a:solidFill>
+                  <a:schemeClr val="tx1"/>
+                </a:solidFill>
+                <a:latin typeface="+mn-lt"/>
+                <a:ea typeface="+mn-ea"/>
+                <a:cs typeface="+mn-cs"/>
+              </a:defRPr>
+            </a:lvl3pPr>
+            <a:lvl4pPr marL="539892" indent="-179964" algn="l" defTabSz="1088558" rtl="0" eaLnBrk="1" latinLnBrk="0" hangingPunct="1">
+              <a:spcBef>
+                <a:spcPts val="300"/>
+              </a:spcBef>
+              <a:buClr>
+                <a:schemeClr val="tx1"/>
+              </a:buClr>
+              <a:buSzPct val="120000"/>
+              <a:buFont typeface="Arial" pitchFamily="34" charset="0"/>
+              <a:buChar char="▫"/>
+              <a:defRPr sz="1600" kern="1200">
+                <a:solidFill>
+                  <a:schemeClr val="tx1"/>
+                </a:solidFill>
+                <a:latin typeface="+mn-lt"/>
+                <a:ea typeface="+mn-ea"/>
+                <a:cs typeface="+mn-cs"/>
+              </a:defRPr>
+            </a:lvl4pPr>
+            <a:lvl5pPr marL="719856" indent="-179964" algn="l" defTabSz="1088558" rtl="0" eaLnBrk="1" latinLnBrk="0" hangingPunct="1">
+              <a:spcBef>
+                <a:spcPts val="100"/>
+              </a:spcBef>
+              <a:buClr>
+                <a:schemeClr val="tx1"/>
+              </a:buClr>
+              <a:buSzPct val="100000"/>
+              <a:buFont typeface="Symbol" panose="05050102010706020507" pitchFamily="18" charset="2"/>
+              <a:buChar char="-"/>
+              <a:defRPr sz="1400" kern="1200" baseline="0">
+                <a:solidFill>
+                  <a:schemeClr val="tx1"/>
+                </a:solidFill>
+                <a:latin typeface="+mn-lt"/>
+                <a:ea typeface="+mn-ea"/>
+                <a:cs typeface="+mn-cs"/>
+              </a:defRPr>
+            </a:lvl5pPr>
+            <a:lvl6pPr marL="2993535" indent="-272140" algn="l" defTabSz="1088558" rtl="0" eaLnBrk="1" latinLnBrk="0" hangingPunct="1">
+              <a:spcBef>
+                <a:spcPct val="20000"/>
+              </a:spcBef>
+              <a:buFont typeface="Arial" pitchFamily="34" charset="0"/>
+              <a:buChar char="•"/>
+              <a:defRPr sz="2400" kern="1200">
+                <a:solidFill>
+                  <a:schemeClr val="tx1"/>
+                </a:solidFill>
+                <a:latin typeface="+mn-lt"/>
+                <a:ea typeface="+mn-ea"/>
+                <a:cs typeface="+mn-cs"/>
+              </a:defRPr>
+            </a:lvl6pPr>
+            <a:lvl7pPr marL="3537814" indent="-272140" algn="l" defTabSz="1088558" rtl="0" eaLnBrk="1" latinLnBrk="0" hangingPunct="1">
+              <a:spcBef>
+                <a:spcPct val="20000"/>
+              </a:spcBef>
+              <a:buFont typeface="Arial" pitchFamily="34" charset="0"/>
+              <a:buChar char="•"/>
+              <a:defRPr sz="2400" kern="1200">
+                <a:solidFill>
+                  <a:schemeClr val="tx1"/>
+                </a:solidFill>
+                <a:latin typeface="+mn-lt"/>
+                <a:ea typeface="+mn-ea"/>
+                <a:cs typeface="+mn-cs"/>
+              </a:defRPr>
+            </a:lvl7pPr>
+            <a:lvl8pPr marL="4082093" indent="-272140" algn="l" defTabSz="1088558" rtl="0" eaLnBrk="1" latinLnBrk="0" hangingPunct="1">
+              <a:spcBef>
+                <a:spcPct val="20000"/>
+              </a:spcBef>
+              <a:buFont typeface="Arial" pitchFamily="34" charset="0"/>
+              <a:buChar char="•"/>
+              <a:defRPr sz="2400" kern="1200">
+                <a:solidFill>
+                  <a:schemeClr val="tx1"/>
+                </a:solidFill>
+                <a:latin typeface="+mn-lt"/>
+                <a:ea typeface="+mn-ea"/>
+                <a:cs typeface="+mn-cs"/>
+              </a:defRPr>
+            </a:lvl8pPr>
+            <a:lvl9pPr marL="4626373" indent="-272140" algn="l" defTabSz="1088558" rtl="0" eaLnBrk="1" latinLnBrk="0" hangingPunct="1">
+              <a:spcBef>
+                <a:spcPct val="20000"/>
+              </a:spcBef>
+              <a:buFont typeface="Arial" pitchFamily="34" charset="0"/>
+              <a:buChar char="•"/>
+              <a:defRPr sz="2400" kern="1200">
+                <a:solidFill>
+                  <a:schemeClr val="tx1"/>
+                </a:solidFill>
+                <a:latin typeface="+mn-lt"/>
+                <a:ea typeface="+mn-ea"/>
+                <a:cs typeface="+mn-cs"/>
+              </a:defRPr>
+            </a:lvl9pPr>
+          </a:lstStyle>
           <a:p>
             <a:pPr marL="0" lvl="1" indent="0">
               <a:buNone/>
             </a:pPr>
             <a:endParaRPr lang="en-US" dirty="0"/>
           </a:p>
+          <a:p>
+            <a:pPr lvl="1"/>
+            <a:r>
+              <a:rPr lang="en-US" dirty="0"/>
+              <a:t>Labels &amp; selectors in resources</a:t>
+            </a:r>
+          </a:p>
+          <a:p>
+            <a:pPr lvl="2"/>
+            <a:r>
+              <a:rPr lang="en-US" dirty="0" err="1"/>
+              <a:t>metadata.labels</a:t>
+            </a:r>
+            <a:r>
+              <a:rPr lang="en-US" dirty="0"/>
+              <a:t> </a:t>
+            </a:r>
+          </a:p>
+          <a:p>
+            <a:pPr lvl="2"/>
+            <a:r>
+              <a:rPr lang="en-US" dirty="0"/>
+              <a:t>selector</a:t>
+            </a:r>
+          </a:p>
+          <a:p>
+            <a:pPr lvl="2"/>
+            <a:r>
+              <a:rPr lang="en-US" dirty="0" err="1"/>
+              <a:t>selector.matchLabel</a:t>
+            </a:r>
+            <a:r>
+              <a:rPr lang="en-US" dirty="0"/>
+              <a:t> / </a:t>
+            </a:r>
+            <a:r>
+              <a:rPr lang="en-US" dirty="0" err="1"/>
+              <a:t>selector.matchExpression</a:t>
+            </a:r>
+            <a:endParaRPr lang="en-US" dirty="0"/>
+          </a:p>
+          <a:p>
+            <a:pPr lvl="2"/>
+            <a:endParaRPr lang="en-US" dirty="0"/>
+          </a:p>
+          <a:p>
+            <a:pPr lvl="2"/>
+            <a:endParaRPr lang="en-US" dirty="0"/>
+          </a:p>
+          <a:p>
+            <a:pPr lvl="2"/>
+            <a:endParaRPr lang="en-US" dirty="0"/>
+          </a:p>
+          <a:p>
+            <a:pPr lvl="2"/>
+            <a:endParaRPr lang="en-US" dirty="0"/>
+          </a:p>
+          <a:p>
+            <a:pPr lvl="2"/>
+            <a:endParaRPr lang="en-US" dirty="0"/>
+          </a:p>
+          <a:p>
+            <a:pPr marL="179387" lvl="2" indent="0">
+              <a:buNone/>
+            </a:pPr>
+            <a:endParaRPr lang="en-US" dirty="0"/>
+          </a:p>
+          <a:p>
+            <a:pPr lvl="1"/>
+            <a:r>
+              <a:rPr lang="en-US" dirty="0"/>
+              <a:t>With </a:t>
+            </a:r>
+            <a:r>
+              <a:rPr lang="en-US" dirty="0" err="1"/>
+              <a:t>kubectl</a:t>
+            </a:r>
+            <a:r>
+              <a:rPr lang="en-US" dirty="0"/>
+              <a:t>:</a:t>
+            </a:r>
+          </a:p>
+          <a:p>
+            <a:pPr lvl="2"/>
+            <a:r>
+              <a:rPr lang="en-US" dirty="0"/>
+              <a:t>Attach a label to a resource: “</a:t>
+            </a:r>
+            <a:r>
+              <a:rPr lang="en-US" dirty="0" err="1"/>
+              <a:t>kubectl</a:t>
+            </a:r>
+            <a:r>
+              <a:rPr lang="en-US" dirty="0"/>
+              <a:t> label pod </a:t>
+            </a:r>
+            <a:r>
+              <a:rPr lang="en-US" dirty="0" err="1"/>
+              <a:t>mypod</a:t>
+            </a:r>
+            <a:r>
+              <a:rPr lang="en-US" dirty="0"/>
+              <a:t> status=awesome”</a:t>
+            </a:r>
+          </a:p>
+          <a:p>
+            <a:pPr lvl="2"/>
+            <a:r>
+              <a:rPr lang="en-US" dirty="0"/>
+              <a:t>Filter for labels: “</a:t>
+            </a:r>
+            <a:r>
+              <a:rPr lang="en-US" dirty="0" err="1"/>
+              <a:t>kubectl</a:t>
+            </a:r>
+            <a:r>
+              <a:rPr lang="en-US" dirty="0"/>
+              <a:t> get pods –l status=awesome”</a:t>
+            </a:r>
+          </a:p>
+          <a:p>
+            <a:pPr lvl="2"/>
+            <a:endParaRPr lang="en-US" dirty="0"/>
+          </a:p>
+          <a:p>
+            <a:pPr marL="0" lvl="1" indent="0">
+              <a:buNone/>
+            </a:pPr>
+            <a:endParaRPr lang="en-US" dirty="0"/>
+          </a:p>
         </p:txBody>
       </p:sp>
       <p:pic>
         <p:nvPicPr>
-          <p:cNvPr id="4" name="Picture 3"/>
+          <p:cNvPr id="6" name="Picture 5"/>
           <p:cNvPicPr>
             <a:picLocks noChangeAspect="1"/>
           </p:cNvPicPr>
@@ -9089,31 +10321,7 @@
         </p:blipFill>
         <p:spPr>
           <a:xfrm>
-            <a:off x="897869" y="4240819"/>
-            <a:ext cx="1847619" cy="571429"/>
-          </a:xfrm>
-          <a:prstGeom prst="rect">
-            <a:avLst/>
-          </a:prstGeom>
-        </p:spPr>
-      </p:pic>
-      <p:pic>
-        <p:nvPicPr>
-          <p:cNvPr id="6" name="Picture 5"/>
-          <p:cNvPicPr>
-            <a:picLocks noChangeAspect="1"/>
-          </p:cNvPicPr>
-          <p:nvPr/>
-        </p:nvPicPr>
-        <p:blipFill>
-          <a:blip r:embed="rId3"/>
-          <a:stretch>
-            <a:fillRect/>
-          </a:stretch>
-        </p:blipFill>
-        <p:spPr>
-          <a:xfrm>
-            <a:off x="3342809" y="3874152"/>
+            <a:off x="747276" y="3136512"/>
             <a:ext cx="4723809" cy="1304762"/>
           </a:xfrm>
           <a:prstGeom prst="rect">
@@ -9134,7 +10342,7 @@
 </p:sld>
 </file>
 
-<file path=ppt/slides/slide4.xml><?xml version="1.0" encoding="utf-8"?>
+<file path=ppt/slides/slide5.xml><?xml version="1.0" encoding="utf-8"?>
 <p:sld xmlns:a="http://schemas.openxmlformats.org/drawingml/2006/main" xmlns:r="http://schemas.openxmlformats.org/officeDocument/2006/relationships" xmlns:p="http://schemas.openxmlformats.org/presentationml/2006/main">
   <p:cSld>
     <p:spTree>
@@ -9186,7 +10394,7 @@
 </p:sld>
 </file>
 
-<file path=ppt/slides/slide5.xml><?xml version="1.0" encoding="utf-8"?>
+<file path=ppt/slides/slide6.xml><?xml version="1.0" encoding="utf-8"?>
 <p:sld xmlns:a="http://schemas.openxmlformats.org/drawingml/2006/main" xmlns:r="http://schemas.openxmlformats.org/officeDocument/2006/relationships" xmlns:p="http://schemas.openxmlformats.org/presentationml/2006/main" show="0">
   <p:cSld>
     <p:spTree>
@@ -9284,7 +10492,7 @@
 </p:sld>
 </file>
 
-<file path=ppt/slides/slide6.xml><?xml version="1.0" encoding="utf-8"?>
+<file path=ppt/slides/slide7.xml><?xml version="1.0" encoding="utf-8"?>
 <p:sld xmlns:a="http://schemas.openxmlformats.org/drawingml/2006/main" xmlns:r="http://schemas.openxmlformats.org/officeDocument/2006/relationships" xmlns:p="http://schemas.openxmlformats.org/presentationml/2006/main">
   <p:cSld>
     <p:spTree>
@@ -11042,7 +12250,7 @@
 </p:sld>
 </file>
 
-<file path=ppt/slides/slide7.xml><?xml version="1.0" encoding="utf-8"?>
+<file path=ppt/slides/slide8.xml><?xml version="1.0" encoding="utf-8"?>
 <p:sld xmlns:a="http://schemas.openxmlformats.org/drawingml/2006/main" xmlns:r="http://schemas.openxmlformats.org/officeDocument/2006/relationships" xmlns:p="http://schemas.openxmlformats.org/presentationml/2006/main">
   <p:cSld>
     <p:spTree>
@@ -12204,7 +13412,7 @@
 </p:sld>
 </file>
 
-<file path=ppt/slides/slide8.xml><?xml version="1.0" encoding="utf-8"?>
+<file path=ppt/slides/slide9.xml><?xml version="1.0" encoding="utf-8"?>
 <p:sld xmlns:a="http://schemas.openxmlformats.org/drawingml/2006/main" xmlns:r="http://schemas.openxmlformats.org/officeDocument/2006/relationships" xmlns:p="http://schemas.openxmlformats.org/presentationml/2006/main">
   <p:cSld>
     <p:spTree>
@@ -12233,8 +13441,8 @@
         </p:nvSpPr>
         <p:spPr>
           <a:xfrm>
-            <a:off x="504000" y="1124700"/>
-            <a:ext cx="8159939" cy="4727460"/>
+            <a:off x="504001" y="1124700"/>
+            <a:ext cx="6506400" cy="4727460"/>
           </a:xfrm>
         </p:spPr>
         <p:txBody>
@@ -12347,6 +13555,141 @@
           </a:p>
         </p:txBody>
       </p:sp>
+      <p:pic>
+        <p:nvPicPr>
+          <p:cNvPr id="4" name="Picture 3"/>
+          <p:cNvPicPr>
+            <a:picLocks noChangeAspect="1"/>
+          </p:cNvPicPr>
+          <p:nvPr/>
+        </p:nvPicPr>
+        <p:blipFill>
+          <a:blip r:embed="rId3"/>
+          <a:stretch>
+            <a:fillRect/>
+          </a:stretch>
+        </p:blipFill>
+        <p:spPr>
+          <a:xfrm>
+            <a:off x="7986841" y="842636"/>
+            <a:ext cx="2961905" cy="5009524"/>
+          </a:xfrm>
+          <a:prstGeom prst="rect">
+            <a:avLst/>
+          </a:prstGeom>
+        </p:spPr>
+      </p:pic>
+      <p:cxnSp>
+        <p:nvCxnSpPr>
+          <p:cNvPr id="5" name="Straight Arrow Connector 4"/>
+          <p:cNvCxnSpPr/>
+          <p:nvPr/>
+        </p:nvCxnSpPr>
+        <p:spPr>
+          <a:xfrm flipH="1">
+            <a:off x="9662160" y="1937698"/>
+            <a:ext cx="1059180" cy="7620"/>
+          </a:xfrm>
+          <a:prstGeom prst="straightConnector1">
+            <a:avLst/>
+          </a:prstGeom>
+          <a:ln w="57150">
+            <a:solidFill>
+              <a:schemeClr val="accent5"/>
+            </a:solidFill>
+            <a:headEnd type="none" w="med" len="med"/>
+            <a:tailEnd type="triangle"/>
+          </a:ln>
+        </p:spPr>
+        <p:style>
+          <a:lnRef idx="1">
+            <a:schemeClr val="accent2"/>
+          </a:lnRef>
+          <a:fillRef idx="0">
+            <a:schemeClr val="accent2"/>
+          </a:fillRef>
+          <a:effectRef idx="0">
+            <a:schemeClr val="accent2"/>
+          </a:effectRef>
+          <a:fontRef idx="minor">
+            <a:schemeClr val="tx1"/>
+          </a:fontRef>
+        </p:style>
+      </p:cxnSp>
+      <p:cxnSp>
+        <p:nvCxnSpPr>
+          <p:cNvPr id="6" name="Straight Arrow Connector 5"/>
+          <p:cNvCxnSpPr/>
+          <p:nvPr/>
+        </p:nvCxnSpPr>
+        <p:spPr>
+          <a:xfrm flipH="1">
+            <a:off x="9889566" y="3248338"/>
+            <a:ext cx="1059180" cy="7620"/>
+          </a:xfrm>
+          <a:prstGeom prst="straightConnector1">
+            <a:avLst/>
+          </a:prstGeom>
+          <a:ln w="57150">
+            <a:solidFill>
+              <a:schemeClr val="accent5"/>
+            </a:solidFill>
+            <a:headEnd type="none" w="med" len="med"/>
+            <a:tailEnd type="triangle"/>
+          </a:ln>
+        </p:spPr>
+        <p:style>
+          <a:lnRef idx="1">
+            <a:schemeClr val="accent2"/>
+          </a:lnRef>
+          <a:fillRef idx="0">
+            <a:schemeClr val="accent2"/>
+          </a:fillRef>
+          <a:effectRef idx="0">
+            <a:schemeClr val="accent2"/>
+          </a:effectRef>
+          <a:fontRef idx="minor">
+            <a:schemeClr val="tx1"/>
+          </a:fontRef>
+        </p:style>
+      </p:cxnSp>
+      <p:cxnSp>
+        <p:nvCxnSpPr>
+          <p:cNvPr id="7" name="Straight Arrow Connector 6"/>
+          <p:cNvCxnSpPr/>
+          <p:nvPr/>
+        </p:nvCxnSpPr>
+        <p:spPr>
+          <a:xfrm flipH="1">
+            <a:off x="9889566" y="4109398"/>
+            <a:ext cx="1059180" cy="7620"/>
+          </a:xfrm>
+          <a:prstGeom prst="straightConnector1">
+            <a:avLst/>
+          </a:prstGeom>
+          <a:ln w="57150">
+            <a:solidFill>
+              <a:schemeClr val="accent5"/>
+            </a:solidFill>
+            <a:headEnd type="none" w="med" len="med"/>
+            <a:tailEnd type="triangle"/>
+          </a:ln>
+        </p:spPr>
+        <p:style>
+          <a:lnRef idx="1">
+            <a:schemeClr val="accent2"/>
+          </a:lnRef>
+          <a:fillRef idx="0">
+            <a:schemeClr val="accent2"/>
+          </a:fillRef>
+          <a:effectRef idx="0">
+            <a:schemeClr val="accent2"/>
+          </a:effectRef>
+          <a:fontRef idx="minor">
+            <a:schemeClr val="tx1"/>
+          </a:fontRef>
+        </p:style>
+      </p:cxnSp>
     </p:spTree>
     <p:extLst>
       <p:ext uri="{BB962C8B-B14F-4D97-AF65-F5344CB8AC3E}">
@@ -12357,32 +13700,6 @@
   <p:clrMapOvr>
     <a:masterClrMapping/>
   </p:clrMapOvr>
-</p:sld>
-</file>
-
-<file path=ppt/slides/slide9.xml><?xml version="1.0" encoding="utf-8"?>
-<p:sld xmlns:a="http://schemas.openxmlformats.org/drawingml/2006/main" xmlns:r="http://schemas.openxmlformats.org/officeDocument/2006/relationships" xmlns:p="http://schemas.openxmlformats.org/presentationml/2006/main" show="0">
-  <p:cSld>
-    <p:spTree>
-      <p:nvGrpSpPr>
-        <p:cNvPr id="1" name=""/>
-        <p:cNvGrpSpPr/>
-        <p:nvPr/>
-      </p:nvGrpSpPr>
-      <p:grpSpPr>
-        <a:xfrm>
-          <a:off x="0" y="0"/>
-          <a:ext cx="0" cy="0"/>
-          <a:chOff x="0" y="0"/>
-          <a:chExt cx="0" cy="0"/>
-        </a:xfrm>
-      </p:grpSpPr>
-    </p:spTree>
-  </p:cSld>
-  <p:clrMapOvr>
-    <a:masterClrMapping/>
-  </p:clrMapOvr>
-  <p:transition spd="med"/>
 </p:sld>
 </file>
 

</xml_diff>

<commit_message>
adapt ppt to k8s v1.10
</commit_message>
<xml_diff>
--- a/kubernetes/03_labels_and_deployments.pptx
+++ b/kubernetes/03_labels_and_deployments.pptx
@@ -572,59 +572,7 @@
           <a:bodyPr/>
           <a:lstStyle/>
           <a:p>
-            <a:r>
-              <a:rPr lang="en-US" dirty="0"/>
-              <a:t>Before actually talking about the deployment resource, we need to introduce one of the fundamental concepts of Kubernetes: labels &amp; selectors.</a:t>
-            </a:r>
-          </a:p>
-          <a:p>
-            <a:endParaRPr lang="en-US" dirty="0"/>
-          </a:p>
-          <a:p>
-            <a:r>
-              <a:rPr lang="en-US" dirty="0"/>
-              <a:t>Basically, labels are (DNS compatible) free-text, </a:t>
-            </a:r>
-            <a:r>
-              <a:rPr lang="en-US" b="1" dirty="0"/>
-              <a:t>key-value pairs </a:t>
-            </a:r>
-            <a:r>
-              <a:rPr lang="en-US" dirty="0"/>
-              <a:t>and you can attach them to almost everything in Kubernetes. Labels are part of the metadata-section of a resource description and of course you can attach multiple labels to one resource.</a:t>
-            </a:r>
-          </a:p>
-          <a:p>
-            <a:endParaRPr lang="en-US" dirty="0"/>
-          </a:p>
-          <a:p>
-            <a:r>
-              <a:rPr lang="en-US" dirty="0"/>
-              <a:t>But what are labels good for, if there is no selection mechanism to evaluate them? Kubernetes label selectors are the answer to this questions.</a:t>
-            </a:r>
-          </a:p>
-          <a:p>
-            <a:endParaRPr lang="en-US" dirty="0"/>
-          </a:p>
-          <a:p>
-            <a:r>
-              <a:rPr lang="en-US" dirty="0"/>
-              <a:t>Selectors can be used in </a:t>
-            </a:r>
-            <a:r>
-              <a:rPr lang="en-US" dirty="0" err="1"/>
-              <a:t>kubectl</a:t>
-            </a:r>
-            <a:r>
-              <a:rPr lang="en-US" dirty="0"/>
-              <a:t> queries but also as part of resource definitions to define dependencies or even hierarchies of managed objects.</a:t>
-            </a:r>
-          </a:p>
-          <a:p>
-            <a:r>
-              <a:rPr lang="en-US" dirty="0"/>
-              <a:t>Mostly the selectors are part of the resource’s spec sections.</a:t>
-            </a:r>
+            <a:endParaRPr lang="en-US"/>
           </a:p>
         </p:txBody>
       </p:sp>
@@ -646,7 +594,7 @@
             <a:fld id="{7D8C2C35-2B8A-446E-BEC0-FD36716C29AC}" type="slidenum">
               <a:rPr lang="de-DE" smtClean="0"/>
               <a:pPr/>
-              <a:t>2</a:t>
+              <a:t>1</a:t>
             </a:fld>
             <a:endParaRPr lang="de-DE" dirty="0"/>
           </a:p>
@@ -655,7 +603,7 @@
     </p:spTree>
     <p:extLst>
       <p:ext uri="{BB962C8B-B14F-4D97-AF65-F5344CB8AC3E}">
-        <p14:creationId xmlns:p14="http://schemas.microsoft.com/office/powerpoint/2010/main" val="2759097903"/>
+        <p14:creationId xmlns:p14="http://schemas.microsoft.com/office/powerpoint/2010/main" val="3842008007"/>
       </p:ext>
     </p:extLst>
   </p:cSld>
@@ -711,7 +659,7 @@
           <a:p>
             <a:r>
               <a:rPr lang="en-US" dirty="0"/>
-              <a:t>Labels are used to identify and bundle pods or nodes or any other resource, where it seem useful.</a:t>
+              <a:t>Before actually talking about the deployment resource, we need to introduce one of the fundamental concepts of Kubernetes: labels &amp; selectors.</a:t>
             </a:r>
           </a:p>
           <a:p>
@@ -720,7 +668,47 @@
           <a:p>
             <a:r>
               <a:rPr lang="en-US" dirty="0"/>
-              <a:t>Pod names are not reliable because they are usually generated. To identify a set of same pods, a label helps.</a:t>
+              <a:t>Basically, labels are (DNS compatible) free-text, </a:t>
+            </a:r>
+            <a:r>
+              <a:rPr lang="en-US" b="1" dirty="0"/>
+              <a:t>key-value pairs </a:t>
+            </a:r>
+            <a:r>
+              <a:rPr lang="en-US" dirty="0"/>
+              <a:t>and you can attach them to almost everything in Kubernetes. Labels are part of the metadata-section of a resource description and of course you can attach multiple labels to one resource.</a:t>
+            </a:r>
+          </a:p>
+          <a:p>
+            <a:endParaRPr lang="en-US" dirty="0"/>
+          </a:p>
+          <a:p>
+            <a:r>
+              <a:rPr lang="en-US" dirty="0"/>
+              <a:t>But what are labels good for, if there is no selection mechanism to evaluate them? Kubernetes label selectors are the answer to this questions.</a:t>
+            </a:r>
+          </a:p>
+          <a:p>
+            <a:endParaRPr lang="en-US" dirty="0"/>
+          </a:p>
+          <a:p>
+            <a:r>
+              <a:rPr lang="en-US" dirty="0"/>
+              <a:t>Selectors can be used in </a:t>
+            </a:r>
+            <a:r>
+              <a:rPr lang="en-US" dirty="0" err="1"/>
+              <a:t>kubectl</a:t>
+            </a:r>
+            <a:r>
+              <a:rPr lang="en-US" dirty="0"/>
+              <a:t> queries but also as part of resource definitions to define dependencies or even hierarchies of managed objects.</a:t>
+            </a:r>
+          </a:p>
+          <a:p>
+            <a:r>
+              <a:rPr lang="en-US" dirty="0"/>
+              <a:t>Mostly the selectors are part of the resource’s spec sections.</a:t>
             </a:r>
           </a:p>
         </p:txBody>
@@ -743,7 +731,7 @@
             <a:fld id="{7D8C2C35-2B8A-446E-BEC0-FD36716C29AC}" type="slidenum">
               <a:rPr lang="de-DE" smtClean="0"/>
               <a:pPr/>
-              <a:t>3</a:t>
+              <a:t>2</a:t>
             </a:fld>
             <a:endParaRPr lang="de-DE" dirty="0"/>
           </a:p>
@@ -752,7 +740,7 @@
     </p:spTree>
     <p:extLst>
       <p:ext uri="{BB962C8B-B14F-4D97-AF65-F5344CB8AC3E}">
-        <p14:creationId xmlns:p14="http://schemas.microsoft.com/office/powerpoint/2010/main" val="3055188332"/>
+        <p14:creationId xmlns:p14="http://schemas.microsoft.com/office/powerpoint/2010/main" val="2759097903"/>
       </p:ext>
     </p:extLst>
   </p:cSld>
@@ -808,7 +796,7 @@
           <a:p>
             <a:r>
               <a:rPr lang="en-US" dirty="0"/>
-              <a:t>As already said, labels are part of the metadata section and selectors usually occur in the spec sections.</a:t>
+              <a:t>Labels are used to identify and bundle pods or nodes or any other resource, where it seem useful.</a:t>
             </a:r>
           </a:p>
           <a:p>
@@ -817,23 +805,7 @@
           <a:p>
             <a:r>
               <a:rPr lang="en-US" dirty="0"/>
-              <a:t>Additionally manual labeling is possible via </a:t>
-            </a:r>
-            <a:r>
-              <a:rPr lang="en-US" dirty="0" err="1"/>
-              <a:t>kubectl</a:t>
-            </a:r>
-            <a:r>
-              <a:rPr lang="en-US" dirty="0"/>
-              <a:t> and label selectors can be added to </a:t>
-            </a:r>
-            <a:r>
-              <a:rPr lang="en-US" dirty="0" err="1"/>
-              <a:t>kubectl</a:t>
-            </a:r>
-            <a:r>
-              <a:rPr lang="en-US" dirty="0"/>
-              <a:t> queries.</a:t>
+              <a:t>Pod names are not reliable because they are usually generated. To identify a set of same pods, a label helps.</a:t>
             </a:r>
           </a:p>
         </p:txBody>
@@ -856,7 +828,7 @@
             <a:fld id="{7D8C2C35-2B8A-446E-BEC0-FD36716C29AC}" type="slidenum">
               <a:rPr lang="de-DE" smtClean="0"/>
               <a:pPr/>
-              <a:t>4</a:t>
+              <a:t>3</a:t>
             </a:fld>
             <a:endParaRPr lang="de-DE" dirty="0"/>
           </a:p>
@@ -865,7 +837,7 @@
     </p:spTree>
     <p:extLst>
       <p:ext uri="{BB962C8B-B14F-4D97-AF65-F5344CB8AC3E}">
-        <p14:creationId xmlns:p14="http://schemas.microsoft.com/office/powerpoint/2010/main" val="2266578312"/>
+        <p14:creationId xmlns:p14="http://schemas.microsoft.com/office/powerpoint/2010/main" val="3055188332"/>
       </p:ext>
     </p:extLst>
   </p:cSld>
@@ -919,7 +891,35 @@
           <a:bodyPr/>
           <a:lstStyle/>
           <a:p>
-            <a:endParaRPr lang="en-US"/>
+            <a:r>
+              <a:rPr lang="en-US" dirty="0"/>
+              <a:t>As already said, labels are part of the metadata section and selectors usually occur in the spec sections.</a:t>
+            </a:r>
+          </a:p>
+          <a:p>
+            <a:endParaRPr lang="en-US" dirty="0"/>
+          </a:p>
+          <a:p>
+            <a:r>
+              <a:rPr lang="en-US" dirty="0"/>
+              <a:t>Additionally manual labeling is possible via </a:t>
+            </a:r>
+            <a:r>
+              <a:rPr lang="en-US" dirty="0" err="1"/>
+              <a:t>kubectl</a:t>
+            </a:r>
+            <a:r>
+              <a:rPr lang="en-US" dirty="0"/>
+              <a:t> and label selectors can be added to </a:t>
+            </a:r>
+            <a:r>
+              <a:rPr lang="en-US" dirty="0" err="1"/>
+              <a:t>kubectl</a:t>
+            </a:r>
+            <a:r>
+              <a:rPr lang="en-US" dirty="0"/>
+              <a:t> queries.</a:t>
+            </a:r>
           </a:p>
         </p:txBody>
       </p:sp>
@@ -941,7 +941,7 @@
             <a:fld id="{7D8C2C35-2B8A-446E-BEC0-FD36716C29AC}" type="slidenum">
               <a:rPr lang="de-DE" smtClean="0"/>
               <a:pPr/>
-              <a:t>5</a:t>
+              <a:t>4</a:t>
             </a:fld>
             <a:endParaRPr lang="de-DE" dirty="0"/>
           </a:p>
@@ -950,7 +950,7 @@
     </p:spTree>
     <p:extLst>
       <p:ext uri="{BB962C8B-B14F-4D97-AF65-F5344CB8AC3E}">
-        <p14:creationId xmlns:p14="http://schemas.microsoft.com/office/powerpoint/2010/main" val="679551827"/>
+        <p14:creationId xmlns:p14="http://schemas.microsoft.com/office/powerpoint/2010/main" val="2266578312"/>
       </p:ext>
     </p:extLst>
   </p:cSld>
@@ -1026,7 +1026,7 @@
             <a:fld id="{7D8C2C35-2B8A-446E-BEC0-FD36716C29AC}" type="slidenum">
               <a:rPr lang="de-DE" smtClean="0"/>
               <a:pPr/>
-              <a:t>6</a:t>
+              <a:t>5</a:t>
             </a:fld>
             <a:endParaRPr lang="de-DE" dirty="0"/>
           </a:p>
@@ -1035,7 +1035,7 @@
     </p:spTree>
     <p:extLst>
       <p:ext uri="{BB962C8B-B14F-4D97-AF65-F5344CB8AC3E}">
-        <p14:creationId xmlns:p14="http://schemas.microsoft.com/office/powerpoint/2010/main" val="220259158"/>
+        <p14:creationId xmlns:p14="http://schemas.microsoft.com/office/powerpoint/2010/main" val="679551827"/>
       </p:ext>
     </p:extLst>
   </p:cSld>
@@ -1086,143 +1086,10 @@
         </p:nvSpPr>
         <p:spPr/>
         <p:txBody>
-          <a:bodyPr>
-            <a:normAutofit lnSpcReduction="10000"/>
-          </a:bodyPr>
+          <a:bodyPr/>
           <a:lstStyle/>
           <a:p>
-            <a:r>
-              <a:rPr lang="en-US" dirty="0"/>
-              <a:t>How labels &amp; selectors work here:</a:t>
-            </a:r>
-          </a:p>
-          <a:p>
-            <a:pPr marL="285750" indent="-285750">
-              <a:buFontTx/>
-              <a:buChar char="-"/>
-            </a:pPr>
-            <a:r>
-              <a:rPr lang="en-US" dirty="0"/>
-              <a:t>Names of pods can change</a:t>
-            </a:r>
-          </a:p>
-          <a:p>
-            <a:pPr marL="285750" indent="-285750">
-              <a:buFontTx/>
-              <a:buChar char="-"/>
-            </a:pPr>
-            <a:r>
-              <a:rPr lang="en-US" dirty="0"/>
-              <a:t>Labels stay</a:t>
-            </a:r>
-            <a:r>
-              <a:rPr lang="en-US" baseline="0" dirty="0"/>
-              <a:t> the same</a:t>
-            </a:r>
-          </a:p>
-          <a:p>
-            <a:pPr marL="285750" indent="-285750">
-              <a:buFontTx/>
-              <a:buChar char="-"/>
-            </a:pPr>
-            <a:r>
-              <a:rPr lang="en-US" baseline="0" dirty="0"/>
-              <a:t>Only with labels pods related to </a:t>
-            </a:r>
-            <a:r>
-              <a:rPr lang="en-US" baseline="0" dirty="0" err="1"/>
-              <a:t>rs</a:t>
-            </a:r>
-            <a:r>
-              <a:rPr lang="en-US" baseline="0" dirty="0"/>
-              <a:t>/deployment can be determined reliably</a:t>
-            </a:r>
-          </a:p>
-          <a:p>
-            <a:pPr marL="285750" indent="-285750">
-              <a:buFontTx/>
-              <a:buChar char="-"/>
-            </a:pPr>
-            <a:endParaRPr lang="en-US" dirty="0"/>
-          </a:p>
-          <a:p>
-            <a:r>
-              <a:rPr lang="en-US" dirty="0"/>
-              <a:t>Why deployments?</a:t>
-            </a:r>
-          </a:p>
-          <a:p>
-            <a:r>
-              <a:rPr lang="en-US" dirty="0"/>
-              <a:t>You don’t want to know and manage individual pods. You would like to specify a template and instantiate it as often as you wish. Also you want to manage the group of pods e.g. in terms of docker image used.</a:t>
-            </a:r>
-          </a:p>
-          <a:p>
-            <a:endParaRPr lang="en-US" dirty="0"/>
-          </a:p>
-          <a:p>
-            <a:r>
-              <a:rPr lang="en-US" dirty="0"/>
-              <a:t>The deployment gives you these management capabilities. In it’s resource description (</a:t>
-            </a:r>
-            <a:r>
-              <a:rPr lang="en-US" dirty="0" err="1"/>
-              <a:t>yaml</a:t>
-            </a:r>
-            <a:r>
-              <a:rPr lang="en-US" dirty="0"/>
-              <a:t> file) you specify a pod template, how pods should be labeled and of course a corresponding selector to identify your pods.</a:t>
-            </a:r>
-          </a:p>
-          <a:p>
-            <a:r>
-              <a:rPr lang="en-US" dirty="0"/>
-              <a:t>On cluster level the deployment creates &amp; manages a replica set which then manages the pods. </a:t>
-            </a:r>
-          </a:p>
-          <a:p>
-            <a:r>
-              <a:rPr lang="en-US" dirty="0"/>
-              <a:t>If you update the number of replicas, this will be sent to the </a:t>
-            </a:r>
-            <a:r>
-              <a:rPr lang="en-US" dirty="0" err="1"/>
-              <a:t>replicaSet</a:t>
-            </a:r>
-            <a:r>
-              <a:rPr lang="en-US" dirty="0"/>
-              <a:t> and the desired state is enforced via the </a:t>
-            </a:r>
-            <a:r>
-              <a:rPr lang="en-US" dirty="0" err="1"/>
-              <a:t>replicaSet</a:t>
-            </a:r>
-            <a:r>
-              <a:rPr lang="en-US" dirty="0"/>
-              <a:t>. </a:t>
-            </a:r>
-          </a:p>
-          <a:p>
-            <a:r>
-              <a:rPr lang="en-US" dirty="0"/>
-              <a:t>Upon update of the image, a new </a:t>
-            </a:r>
-            <a:r>
-              <a:rPr lang="en-US" dirty="0" err="1"/>
-              <a:t>replicaSet</a:t>
-            </a:r>
-            <a:r>
-              <a:rPr lang="en-US" dirty="0"/>
-              <a:t> will be created and the old one will be set to replica=0. This way you can roll-back to your old </a:t>
-            </a:r>
-            <a:r>
-              <a:rPr lang="en-US" dirty="0" err="1"/>
-              <a:t>replicaSet</a:t>
-            </a:r>
-            <a:r>
-              <a:rPr lang="en-US" dirty="0"/>
-              <a:t> (by scaling it up again). </a:t>
-            </a:r>
+            <a:endParaRPr lang="en-US"/>
           </a:p>
         </p:txBody>
       </p:sp>
@@ -1244,6 +1111,224 @@
             <a:fld id="{7D8C2C35-2B8A-446E-BEC0-FD36716C29AC}" type="slidenum">
               <a:rPr lang="de-DE" smtClean="0"/>
               <a:pPr/>
+              <a:t>6</a:t>
+            </a:fld>
+            <a:endParaRPr lang="de-DE" dirty="0"/>
+          </a:p>
+        </p:txBody>
+      </p:sp>
+    </p:spTree>
+    <p:extLst>
+      <p:ext uri="{BB962C8B-B14F-4D97-AF65-F5344CB8AC3E}">
+        <p14:creationId xmlns:p14="http://schemas.microsoft.com/office/powerpoint/2010/main" val="220259158"/>
+      </p:ext>
+    </p:extLst>
+  </p:cSld>
+  <p:clrMapOvr>
+    <a:masterClrMapping/>
+  </p:clrMapOvr>
+</p:notes>
+</file>
+
+<file path=ppt/notesSlides/notesSlide7.xml><?xml version="1.0" encoding="utf-8"?>
+<p:notes xmlns:a="http://schemas.openxmlformats.org/drawingml/2006/main" xmlns:r="http://schemas.openxmlformats.org/officeDocument/2006/relationships" xmlns:p="http://schemas.openxmlformats.org/presentationml/2006/main">
+  <p:cSld>
+    <p:spTree>
+      <p:nvGrpSpPr>
+        <p:cNvPr id="1" name=""/>
+        <p:cNvGrpSpPr/>
+        <p:nvPr/>
+      </p:nvGrpSpPr>
+      <p:grpSpPr>
+        <a:xfrm>
+          <a:off x="0" y="0"/>
+          <a:ext cx="0" cy="0"/>
+          <a:chOff x="0" y="0"/>
+          <a:chExt cx="0" cy="0"/>
+        </a:xfrm>
+      </p:grpSpPr>
+      <p:sp>
+        <p:nvSpPr>
+          <p:cNvPr id="2" name="Slide Image Placeholder 1"/>
+          <p:cNvSpPr>
+            <a:spLocks noGrp="1" noRot="1" noChangeAspect="1"/>
+          </p:cNvSpPr>
+          <p:nvPr>
+            <p:ph type="sldImg"/>
+          </p:nvPr>
+        </p:nvSpPr>
+        <p:spPr/>
+      </p:sp>
+      <p:sp>
+        <p:nvSpPr>
+          <p:cNvPr id="3" name="Notes Placeholder 2"/>
+          <p:cNvSpPr>
+            <a:spLocks noGrp="1"/>
+          </p:cNvSpPr>
+          <p:nvPr>
+            <p:ph type="body" idx="1"/>
+          </p:nvPr>
+        </p:nvSpPr>
+        <p:spPr/>
+        <p:txBody>
+          <a:bodyPr>
+            <a:normAutofit lnSpcReduction="10000"/>
+          </a:bodyPr>
+          <a:lstStyle/>
+          <a:p>
+            <a:r>
+              <a:rPr lang="en-US" dirty="0"/>
+              <a:t>How labels &amp; selectors work here:</a:t>
+            </a:r>
+          </a:p>
+          <a:p>
+            <a:pPr marL="285750" indent="-285750">
+              <a:buFontTx/>
+              <a:buChar char="-"/>
+            </a:pPr>
+            <a:r>
+              <a:rPr lang="en-US" dirty="0"/>
+              <a:t>Names of pods can change</a:t>
+            </a:r>
+          </a:p>
+          <a:p>
+            <a:pPr marL="285750" indent="-285750">
+              <a:buFontTx/>
+              <a:buChar char="-"/>
+            </a:pPr>
+            <a:r>
+              <a:rPr lang="en-US" dirty="0"/>
+              <a:t>Labels stay</a:t>
+            </a:r>
+            <a:r>
+              <a:rPr lang="en-US" baseline="0" dirty="0"/>
+              <a:t> the same</a:t>
+            </a:r>
+          </a:p>
+          <a:p>
+            <a:pPr marL="285750" indent="-285750">
+              <a:buFontTx/>
+              <a:buChar char="-"/>
+            </a:pPr>
+            <a:r>
+              <a:rPr lang="en-US" baseline="0" dirty="0"/>
+              <a:t>Only with labels pods related to </a:t>
+            </a:r>
+            <a:r>
+              <a:rPr lang="en-US" baseline="0" dirty="0" err="1"/>
+              <a:t>rs</a:t>
+            </a:r>
+            <a:r>
+              <a:rPr lang="en-US" baseline="0" dirty="0"/>
+              <a:t>/deployment can be determined reliably</a:t>
+            </a:r>
+          </a:p>
+          <a:p>
+            <a:pPr marL="285750" indent="-285750">
+              <a:buFontTx/>
+              <a:buChar char="-"/>
+            </a:pPr>
+            <a:endParaRPr lang="en-US" dirty="0"/>
+          </a:p>
+          <a:p>
+            <a:r>
+              <a:rPr lang="en-US" dirty="0"/>
+              <a:t>Why deployments?</a:t>
+            </a:r>
+          </a:p>
+          <a:p>
+            <a:r>
+              <a:rPr lang="en-US" dirty="0"/>
+              <a:t>You don’t want to know and manage individual pods. You would like to specify a template and instantiate it as often as you wish. Also you want to manage the group of pods e.g. in terms of docker image used.</a:t>
+            </a:r>
+          </a:p>
+          <a:p>
+            <a:endParaRPr lang="en-US" dirty="0"/>
+          </a:p>
+          <a:p>
+            <a:r>
+              <a:rPr lang="en-US" dirty="0"/>
+              <a:t>The deployment gives you these management capabilities. In it’s resource description (</a:t>
+            </a:r>
+            <a:r>
+              <a:rPr lang="en-US" dirty="0" err="1"/>
+              <a:t>yaml</a:t>
+            </a:r>
+            <a:r>
+              <a:rPr lang="en-US" dirty="0"/>
+              <a:t> file) you specify a pod template, how pods should be labeled and of course a corresponding selector to identify your pods.</a:t>
+            </a:r>
+          </a:p>
+          <a:p>
+            <a:r>
+              <a:rPr lang="en-US" dirty="0"/>
+              <a:t>On cluster level the deployment creates &amp; manages a replica set which then manages the pods. </a:t>
+            </a:r>
+          </a:p>
+          <a:p>
+            <a:r>
+              <a:rPr lang="en-US" dirty="0"/>
+              <a:t>If you update the number of replicas, this will be sent to the </a:t>
+            </a:r>
+            <a:r>
+              <a:rPr lang="en-US" dirty="0" err="1"/>
+              <a:t>replicaSet</a:t>
+            </a:r>
+            <a:r>
+              <a:rPr lang="en-US" dirty="0"/>
+              <a:t> and the desired state is enforced via the </a:t>
+            </a:r>
+            <a:r>
+              <a:rPr lang="en-US" dirty="0" err="1"/>
+              <a:t>replicaSet</a:t>
+            </a:r>
+            <a:r>
+              <a:rPr lang="en-US" dirty="0"/>
+              <a:t>. </a:t>
+            </a:r>
+          </a:p>
+          <a:p>
+            <a:r>
+              <a:rPr lang="en-US" dirty="0"/>
+              <a:t>Upon update of the image, a new </a:t>
+            </a:r>
+            <a:r>
+              <a:rPr lang="en-US" dirty="0" err="1"/>
+              <a:t>replicaSet</a:t>
+            </a:r>
+            <a:r>
+              <a:rPr lang="en-US" dirty="0"/>
+              <a:t> will be created and the old one will be set to replica=0. This way you can roll-back to your old </a:t>
+            </a:r>
+            <a:r>
+              <a:rPr lang="en-US" dirty="0" err="1"/>
+              <a:t>replicaSet</a:t>
+            </a:r>
+            <a:r>
+              <a:rPr lang="en-US" dirty="0"/>
+              <a:t> (by scaling it up again). </a:t>
+            </a:r>
+          </a:p>
+        </p:txBody>
+      </p:sp>
+      <p:sp>
+        <p:nvSpPr>
+          <p:cNvPr id="4" name="Slide Number Placeholder 3"/>
+          <p:cNvSpPr>
+            <a:spLocks noGrp="1"/>
+          </p:cNvSpPr>
+          <p:nvPr>
+            <p:ph type="sldNum" sz="quarter" idx="10"/>
+          </p:nvPr>
+        </p:nvSpPr>
+        <p:spPr/>
+        <p:txBody>
+          <a:bodyPr/>
+          <a:lstStyle/>
+          <a:p>
+            <a:fld id="{7D8C2C35-2B8A-446E-BEC0-FD36716C29AC}" type="slidenum">
+              <a:rPr lang="de-DE" smtClean="0"/>
+              <a:pPr/>
               <a:t>7</a:t>
             </a:fld>
             <a:endParaRPr lang="de-DE" dirty="0"/>
@@ -1263,7 +1348,7 @@
 </p:notes>
 </file>
 
-<file path=ppt/notesSlides/notesSlide7.xml><?xml version="1.0" encoding="utf-8"?>
+<file path=ppt/notesSlides/notesSlide8.xml><?xml version="1.0" encoding="utf-8"?>
 <p:notes xmlns:a="http://schemas.openxmlformats.org/drawingml/2006/main" xmlns:r="http://schemas.openxmlformats.org/officeDocument/2006/relationships" xmlns:p="http://schemas.openxmlformats.org/presentationml/2006/main">
   <p:cSld>
     <p:spTree>
@@ -1338,7 +1423,7 @@
           </a:bodyPr>
           <a:lstStyle/>
           <a:p>
-            <a:endParaRPr lang="en-US"/>
+            <a:endParaRPr lang="en-US" dirty="0"/>
           </a:p>
         </p:txBody>
       </p:sp>
@@ -1355,7 +1440,7 @@
 </p:notes>
 </file>
 
-<file path=ppt/notesSlides/notesSlide8.xml><?xml version="1.0" encoding="utf-8"?>
+<file path=ppt/notesSlides/notesSlide9.xml><?xml version="1.0" encoding="utf-8"?>
 <p:notes xmlns:a="http://schemas.openxmlformats.org/drawingml/2006/main" xmlns:r="http://schemas.openxmlformats.org/officeDocument/2006/relationships" xmlns:p="http://schemas.openxmlformats.org/presentationml/2006/main">
   <p:cSld>
     <p:spTree>
@@ -9000,7 +9085,7 @@
           </p:nvPr>
         </p:nvPicPr>
         <p:blipFill>
-          <a:blip r:embed="rId2"/>
+          <a:blip r:embed="rId3"/>
           <a:srcRect t="3112" b="3112"/>
           <a:stretch>
             <a:fillRect/>
@@ -12279,6 +12364,36 @@
           <a:chExt cx="0" cy="0"/>
         </a:xfrm>
       </p:grpSpPr>
+      <p:pic>
+        <p:nvPicPr>
+          <p:cNvPr id="8" name="Picture 7">
+            <a:extLst>
+              <a:ext uri="{FF2B5EF4-FFF2-40B4-BE49-F238E27FC236}">
+                <a16:creationId xmlns:a16="http://schemas.microsoft.com/office/drawing/2014/main" id="{F20884E9-1461-437F-B055-12796ED6B692}"/>
+              </a:ext>
+            </a:extLst>
+          </p:cNvPr>
+          <p:cNvPicPr>
+            <a:picLocks noChangeAspect="1"/>
+          </p:cNvPicPr>
+          <p:nvPr/>
+        </p:nvPicPr>
+        <p:blipFill>
+          <a:blip r:embed="rId3"/>
+          <a:stretch>
+            <a:fillRect/>
+          </a:stretch>
+        </p:blipFill>
+        <p:spPr>
+          <a:xfrm>
+            <a:off x="7986841" y="842636"/>
+            <a:ext cx="2734499" cy="5407318"/>
+          </a:xfrm>
+          <a:prstGeom prst="rect">
+            <a:avLst/>
+          </a:prstGeom>
+        </p:spPr>
+      </p:pic>
       <p:sp>
         <p:nvSpPr>
           <p:cNvPr id="3" name="Text Placeholder 2"/>
@@ -12405,30 +12520,6 @@
           </a:p>
         </p:txBody>
       </p:sp>
-      <p:pic>
-        <p:nvPicPr>
-          <p:cNvPr id="4" name="Picture 3"/>
-          <p:cNvPicPr>
-            <a:picLocks noChangeAspect="1"/>
-          </p:cNvPicPr>
-          <p:nvPr/>
-        </p:nvPicPr>
-        <p:blipFill>
-          <a:blip r:embed="rId3"/>
-          <a:stretch>
-            <a:fillRect/>
-          </a:stretch>
-        </p:blipFill>
-        <p:spPr>
-          <a:xfrm>
-            <a:off x="7986841" y="842636"/>
-            <a:ext cx="2961905" cy="5009524"/>
-          </a:xfrm>
-          <a:prstGeom prst="rect">
-            <a:avLst/>
-          </a:prstGeom>
-        </p:spPr>
-      </p:pic>
       <p:cxnSp>
         <p:nvCxnSpPr>
           <p:cNvPr id="5" name="Straight Arrow Connector 4"/>
@@ -12437,7 +12528,7 @@
         </p:nvCxnSpPr>
         <p:spPr>
           <a:xfrm flipH="1">
-            <a:off x="9662160" y="1937698"/>
+            <a:off x="9889566" y="2111548"/>
             <a:ext cx="1059180" cy="7620"/>
           </a:xfrm>
           <a:prstGeom prst="straightConnector1">
@@ -12474,7 +12565,7 @@
         </p:nvCxnSpPr>
         <p:spPr>
           <a:xfrm flipH="1">
-            <a:off x="9889566" y="3248338"/>
+            <a:off x="9889566" y="3372625"/>
             <a:ext cx="1059180" cy="7620"/>
           </a:xfrm>
           <a:prstGeom prst="straightConnector1">
@@ -12511,7 +12602,7 @@
         </p:nvCxnSpPr>
         <p:spPr>
           <a:xfrm flipH="1">
-            <a:off x="9889566" y="4109398"/>
+            <a:off x="9889566" y="4322462"/>
             <a:ext cx="1059180" cy="7620"/>
           </a:xfrm>
           <a:prstGeom prst="straightConnector1">

</xml_diff>

<commit_message>
added demo blocker & descriptions to ppt
</commit_message>
<xml_diff>
--- a/kubernetes/03_labels_and_deployments.pptx
+++ b/kubernetes/03_labels_and_deployments.pptx
@@ -15,10 +15,10 @@
     <p:sldId id="442" r:id="rId3"/>
     <p:sldId id="446" r:id="rId4"/>
     <p:sldId id="443" r:id="rId5"/>
-    <p:sldId id="444" r:id="rId6"/>
-    <p:sldId id="445" r:id="rId7"/>
-    <p:sldId id="440" r:id="rId8"/>
-    <p:sldId id="436" r:id="rId9"/>
+    <p:sldId id="448" r:id="rId6"/>
+    <p:sldId id="440" r:id="rId7"/>
+    <p:sldId id="436" r:id="rId8"/>
+    <p:sldId id="449" r:id="rId9"/>
     <p:sldId id="447" r:id="rId10"/>
     <p:sldId id="265" r:id="rId11"/>
   </p:sldIdLst>
@@ -196,10 +196,6 @@
 </p:presentation>
 </file>
 
-<file path=ppt/revisionInfo.xml><?xml version="1.0" encoding="utf-8"?>
-<p1510:revInfo xmlns:a="http://schemas.openxmlformats.org/drawingml/2006/main" xmlns:r="http://schemas.openxmlformats.org/officeDocument/2006/relationships" xmlns:p1510="http://schemas.microsoft.com/office/powerpoint/2015/10/main"/>
-</file>
-
 <file path=ppt/handoutMasters/handoutMaster1.xml><?xml version="1.0" encoding="utf-8"?>
 <p:handoutMaster xmlns:a="http://schemas.openxmlformats.org/drawingml/2006/main" xmlns:r="http://schemas.openxmlformats.org/officeDocument/2006/relationships" xmlns:p="http://schemas.openxmlformats.org/presentationml/2006/main">
   <p:cSld>
@@ -1004,7 +1000,188 @@
           <a:bodyPr/>
           <a:lstStyle/>
           <a:p>
-            <a:endParaRPr lang="en-US"/>
+            <a:pPr marL="0" indent="0">
+              <a:buFontTx/>
+              <a:buNone/>
+            </a:pPr>
+            <a:r>
+              <a:rPr lang="en-US" dirty="0"/>
+              <a:t>This demo should familiarize participants with the labeling system.</a:t>
+            </a:r>
+          </a:p>
+          <a:p>
+            <a:pPr marL="285750" indent="-285750">
+              <a:buFontTx/>
+              <a:buChar char="-"/>
+            </a:pPr>
+            <a:r>
+              <a:rPr lang="en-US" dirty="0"/>
+              <a:t>Show labels</a:t>
+            </a:r>
+          </a:p>
+          <a:p>
+            <a:pPr marL="465750" lvl="1" indent="-285750">
+              <a:buFontTx/>
+              <a:buChar char="-"/>
+            </a:pPr>
+            <a:r>
+              <a:rPr lang="en-US" dirty="0"/>
+              <a:t>of nodes: </a:t>
+            </a:r>
+            <a:r>
+              <a:rPr lang="en-US" dirty="0" err="1"/>
+              <a:t>kubectl</a:t>
+            </a:r>
+            <a:r>
+              <a:rPr lang="en-US" dirty="0"/>
+              <a:t> get nodes --show-labels</a:t>
+            </a:r>
+          </a:p>
+          <a:p>
+            <a:pPr marL="465750" lvl="1" indent="-285750">
+              <a:buFontTx/>
+              <a:buChar char="-"/>
+            </a:pPr>
+            <a:r>
+              <a:rPr lang="en-US" dirty="0"/>
+              <a:t>of pods in </a:t>
+            </a:r>
+            <a:r>
+              <a:rPr lang="en-US" dirty="0" err="1"/>
+              <a:t>kube</a:t>
+            </a:r>
+            <a:r>
+              <a:rPr lang="en-US" dirty="0"/>
+              <a:t>-system namespace: </a:t>
+            </a:r>
+            <a:r>
+              <a:rPr lang="en-US" dirty="0" err="1"/>
+              <a:t>kubectl</a:t>
+            </a:r>
+            <a:r>
+              <a:rPr lang="en-US" dirty="0"/>
+              <a:t> get pods -n </a:t>
+            </a:r>
+            <a:r>
+              <a:rPr lang="en-US" dirty="0" err="1"/>
+              <a:t>kube</a:t>
+            </a:r>
+            <a:r>
+              <a:rPr lang="en-US" dirty="0"/>
+              <a:t>-system --</a:t>
+            </a:r>
+            <a:r>
+              <a:rPr lang="en-US" dirty="0" err="1"/>
+              <a:t>showl</a:t>
+            </a:r>
+            <a:r>
+              <a:rPr lang="en-US" dirty="0"/>
+              <a:t>-labels</a:t>
+            </a:r>
+          </a:p>
+          <a:p>
+            <a:pPr marL="285750" indent="-285750">
+              <a:buFontTx/>
+              <a:buChar char="-"/>
+            </a:pPr>
+            <a:r>
+              <a:rPr lang="en-US" dirty="0"/>
+              <a:t>Show selection based on labels:</a:t>
+            </a:r>
+          </a:p>
+          <a:p>
+            <a:pPr marL="465750" lvl="1" indent="-285750">
+              <a:buFontTx/>
+              <a:buChar char="-"/>
+            </a:pPr>
+            <a:r>
+              <a:rPr lang="en-US" dirty="0"/>
+              <a:t>Select a group of pods from </a:t>
+            </a:r>
+            <a:r>
+              <a:rPr lang="en-US" dirty="0" err="1"/>
+              <a:t>kube</a:t>
+            </a:r>
+            <a:r>
+              <a:rPr lang="en-US" dirty="0"/>
+              <a:t>-system namespace by their labels (e.g. </a:t>
+            </a:r>
+            <a:r>
+              <a:rPr lang="en-US" dirty="0" err="1"/>
+              <a:t>kubect</a:t>
+            </a:r>
+            <a:r>
+              <a:rPr lang="en-US" dirty="0"/>
+              <a:t> get pods -n </a:t>
+            </a:r>
+            <a:r>
+              <a:rPr lang="en-US" dirty="0" err="1"/>
+              <a:t>kube</a:t>
+            </a:r>
+            <a:r>
+              <a:rPr lang="en-US" dirty="0"/>
+              <a:t>-system -l component=node-exporter)</a:t>
+            </a:r>
+          </a:p>
+          <a:p>
+            <a:pPr marL="465750" lvl="1" indent="-285750">
+              <a:buFontTx/>
+              <a:buChar char="-"/>
+            </a:pPr>
+            <a:r>
+              <a:rPr lang="en-US" dirty="0"/>
+              <a:t>Select a group based only based on key existence: </a:t>
+            </a:r>
+            <a:r>
+              <a:rPr lang="en-US" dirty="0" err="1"/>
+              <a:t>kubectl</a:t>
+            </a:r>
+            <a:r>
+              <a:rPr lang="en-US" dirty="0"/>
+              <a:t> get pods –n </a:t>
+            </a:r>
+            <a:r>
+              <a:rPr lang="en-US" dirty="0" err="1"/>
+              <a:t>kube</a:t>
+            </a:r>
+            <a:r>
+              <a:rPr lang="en-US" dirty="0"/>
+              <a:t>-system –l component</a:t>
+            </a:r>
+          </a:p>
+          <a:p>
+            <a:pPr marL="285750" indent="-285750">
+              <a:buFontTx/>
+              <a:buChar char="-"/>
+            </a:pPr>
+            <a:r>
+              <a:rPr lang="en-US" dirty="0"/>
+              <a:t>Label a pod from previous demo (re-create if necessary)</a:t>
+            </a:r>
+          </a:p>
+          <a:p>
+            <a:pPr marL="465750" lvl="1" indent="-285750">
+              <a:buFontTx/>
+              <a:buChar char="-"/>
+            </a:pPr>
+            <a:r>
+              <a:rPr lang="en-US" dirty="0" err="1"/>
+              <a:t>kubectl</a:t>
+            </a:r>
+            <a:r>
+              <a:rPr lang="en-US" dirty="0"/>
+              <a:t> label pod &lt;name&gt; awesome=hair</a:t>
+            </a:r>
+          </a:p>
+          <a:p>
+            <a:pPr marL="465750" lvl="1" indent="-285750">
+              <a:buFontTx/>
+              <a:buChar char="-"/>
+            </a:pPr>
+            <a:r>
+              <a:rPr lang="en-US" dirty="0"/>
+              <a:t>Query labeled pod</a:t>
+            </a:r>
           </a:p>
         </p:txBody>
       </p:sp>
@@ -1035,7 +1212,7 @@
     </p:spTree>
     <p:extLst>
       <p:ext uri="{BB962C8B-B14F-4D97-AF65-F5344CB8AC3E}">
-        <p14:creationId xmlns:p14="http://schemas.microsoft.com/office/powerpoint/2010/main" val="679551827"/>
+        <p14:creationId xmlns:p14="http://schemas.microsoft.com/office/powerpoint/2010/main" val="3017083131"/>
       </p:ext>
     </p:extLst>
   </p:cSld>
@@ -1086,10 +1263,143 @@
         </p:nvSpPr>
         <p:spPr/>
         <p:txBody>
-          <a:bodyPr/>
+          <a:bodyPr>
+            <a:normAutofit lnSpcReduction="10000"/>
+          </a:bodyPr>
           <a:lstStyle/>
           <a:p>
-            <a:endParaRPr lang="en-US"/>
+            <a:r>
+              <a:rPr lang="en-US" dirty="0"/>
+              <a:t>How labels &amp; selectors work here:</a:t>
+            </a:r>
+          </a:p>
+          <a:p>
+            <a:pPr marL="285750" indent="-285750">
+              <a:buFontTx/>
+              <a:buChar char="-"/>
+            </a:pPr>
+            <a:r>
+              <a:rPr lang="en-US" dirty="0"/>
+              <a:t>Names of pods can change</a:t>
+            </a:r>
+          </a:p>
+          <a:p>
+            <a:pPr marL="285750" indent="-285750">
+              <a:buFontTx/>
+              <a:buChar char="-"/>
+            </a:pPr>
+            <a:r>
+              <a:rPr lang="en-US" dirty="0"/>
+              <a:t>Labels stay</a:t>
+            </a:r>
+            <a:r>
+              <a:rPr lang="en-US" baseline="0" dirty="0"/>
+              <a:t> the same</a:t>
+            </a:r>
+          </a:p>
+          <a:p>
+            <a:pPr marL="285750" indent="-285750">
+              <a:buFontTx/>
+              <a:buChar char="-"/>
+            </a:pPr>
+            <a:r>
+              <a:rPr lang="en-US" baseline="0" dirty="0"/>
+              <a:t>Only with labels pods related to </a:t>
+            </a:r>
+            <a:r>
+              <a:rPr lang="en-US" baseline="0" dirty="0" err="1"/>
+              <a:t>rs</a:t>
+            </a:r>
+            <a:r>
+              <a:rPr lang="en-US" baseline="0" dirty="0"/>
+              <a:t>/deployment can be determined reliably</a:t>
+            </a:r>
+          </a:p>
+          <a:p>
+            <a:pPr marL="285750" indent="-285750">
+              <a:buFontTx/>
+              <a:buChar char="-"/>
+            </a:pPr>
+            <a:endParaRPr lang="en-US" dirty="0"/>
+          </a:p>
+          <a:p>
+            <a:r>
+              <a:rPr lang="en-US" dirty="0"/>
+              <a:t>Why deployments?</a:t>
+            </a:r>
+          </a:p>
+          <a:p>
+            <a:r>
+              <a:rPr lang="en-US" dirty="0"/>
+              <a:t>You don’t want to know and manage individual pods. You would like to specify a template and instantiate it as often as you wish. Also you want to manage the group of pods e.g. in terms of docker image used.</a:t>
+            </a:r>
+          </a:p>
+          <a:p>
+            <a:endParaRPr lang="en-US" dirty="0"/>
+          </a:p>
+          <a:p>
+            <a:r>
+              <a:rPr lang="en-US" dirty="0"/>
+              <a:t>The deployment gives you these management capabilities. In it’s resource description (</a:t>
+            </a:r>
+            <a:r>
+              <a:rPr lang="en-US" dirty="0" err="1"/>
+              <a:t>yaml</a:t>
+            </a:r>
+            <a:r>
+              <a:rPr lang="en-US" dirty="0"/>
+              <a:t> file) you specify a pod template, how pods should be labeled and of course a corresponding selector to identify your pods.</a:t>
+            </a:r>
+          </a:p>
+          <a:p>
+            <a:r>
+              <a:rPr lang="en-US" dirty="0"/>
+              <a:t>On cluster level the deployment creates &amp; manages a replica set which then manages the pods. </a:t>
+            </a:r>
+          </a:p>
+          <a:p>
+            <a:r>
+              <a:rPr lang="en-US" dirty="0"/>
+              <a:t>If you update the number of replicas, this will be sent to the </a:t>
+            </a:r>
+            <a:r>
+              <a:rPr lang="en-US" dirty="0" err="1"/>
+              <a:t>replicaSet</a:t>
+            </a:r>
+            <a:r>
+              <a:rPr lang="en-US" dirty="0"/>
+              <a:t> and the desired state is enforced via the </a:t>
+            </a:r>
+            <a:r>
+              <a:rPr lang="en-US" dirty="0" err="1"/>
+              <a:t>replicaSet</a:t>
+            </a:r>
+            <a:r>
+              <a:rPr lang="en-US" dirty="0"/>
+              <a:t>. </a:t>
+            </a:r>
+          </a:p>
+          <a:p>
+            <a:r>
+              <a:rPr lang="en-US" dirty="0"/>
+              <a:t>Upon update of the image, a new </a:t>
+            </a:r>
+            <a:r>
+              <a:rPr lang="en-US" dirty="0" err="1"/>
+              <a:t>replicaSet</a:t>
+            </a:r>
+            <a:r>
+              <a:rPr lang="en-US" dirty="0"/>
+              <a:t> will be created and the old one will be set to replica=0. This way you can roll-back to your old </a:t>
+            </a:r>
+            <a:r>
+              <a:rPr lang="en-US" dirty="0" err="1"/>
+              <a:t>replicaSet</a:t>
+            </a:r>
+            <a:r>
+              <a:rPr lang="en-US" dirty="0"/>
+              <a:t> (by scaling it up again). </a:t>
+            </a:r>
           </a:p>
         </p:txBody>
       </p:sp>
@@ -1120,7 +1430,7 @@
     </p:spTree>
     <p:extLst>
       <p:ext uri="{BB962C8B-B14F-4D97-AF65-F5344CB8AC3E}">
-        <p14:creationId xmlns:p14="http://schemas.microsoft.com/office/powerpoint/2010/main" val="220259158"/>
+        <p14:creationId xmlns:p14="http://schemas.microsoft.com/office/powerpoint/2010/main" val="2647646029"/>
       </p:ext>
     </p:extLst>
   </p:cSld>
@@ -1131,6 +1441,98 @@
 </file>
 
 <file path=ppt/notesSlides/notesSlide7.xml><?xml version="1.0" encoding="utf-8"?>
+<p:notes xmlns:a="http://schemas.openxmlformats.org/drawingml/2006/main" xmlns:r="http://schemas.openxmlformats.org/officeDocument/2006/relationships" xmlns:p="http://schemas.openxmlformats.org/presentationml/2006/main">
+  <p:cSld>
+    <p:spTree>
+      <p:nvGrpSpPr>
+        <p:cNvPr id="1" name=""/>
+        <p:cNvGrpSpPr/>
+        <p:nvPr/>
+      </p:nvGrpSpPr>
+      <p:grpSpPr>
+        <a:xfrm>
+          <a:off x="0" y="0"/>
+          <a:ext cx="0" cy="0"/>
+          <a:chOff x="0" y="0"/>
+          <a:chExt cx="0" cy="0"/>
+        </a:xfrm>
+      </p:grpSpPr>
+      <p:sp>
+        <p:nvSpPr>
+          <p:cNvPr id="4" name="Slide Number Placeholder 3"/>
+          <p:cNvSpPr>
+            <a:spLocks noGrp="1"/>
+          </p:cNvSpPr>
+          <p:nvPr>
+            <p:ph type="sldNum" sz="quarter" idx="10"/>
+          </p:nvPr>
+        </p:nvSpPr>
+        <p:spPr/>
+        <p:txBody>
+          <a:bodyPr/>
+          <a:lstStyle/>
+          <a:p>
+            <a:fld id="{7D8C2C35-2B8A-446E-BEC0-FD36716C29AC}" type="slidenum">
+              <a:rPr lang="de-DE" smtClean="0"/>
+              <a:pPr/>
+              <a:t>7</a:t>
+            </a:fld>
+            <a:endParaRPr lang="de-DE" dirty="0"/>
+          </a:p>
+        </p:txBody>
+      </p:sp>
+      <p:sp>
+        <p:nvSpPr>
+          <p:cNvPr id="9" name="Slide Image Placeholder 8"/>
+          <p:cNvSpPr>
+            <a:spLocks noGrp="1" noRot="1" noChangeAspect="1"/>
+          </p:cNvSpPr>
+          <p:nvPr>
+            <p:ph type="sldImg"/>
+          </p:nvPr>
+        </p:nvSpPr>
+        <p:spPr>
+          <a:xfrm>
+            <a:off x="547688" y="612775"/>
+            <a:ext cx="5762625" cy="3241675"/>
+          </a:xfrm>
+        </p:spPr>
+      </p:sp>
+      <p:sp>
+        <p:nvSpPr>
+          <p:cNvPr id="10" name="Notes Placeholder 9"/>
+          <p:cNvSpPr>
+            <a:spLocks noGrp="1"/>
+          </p:cNvSpPr>
+          <p:nvPr>
+            <p:ph type="body" idx="1"/>
+          </p:nvPr>
+        </p:nvSpPr>
+        <p:spPr/>
+        <p:txBody>
+          <a:bodyPr>
+            <a:normAutofit/>
+          </a:bodyPr>
+          <a:lstStyle/>
+          <a:p>
+            <a:endParaRPr lang="en-US" dirty="0"/>
+          </a:p>
+        </p:txBody>
+      </p:sp>
+    </p:spTree>
+    <p:extLst>
+      <p:ext uri="{BB962C8B-B14F-4D97-AF65-F5344CB8AC3E}">
+        <p14:creationId xmlns:p14="http://schemas.microsoft.com/office/powerpoint/2010/main" val="3094605481"/>
+      </p:ext>
+    </p:extLst>
+  </p:cSld>
+  <p:clrMapOvr>
+    <a:masterClrMapping/>
+  </p:clrMapOvr>
+</p:notes>
+</file>
+
+<file path=ppt/notesSlides/notesSlide8.xml><?xml version="1.0" encoding="utf-8"?>
 <p:notes xmlns:a="http://schemas.openxmlformats.org/drawingml/2006/main" xmlns:r="http://schemas.openxmlformats.org/officeDocument/2006/relationships" xmlns:p="http://schemas.openxmlformats.org/presentationml/2006/main">
   <p:cSld>
     <p:spTree>
@@ -1171,14 +1573,16 @@
         </p:nvSpPr>
         <p:spPr/>
         <p:txBody>
-          <a:bodyPr>
-            <a:normAutofit lnSpcReduction="10000"/>
-          </a:bodyPr>
+          <a:bodyPr/>
           <a:lstStyle/>
           <a:p>
-            <a:r>
-              <a:rPr lang="en-US" dirty="0"/>
-              <a:t>How labels &amp; selectors work here:</a:t>
+            <a:pPr marL="0" indent="0">
+              <a:buFontTx/>
+              <a:buNone/>
+            </a:pPr>
+            <a:r>
+              <a:rPr lang="en-US" dirty="0"/>
+              <a:t>Explain deployments in a demo</a:t>
             </a:r>
           </a:p>
           <a:p>
@@ -1188,7 +1592,15 @@
             </a:pPr>
             <a:r>
               <a:rPr lang="en-US" dirty="0"/>
-              <a:t>Names of pods can change</a:t>
+              <a:t>Use the “</a:t>
+            </a:r>
+            <a:r>
+              <a:rPr lang="en-US" dirty="0" err="1"/>
+              <a:t>kubectl</a:t>
+            </a:r>
+            <a:r>
+              <a:rPr lang="en-US" dirty="0"/>
+              <a:t> run” command to create a deployment</a:t>
             </a:r>
           </a:p>
           <a:p>
@@ -1198,11 +1610,7 @@
             </a:pPr>
             <a:r>
               <a:rPr lang="en-US" dirty="0"/>
-              <a:t>Labels stay</a:t>
-            </a:r>
-            <a:r>
-              <a:rPr lang="en-US" baseline="0" dirty="0"/>
-              <a:t> the same</a:t>
+              <a:t>Show the replica set with labels</a:t>
             </a:r>
           </a:p>
           <a:p>
@@ -1211,16 +1619,82 @@
               <a:buChar char="-"/>
             </a:pPr>
             <a:r>
-              <a:rPr lang="en-US" baseline="0" dirty="0"/>
-              <a:t>Only with labels pods related to </a:t>
-            </a:r>
-            <a:r>
-              <a:rPr lang="en-US" baseline="0" dirty="0" err="1"/>
-              <a:t>rs</a:t>
-            </a:r>
-            <a:r>
-              <a:rPr lang="en-US" baseline="0" dirty="0"/>
-              <a:t>/deployment can be determined reliably</a:t>
+              <a:rPr lang="en-US" dirty="0"/>
+              <a:t>Point out that the replica set is a “hidden” component used to manage pods &amp; generations. A user should not interact directly with a replica set</a:t>
+            </a:r>
+          </a:p>
+          <a:p>
+            <a:pPr marL="285750" indent="-285750">
+              <a:buFontTx/>
+              <a:buChar char="-"/>
+            </a:pPr>
+            <a:r>
+              <a:rPr lang="en-US" dirty="0"/>
+              <a:t>Scale up (</a:t>
+            </a:r>
+            <a:r>
+              <a:rPr lang="en-US" dirty="0" err="1"/>
+              <a:t>kubectl</a:t>
+            </a:r>
+            <a:r>
+              <a:rPr lang="en-US" dirty="0"/>
+              <a:t> scale </a:t>
+            </a:r>
+            <a:r>
+              <a:rPr lang="en-US" dirty="0" err="1"/>
+              <a:t>deployment|replicaset</a:t>
+            </a:r>
+            <a:r>
+              <a:rPr lang="en-US" dirty="0"/>
+              <a:t> &lt;name&gt; --replicas=5)</a:t>
+            </a:r>
+          </a:p>
+          <a:p>
+            <a:pPr marL="465750" lvl="1" indent="-285750">
+              <a:buFontTx/>
+              <a:buChar char="-"/>
+            </a:pPr>
+            <a:r>
+              <a:rPr lang="en-US" dirty="0"/>
+              <a:t>Scale up the replica set &amp; show pods -&gt; replica set is managed by deployment and thus overruled. </a:t>
+            </a:r>
+          </a:p>
+          <a:p>
+            <a:pPr marL="465750" lvl="1" indent="-285750">
+              <a:buFontTx/>
+              <a:buChar char="-"/>
+            </a:pPr>
+            <a:r>
+              <a:rPr lang="en-US" dirty="0"/>
+              <a:t>Scale up the deployment</a:t>
+            </a:r>
+          </a:p>
+          <a:p>
+            <a:pPr marL="285750" indent="-285750">
+              <a:buFontTx/>
+              <a:buChar char="-"/>
+            </a:pPr>
+            <a:r>
+              <a:rPr lang="en-US" dirty="0"/>
+              <a:t>Show the pods with labels</a:t>
+            </a:r>
+          </a:p>
+          <a:p>
+            <a:pPr marL="285750" indent="-285750">
+              <a:buFontTx/>
+              <a:buChar char="-"/>
+            </a:pPr>
+            <a:r>
+              <a:rPr lang="en-US" dirty="0"/>
+              <a:t>Delete a pod &amp; in parallel “watch </a:t>
+            </a:r>
+            <a:r>
+              <a:rPr lang="en-US" dirty="0" err="1"/>
+              <a:t>kubectl</a:t>
+            </a:r>
+            <a:r>
+              <a:rPr lang="en-US" dirty="0"/>
+              <a:t> get pods” to monitor the creation/deletion of pods</a:t>
             </a:r>
           </a:p>
           <a:p>
@@ -1231,24 +1705,13 @@
             <a:endParaRPr lang="en-US" dirty="0"/>
           </a:p>
           <a:p>
-            <a:r>
-              <a:rPr lang="en-US" dirty="0"/>
-              <a:t>Why deployments?</a:t>
-            </a:r>
-          </a:p>
-          <a:p>
-            <a:r>
-              <a:rPr lang="en-US" dirty="0"/>
-              <a:t>You don’t want to know and manage individual pods. You would like to specify a template and instantiate it as often as you wish. Also you want to manage the group of pods e.g. in terms of docker image used.</a:t>
-            </a:r>
-          </a:p>
-          <a:p>
-            <a:endParaRPr lang="en-US" dirty="0"/>
-          </a:p>
-          <a:p>
-            <a:r>
-              <a:rPr lang="en-US" dirty="0"/>
-              <a:t>The deployment gives you these management capabilities. In it’s resource description (</a:t>
+            <a:pPr marL="0" indent="0">
+              <a:buFontTx/>
+              <a:buNone/>
+            </a:pPr>
+            <a:r>
+              <a:rPr lang="en-US" dirty="0"/>
+              <a:t>Don’t forget to mention that a deployment can be created also from </a:t>
             </a:r>
             <a:r>
               <a:rPr lang="en-US" dirty="0" err="1"/>
@@ -1256,58 +1719,20 @@
             </a:r>
             <a:r>
               <a:rPr lang="en-US" dirty="0"/>
-              <a:t> file) you specify a pod template, how pods should be labeled and of course a corresponding selector to identify your pods.</a:t>
-            </a:r>
-          </a:p>
-          <a:p>
-            <a:r>
-              <a:rPr lang="en-US" dirty="0"/>
-              <a:t>On cluster level the deployment creates &amp; manages a replica set which then manages the pods. </a:t>
-            </a:r>
-          </a:p>
-          <a:p>
-            <a:r>
-              <a:rPr lang="en-US" dirty="0"/>
-              <a:t>If you update the number of replicas, this will be sent to the </a:t>
-            </a:r>
-            <a:r>
-              <a:rPr lang="en-US" dirty="0" err="1"/>
-              <a:t>replicaSet</a:t>
-            </a:r>
-            <a:r>
-              <a:rPr lang="en-US" dirty="0"/>
-              <a:t> and the desired state is enforced via the </a:t>
-            </a:r>
-            <a:r>
-              <a:rPr lang="en-US" dirty="0" err="1"/>
-              <a:t>replicaSet</a:t>
-            </a:r>
-            <a:r>
-              <a:rPr lang="en-US" dirty="0"/>
-              <a:t>. </a:t>
-            </a:r>
-          </a:p>
-          <a:p>
-            <a:r>
-              <a:rPr lang="en-US" dirty="0"/>
-              <a:t>Upon update of the image, a new </a:t>
-            </a:r>
-            <a:r>
-              <a:rPr lang="en-US" dirty="0" err="1"/>
-              <a:t>replicaSet</a:t>
-            </a:r>
-            <a:r>
-              <a:rPr lang="en-US" dirty="0"/>
-              <a:t> will be created and the old one will be set to replica=0. This way you can roll-back to your old </a:t>
-            </a:r>
-            <a:r>
-              <a:rPr lang="en-US" dirty="0" err="1"/>
-              <a:t>replicaSet</a:t>
-            </a:r>
-            <a:r>
-              <a:rPr lang="en-US" dirty="0"/>
-              <a:t> (by scaling it up again). </a:t>
-            </a:r>
+              <a:t> file (with way more options to customize -&gt; </a:t>
+            </a:r>
+            <a:r>
+              <a:rPr lang="en-US"/>
+              <a:t>like the labels).</a:t>
+            </a:r>
+            <a:endParaRPr lang="en-US" dirty="0"/>
+          </a:p>
+          <a:p>
+            <a:pPr marL="285750" indent="-285750">
+              <a:buFontTx/>
+              <a:buChar char="-"/>
+            </a:pPr>
+            <a:endParaRPr lang="en-US" dirty="0"/>
           </a:p>
         </p:txBody>
       </p:sp>
@@ -1329,7 +1754,7 @@
             <a:fld id="{7D8C2C35-2B8A-446E-BEC0-FD36716C29AC}" type="slidenum">
               <a:rPr lang="de-DE" smtClean="0"/>
               <a:pPr/>
-              <a:t>7</a:t>
+              <a:t>8</a:t>
             </a:fld>
             <a:endParaRPr lang="de-DE" dirty="0"/>
           </a:p>
@@ -1338,99 +1763,7 @@
     </p:spTree>
     <p:extLst>
       <p:ext uri="{BB962C8B-B14F-4D97-AF65-F5344CB8AC3E}">
-        <p14:creationId xmlns:p14="http://schemas.microsoft.com/office/powerpoint/2010/main" val="2647646029"/>
-      </p:ext>
-    </p:extLst>
-  </p:cSld>
-  <p:clrMapOvr>
-    <a:masterClrMapping/>
-  </p:clrMapOvr>
-</p:notes>
-</file>
-
-<file path=ppt/notesSlides/notesSlide8.xml><?xml version="1.0" encoding="utf-8"?>
-<p:notes xmlns:a="http://schemas.openxmlformats.org/drawingml/2006/main" xmlns:r="http://schemas.openxmlformats.org/officeDocument/2006/relationships" xmlns:p="http://schemas.openxmlformats.org/presentationml/2006/main">
-  <p:cSld>
-    <p:spTree>
-      <p:nvGrpSpPr>
-        <p:cNvPr id="1" name=""/>
-        <p:cNvGrpSpPr/>
-        <p:nvPr/>
-      </p:nvGrpSpPr>
-      <p:grpSpPr>
-        <a:xfrm>
-          <a:off x="0" y="0"/>
-          <a:ext cx="0" cy="0"/>
-          <a:chOff x="0" y="0"/>
-          <a:chExt cx="0" cy="0"/>
-        </a:xfrm>
-      </p:grpSpPr>
-      <p:sp>
-        <p:nvSpPr>
-          <p:cNvPr id="4" name="Slide Number Placeholder 3"/>
-          <p:cNvSpPr>
-            <a:spLocks noGrp="1"/>
-          </p:cNvSpPr>
-          <p:nvPr>
-            <p:ph type="sldNum" sz="quarter" idx="10"/>
-          </p:nvPr>
-        </p:nvSpPr>
-        <p:spPr/>
-        <p:txBody>
-          <a:bodyPr/>
-          <a:lstStyle/>
-          <a:p>
-            <a:fld id="{7D8C2C35-2B8A-446E-BEC0-FD36716C29AC}" type="slidenum">
-              <a:rPr lang="de-DE" smtClean="0"/>
-              <a:pPr/>
-              <a:t>8</a:t>
-            </a:fld>
-            <a:endParaRPr lang="de-DE" dirty="0"/>
-          </a:p>
-        </p:txBody>
-      </p:sp>
-      <p:sp>
-        <p:nvSpPr>
-          <p:cNvPr id="9" name="Slide Image Placeholder 8"/>
-          <p:cNvSpPr>
-            <a:spLocks noGrp="1" noRot="1" noChangeAspect="1"/>
-          </p:cNvSpPr>
-          <p:nvPr>
-            <p:ph type="sldImg"/>
-          </p:nvPr>
-        </p:nvSpPr>
-        <p:spPr>
-          <a:xfrm>
-            <a:off x="547688" y="612775"/>
-            <a:ext cx="5762625" cy="3241675"/>
-          </a:xfrm>
-        </p:spPr>
-      </p:sp>
-      <p:sp>
-        <p:nvSpPr>
-          <p:cNvPr id="10" name="Notes Placeholder 9"/>
-          <p:cNvSpPr>
-            <a:spLocks noGrp="1"/>
-          </p:cNvSpPr>
-          <p:nvPr>
-            <p:ph type="body" idx="1"/>
-          </p:nvPr>
-        </p:nvSpPr>
-        <p:spPr/>
-        <p:txBody>
-          <a:bodyPr>
-            <a:normAutofit/>
-          </a:bodyPr>
-          <a:lstStyle/>
-          <a:p>
-            <a:endParaRPr lang="en-US" dirty="0"/>
-          </a:p>
-        </p:txBody>
-      </p:sp>
-    </p:spTree>
-    <p:extLst>
-      <p:ext uri="{BB962C8B-B14F-4D97-AF65-F5344CB8AC3E}">
-        <p14:creationId xmlns:p14="http://schemas.microsoft.com/office/powerpoint/2010/main" val="3094605481"/>
+        <p14:creationId xmlns:p14="http://schemas.microsoft.com/office/powerpoint/2010/main" val="3805946316"/>
       </p:ext>
     </p:extLst>
   </p:cSld>
@@ -11119,7 +11452,7 @@
             <a:spLocks noGrp="1"/>
           </p:cNvSpPr>
           <p:nvPr>
-            <p:ph type="ctrTitle"/>
+            <p:ph type="title"/>
           </p:nvPr>
         </p:nvSpPr>
         <p:spPr/>
@@ -11134,10 +11467,40 @@
           </a:p>
         </p:txBody>
       </p:sp>
+      <p:pic>
+        <p:nvPicPr>
+          <p:cNvPr id="4" name="Picture 3">
+            <a:extLst>
+              <a:ext uri="{FF2B5EF4-FFF2-40B4-BE49-F238E27FC236}">
+                <a16:creationId xmlns:a16="http://schemas.microsoft.com/office/drawing/2014/main" id="{667C7630-D1BA-44ED-BD0C-E0F24DE56B91}"/>
+              </a:ext>
+            </a:extLst>
+          </p:cNvPr>
+          <p:cNvPicPr>
+            <a:picLocks noChangeAspect="1"/>
+          </p:cNvPicPr>
+          <p:nvPr/>
+        </p:nvPicPr>
+        <p:blipFill>
+          <a:blip r:embed="rId3"/>
+          <a:stretch>
+            <a:fillRect/>
+          </a:stretch>
+        </p:blipFill>
+        <p:spPr>
+          <a:xfrm>
+            <a:off x="3849419" y="1181180"/>
+            <a:ext cx="4495640" cy="4495640"/>
+          </a:xfrm>
+          <a:prstGeom prst="rect">
+            <a:avLst/>
+          </a:prstGeom>
+        </p:spPr>
+      </p:pic>
     </p:spTree>
     <p:extLst>
       <p:ext uri="{BB962C8B-B14F-4D97-AF65-F5344CB8AC3E}">
-        <p14:creationId xmlns:p14="http://schemas.microsoft.com/office/powerpoint/2010/main" val="1080792618"/>
+        <p14:creationId xmlns:p14="http://schemas.microsoft.com/office/powerpoint/2010/main" val="1961122541"/>
       </p:ext>
     </p:extLst>
   </p:cSld>
@@ -11148,104 +11511,6 @@
 </file>
 
 <file path=ppt/slides/slide6.xml><?xml version="1.0" encoding="utf-8"?>
-<p:sld xmlns:a="http://schemas.openxmlformats.org/drawingml/2006/main" xmlns:r="http://schemas.openxmlformats.org/officeDocument/2006/relationships" xmlns:p="http://schemas.openxmlformats.org/presentationml/2006/main" show="0">
-  <p:cSld>
-    <p:spTree>
-      <p:nvGrpSpPr>
-        <p:cNvPr id="1" name=""/>
-        <p:cNvGrpSpPr/>
-        <p:nvPr/>
-      </p:nvGrpSpPr>
-      <p:grpSpPr>
-        <a:xfrm>
-          <a:off x="0" y="0"/>
-          <a:ext cx="0" cy="0"/>
-          <a:chOff x="0" y="0"/>
-          <a:chExt cx="0" cy="0"/>
-        </a:xfrm>
-      </p:grpSpPr>
-      <p:sp>
-        <p:nvSpPr>
-          <p:cNvPr id="4" name="Text Placeholder 3"/>
-          <p:cNvSpPr>
-            <a:spLocks noGrp="1"/>
-          </p:cNvSpPr>
-          <p:nvPr>
-            <p:ph type="body" sz="quarter" idx="10"/>
-          </p:nvPr>
-        </p:nvSpPr>
-        <p:spPr/>
-        <p:txBody>
-          <a:bodyPr/>
-          <a:lstStyle/>
-          <a:p>
-            <a:pPr marL="342900" indent="-342900">
-              <a:buFontTx/>
-              <a:buChar char="-"/>
-            </a:pPr>
-            <a:r>
-              <a:rPr lang="en-US" dirty="0"/>
-              <a:t>Show labels of node pools</a:t>
-            </a:r>
-          </a:p>
-          <a:p>
-            <a:pPr marL="342900" indent="-342900">
-              <a:buFontTx/>
-              <a:buChar char="-"/>
-            </a:pPr>
-            <a:r>
-              <a:rPr lang="en-US" dirty="0"/>
-              <a:t>Label a pod that was created before</a:t>
-            </a:r>
-          </a:p>
-          <a:p>
-            <a:pPr marL="342900" indent="-342900">
-              <a:buFontTx/>
-              <a:buChar char="-"/>
-            </a:pPr>
-            <a:r>
-              <a:rPr lang="en-US" dirty="0"/>
-              <a:t>Query with labels</a:t>
-            </a:r>
-          </a:p>
-        </p:txBody>
-      </p:sp>
-      <p:sp>
-        <p:nvSpPr>
-          <p:cNvPr id="3" name="Title 2"/>
-          <p:cNvSpPr>
-            <a:spLocks noGrp="1"/>
-          </p:cNvSpPr>
-          <p:nvPr>
-            <p:ph type="title"/>
-          </p:nvPr>
-        </p:nvSpPr>
-        <p:spPr/>
-        <p:txBody>
-          <a:bodyPr/>
-          <a:lstStyle/>
-          <a:p>
-            <a:r>
-              <a:rPr lang="en-US" dirty="0"/>
-              <a:t>Demo</a:t>
-            </a:r>
-          </a:p>
-        </p:txBody>
-      </p:sp>
-    </p:spTree>
-    <p:extLst>
-      <p:ext uri="{BB962C8B-B14F-4D97-AF65-F5344CB8AC3E}">
-        <p14:creationId xmlns:p14="http://schemas.microsoft.com/office/powerpoint/2010/main" val="2107498412"/>
-      </p:ext>
-    </p:extLst>
-  </p:cSld>
-  <p:clrMapOvr>
-    <a:masterClrMapping/>
-  </p:clrMapOvr>
-</p:sld>
-</file>
-
-<file path=ppt/slides/slide7.xml><?xml version="1.0" encoding="utf-8"?>
 <p:sld xmlns:a="http://schemas.openxmlformats.org/drawingml/2006/main" xmlns:r="http://schemas.openxmlformats.org/officeDocument/2006/relationships" xmlns:p="http://schemas.openxmlformats.org/presentationml/2006/main">
   <p:cSld>
     <p:spTree>
@@ -12407,7 +12672,7 @@
 </p:sld>
 </file>
 
-<file path=ppt/slides/slide8.xml><?xml version="1.0" encoding="utf-8"?>
+<file path=ppt/slides/slide7.xml><?xml version="1.0" encoding="utf-8"?>
 <p:sld xmlns:a="http://schemas.openxmlformats.org/drawingml/2006/main" xmlns:r="http://schemas.openxmlformats.org/officeDocument/2006/relationships" xmlns:p="http://schemas.openxmlformats.org/presentationml/2006/main">
   <p:cSld>
     <p:spTree>
@@ -12704,6 +12969,88 @@
 </p:sld>
 </file>
 
+<file path=ppt/slides/slide8.xml><?xml version="1.0" encoding="utf-8"?>
+<p:sld xmlns:a="http://schemas.openxmlformats.org/drawingml/2006/main" xmlns:r="http://schemas.openxmlformats.org/officeDocument/2006/relationships" xmlns:p="http://schemas.openxmlformats.org/presentationml/2006/main">
+  <p:cSld>
+    <p:spTree>
+      <p:nvGrpSpPr>
+        <p:cNvPr id="1" name=""/>
+        <p:cNvGrpSpPr/>
+        <p:nvPr/>
+      </p:nvGrpSpPr>
+      <p:grpSpPr>
+        <a:xfrm>
+          <a:off x="0" y="0"/>
+          <a:ext cx="0" cy="0"/>
+          <a:chOff x="0" y="0"/>
+          <a:chExt cx="0" cy="0"/>
+        </a:xfrm>
+      </p:grpSpPr>
+      <p:sp>
+        <p:nvSpPr>
+          <p:cNvPr id="3" name="Title 2"/>
+          <p:cNvSpPr>
+            <a:spLocks noGrp="1"/>
+          </p:cNvSpPr>
+          <p:nvPr>
+            <p:ph type="title"/>
+          </p:nvPr>
+        </p:nvSpPr>
+        <p:spPr/>
+        <p:txBody>
+          <a:bodyPr/>
+          <a:lstStyle/>
+          <a:p>
+            <a:r>
+              <a:rPr lang="en-US" dirty="0"/>
+              <a:t>Demo</a:t>
+            </a:r>
+          </a:p>
+        </p:txBody>
+      </p:sp>
+      <p:pic>
+        <p:nvPicPr>
+          <p:cNvPr id="4" name="Picture 3">
+            <a:extLst>
+              <a:ext uri="{FF2B5EF4-FFF2-40B4-BE49-F238E27FC236}">
+                <a16:creationId xmlns:a16="http://schemas.microsoft.com/office/drawing/2014/main" id="{667C7630-D1BA-44ED-BD0C-E0F24DE56B91}"/>
+              </a:ext>
+            </a:extLst>
+          </p:cNvPr>
+          <p:cNvPicPr>
+            <a:picLocks noChangeAspect="1"/>
+          </p:cNvPicPr>
+          <p:nvPr/>
+        </p:nvPicPr>
+        <p:blipFill>
+          <a:blip r:embed="rId3"/>
+          <a:stretch>
+            <a:fillRect/>
+          </a:stretch>
+        </p:blipFill>
+        <p:spPr>
+          <a:xfrm>
+            <a:off x="3849419" y="1181180"/>
+            <a:ext cx="4495640" cy="4495640"/>
+          </a:xfrm>
+          <a:prstGeom prst="rect">
+            <a:avLst/>
+          </a:prstGeom>
+        </p:spPr>
+      </p:pic>
+    </p:spTree>
+    <p:extLst>
+      <p:ext uri="{BB962C8B-B14F-4D97-AF65-F5344CB8AC3E}">
+        <p14:creationId xmlns:p14="http://schemas.microsoft.com/office/powerpoint/2010/main" val="1236872799"/>
+      </p:ext>
+    </p:extLst>
+  </p:cSld>
+  <p:clrMapOvr>
+    <a:masterClrMapping/>
+  </p:clrMapOvr>
+</p:sld>
+</file>
+
 <file path=ppt/slides/slide9.xml><?xml version="1.0" encoding="utf-8"?>
 <p:sld xmlns:a="http://schemas.openxmlformats.org/drawingml/2006/main" xmlns:r="http://schemas.openxmlformats.org/officeDocument/2006/relationships" xmlns:p="http://schemas.openxmlformats.org/presentationml/2006/main">
   <p:cSld>
@@ -12738,7 +13085,7 @@
           <a:p>
             <a:r>
               <a:rPr lang="en-US" dirty="0"/>
-              <a:t>What YOU will do during the next exercise…</a:t>
+              <a:t>What YOU will do in exercise #03</a:t>
             </a:r>
           </a:p>
         </p:txBody>

</xml_diff>

<commit_message>
bit more complex example for label name
</commit_message>
<xml_diff>
--- a/kubernetes/03_labels_and_deployments.pptx
+++ b/kubernetes/03_labels_and_deployments.pptx
@@ -664,7 +664,7 @@
           <a:p>
             <a:r>
               <a:rPr lang="en-US" dirty="0"/>
-              <a:t>Basically, labels are (DNS compatible) free-text, </a:t>
+              <a:t>Basically, labels are </a:t>
             </a:r>
             <a:r>
               <a:rPr lang="en-US" b="1" dirty="0"/>
@@ -672,7 +672,7 @@
             </a:r>
             <a:r>
               <a:rPr lang="en-US" dirty="0"/>
-              <a:t>and you can attach them to almost everything in Kubernetes. Labels are part of the metadata-section of a resource description and of course you can attach multiple labels to one resource.</a:t>
+              <a:t>and you can attach them to almost everything in Kubernetes. Keys can have a prefix separated by “/”. The parts of the key must be DNS compatible names. Labels are part of the metadata-section of a resource description and of course you can attach multiple labels to one resource.</a:t>
             </a:r>
           </a:p>
           <a:p>
@@ -1719,13 +1719,8 @@
             </a:r>
             <a:r>
               <a:rPr lang="en-US" dirty="0"/>
-              <a:t> file (with way more options to customize -&gt; </a:t>
-            </a:r>
-            <a:r>
-              <a:rPr lang="en-US"/>
-              <a:t>like the labels).</a:t>
-            </a:r>
-            <a:endParaRPr lang="en-US" dirty="0"/>
+              <a:t> file (with way more options to customize -&gt; like the labels).</a:t>
+            </a:r>
           </a:p>
           <a:p>
             <a:pPr marL="285750" indent="-285750">
@@ -9870,6 +9865,29 @@
             </a:r>
             <a:r>
               <a:rPr lang="en-US" dirty="0"/>
+              <a:t>”, </a:t>
+            </a:r>
+            <a:br>
+              <a:rPr lang="en-US" dirty="0"/>
+            </a:br>
+            <a:r>
+              <a:rPr lang="en-US" dirty="0"/>
+              <a:t>“</a:t>
+            </a:r>
+            <a:r>
+              <a:rPr lang="en-US" dirty="0" err="1"/>
+              <a:t>com.sap</a:t>
+            </a:r>
+            <a:r>
+              <a:rPr lang="en-US" dirty="0"/>
+              <a:t>/product-name”:”</a:t>
+            </a:r>
+            <a:r>
+              <a:rPr lang="en-US" dirty="0" err="1"/>
+              <a:t>hana</a:t>
+            </a:r>
+            <a:r>
+              <a:rPr lang="en-US" dirty="0"/>
               <a:t>”</a:t>
             </a:r>
           </a:p>
@@ -10693,93 +10711,6 @@
       </p:sp>
       <p:sp>
         <p:nvSpPr>
-          <p:cNvPr id="9" name="Rectangle 8"/>
-          <p:cNvSpPr/>
-          <p:nvPr/>
-        </p:nvSpPr>
-        <p:spPr bwMode="gray">
-          <a:xfrm>
-            <a:off x="7186728" y="4012361"/>
-            <a:ext cx="1645920" cy="365760"/>
-          </a:xfrm>
-          <a:prstGeom prst="rect">
-            <a:avLst/>
-          </a:prstGeom>
-          <a:ln>
-            <a:headEnd/>
-            <a:tailEnd/>
-          </a:ln>
-        </p:spPr>
-        <p:style>
-          <a:lnRef idx="2">
-            <a:schemeClr val="accent2"/>
-          </a:lnRef>
-          <a:fillRef idx="1">
-            <a:schemeClr val="lt1"/>
-          </a:fillRef>
-          <a:effectRef idx="0">
-            <a:schemeClr val="accent2"/>
-          </a:effectRef>
-          <a:fontRef idx="minor">
-            <a:schemeClr val="dk1"/>
-          </a:fontRef>
-        </p:style>
-        <p:txBody>
-          <a:bodyPr lIns="90000" tIns="72000" rIns="90000" bIns="72000" rtlCol="0" anchor="ctr"/>
-          <a:lstStyle/>
-          <a:p>
-            <a:pPr marR="0" algn="ctr" defTabSz="914400" eaLnBrk="1" fontAlgn="base" latinLnBrk="0" hangingPunct="1">
-              <a:lnSpc>
-                <a:spcPct val="100000"/>
-              </a:lnSpc>
-              <a:spcBef>
-                <a:spcPct val="50000"/>
-              </a:spcBef>
-              <a:spcAft>
-                <a:spcPct val="0"/>
-              </a:spcAft>
-              <a:buClr>
-                <a:srgbClr val="F0AB00"/>
-              </a:buClr>
-              <a:buSzPct val="80000"/>
-              <a:tabLst/>
-            </a:pPr>
-            <a:r>
-              <a:rPr lang="de-DE" sz="1800" kern="0" dirty="0" err="1">
-                <a:ea typeface="Arial Unicode MS" pitchFamily="34" charset="-128"/>
-                <a:cs typeface="Arial Unicode MS" pitchFamily="34" charset="-128"/>
-              </a:rPr>
-              <a:t>app</a:t>
-            </a:r>
-            <a:r>
-              <a:rPr lang="de-DE" sz="1800" kern="0" dirty="0">
-                <a:ea typeface="Arial Unicode MS" pitchFamily="34" charset="-128"/>
-                <a:cs typeface="Arial Unicode MS" pitchFamily="34" charset="-128"/>
-              </a:rPr>
-              <a:t>: </a:t>
-            </a:r>
-            <a:r>
-              <a:rPr lang="de-DE" sz="1800" kern="0" dirty="0" err="1">
-                <a:ea typeface="Arial Unicode MS" pitchFamily="34" charset="-128"/>
-                <a:cs typeface="Arial Unicode MS" pitchFamily="34" charset="-128"/>
-              </a:rPr>
-              <a:t>nginx</a:t>
-            </a:r>
-            <a:endParaRPr kumimoji="0" lang="de-DE" sz="1800" b="0" i="0" u="none" strike="noStrike" kern="0" cap="none" spc="0" normalizeH="0" baseline="0" noProof="0" dirty="0">
-              <a:ln>
-                <a:noFill/>
-              </a:ln>
-              <a:effectLst/>
-              <a:uLnTx/>
-              <a:uFillTx/>
-              <a:ea typeface="Arial Unicode MS" pitchFamily="34" charset="-128"/>
-              <a:cs typeface="Arial Unicode MS" pitchFamily="34" charset="-128"/>
-            </a:endParaRPr>
-          </a:p>
-        </p:txBody>
-      </p:sp>
-      <p:sp>
-        <p:nvSpPr>
           <p:cNvPr id="10" name="Flowchart: Document 9"/>
           <p:cNvSpPr/>
           <p:nvPr/>
@@ -10918,6 +10849,93 @@
               <a:t>Pod</a:t>
             </a:r>
             <a:endParaRPr kumimoji="0" lang="de-DE" sz="1600" b="1" i="0" u="none" strike="noStrike" kern="0" cap="none" spc="0" normalizeH="0" baseline="0" noProof="0" dirty="0">
+              <a:ln>
+                <a:noFill/>
+              </a:ln>
+              <a:effectLst/>
+              <a:uLnTx/>
+              <a:uFillTx/>
+              <a:ea typeface="Arial Unicode MS" pitchFamily="34" charset="-128"/>
+              <a:cs typeface="Arial Unicode MS" pitchFamily="34" charset="-128"/>
+            </a:endParaRPr>
+          </a:p>
+        </p:txBody>
+      </p:sp>
+      <p:sp>
+        <p:nvSpPr>
+          <p:cNvPr id="9" name="Rectangle 8"/>
+          <p:cNvSpPr/>
+          <p:nvPr/>
+        </p:nvSpPr>
+        <p:spPr bwMode="gray">
+          <a:xfrm>
+            <a:off x="7186728" y="4012361"/>
+            <a:ext cx="1645920" cy="365760"/>
+          </a:xfrm>
+          <a:prstGeom prst="rect">
+            <a:avLst/>
+          </a:prstGeom>
+          <a:ln>
+            <a:headEnd/>
+            <a:tailEnd/>
+          </a:ln>
+        </p:spPr>
+        <p:style>
+          <a:lnRef idx="2">
+            <a:schemeClr val="accent2"/>
+          </a:lnRef>
+          <a:fillRef idx="1">
+            <a:schemeClr val="lt1"/>
+          </a:fillRef>
+          <a:effectRef idx="0">
+            <a:schemeClr val="accent2"/>
+          </a:effectRef>
+          <a:fontRef idx="minor">
+            <a:schemeClr val="dk1"/>
+          </a:fontRef>
+        </p:style>
+        <p:txBody>
+          <a:bodyPr lIns="90000" tIns="72000" rIns="90000" bIns="72000" rtlCol="0" anchor="ctr"/>
+          <a:lstStyle/>
+          <a:p>
+            <a:pPr marR="0" algn="ctr" defTabSz="914400" eaLnBrk="1" fontAlgn="base" latinLnBrk="0" hangingPunct="1">
+              <a:lnSpc>
+                <a:spcPct val="100000"/>
+              </a:lnSpc>
+              <a:spcBef>
+                <a:spcPct val="50000"/>
+              </a:spcBef>
+              <a:spcAft>
+                <a:spcPct val="0"/>
+              </a:spcAft>
+              <a:buClr>
+                <a:srgbClr val="F0AB00"/>
+              </a:buClr>
+              <a:buSzPct val="80000"/>
+              <a:tabLst/>
+            </a:pPr>
+            <a:r>
+              <a:rPr lang="de-DE" sz="1800" kern="0" dirty="0" err="1">
+                <a:ea typeface="Arial Unicode MS" pitchFamily="34" charset="-128"/>
+                <a:cs typeface="Arial Unicode MS" pitchFamily="34" charset="-128"/>
+              </a:rPr>
+              <a:t>app</a:t>
+            </a:r>
+            <a:r>
+              <a:rPr lang="de-DE" sz="1800" kern="0" dirty="0">
+                <a:ea typeface="Arial Unicode MS" pitchFamily="34" charset="-128"/>
+                <a:cs typeface="Arial Unicode MS" pitchFamily="34" charset="-128"/>
+              </a:rPr>
+              <a:t>: </a:t>
+            </a:r>
+            <a:r>
+              <a:rPr lang="de-DE" sz="1800" kern="0" dirty="0" err="1">
+                <a:ea typeface="Arial Unicode MS" pitchFamily="34" charset="-128"/>
+                <a:cs typeface="Arial Unicode MS" pitchFamily="34" charset="-128"/>
+              </a:rPr>
+              <a:t>nginx</a:t>
+            </a:r>
+            <a:endParaRPr kumimoji="0" lang="de-DE" sz="1800" b="0" i="0" u="none" strike="noStrike" kern="0" cap="none" spc="0" normalizeH="0" baseline="0" noProof="0" dirty="0">
               <a:ln>
                 <a:noFill/>
               </a:ln>

</xml_diff>

<commit_message>
fix tipos and wrong char in slide notes
</commit_message>
<xml_diff>
--- a/kubernetes/03_labels_and_deployments.pptx
+++ b/kubernetes/03_labels_and_deployments.pptx
@@ -5,10 +5,10 @@
     <p:sldMasterId id="2147483733" r:id="rId1"/>
   </p:sldMasterIdLst>
   <p:notesMasterIdLst>
-    <p:notesMasterId r:id="rId12"/>
+    <p:notesMasterId r:id="rId14"/>
   </p:notesMasterIdLst>
   <p:handoutMasterIdLst>
-    <p:handoutMasterId r:id="rId13"/>
+    <p:handoutMasterId r:id="rId15"/>
   </p:handoutMasterIdLst>
   <p:sldIdLst>
     <p:sldId id="433" r:id="rId2"/>
@@ -20,7 +20,9 @@
     <p:sldId id="436" r:id="rId8"/>
     <p:sldId id="449" r:id="rId9"/>
     <p:sldId id="447" r:id="rId10"/>
-    <p:sldId id="265" r:id="rId11"/>
+    <p:sldId id="451" r:id="rId11"/>
+    <p:sldId id="450" r:id="rId12"/>
+    <p:sldId id="265" r:id="rId13"/>
   </p:sldIdLst>
   <p:sldSz cx="12195175" cy="6858000"/>
   <p:notesSz cx="6858000" cy="9144000"/>
@@ -609,6 +611,235 @@
 </p:notes>
 </file>
 
+<file path=ppt/notesSlides/notesSlide10.xml><?xml version="1.0" encoding="utf-8"?>
+<p:notes xmlns:a="http://schemas.openxmlformats.org/drawingml/2006/main" xmlns:r="http://schemas.openxmlformats.org/officeDocument/2006/relationships" xmlns:p="http://schemas.openxmlformats.org/presentationml/2006/main">
+  <p:cSld>
+    <p:spTree>
+      <p:nvGrpSpPr>
+        <p:cNvPr id="1" name=""/>
+        <p:cNvGrpSpPr/>
+        <p:nvPr/>
+      </p:nvGrpSpPr>
+      <p:grpSpPr>
+        <a:xfrm>
+          <a:off x="0" y="0"/>
+          <a:ext cx="0" cy="0"/>
+          <a:chOff x="0" y="0"/>
+          <a:chExt cx="0" cy="0"/>
+        </a:xfrm>
+      </p:grpSpPr>
+      <p:sp>
+        <p:nvSpPr>
+          <p:cNvPr id="2" name="Slide Image Placeholder 1"/>
+          <p:cNvSpPr>
+            <a:spLocks noGrp="1" noRot="1" noChangeAspect="1"/>
+          </p:cNvSpPr>
+          <p:nvPr>
+            <p:ph type="sldImg"/>
+          </p:nvPr>
+        </p:nvSpPr>
+        <p:spPr/>
+      </p:sp>
+      <p:sp>
+        <p:nvSpPr>
+          <p:cNvPr id="3" name="Notes Placeholder 2"/>
+          <p:cNvSpPr>
+            <a:spLocks noGrp="1"/>
+          </p:cNvSpPr>
+          <p:nvPr>
+            <p:ph type="body" idx="1"/>
+          </p:nvPr>
+        </p:nvSpPr>
+        <p:spPr/>
+        <p:txBody>
+          <a:bodyPr/>
+          <a:lstStyle/>
+          <a:p>
+            <a:r>
+              <a:rPr lang="en-US" dirty="0"/>
+              <a:t>Before actually talking about the deployment resource, we need to introduce one of the fundamental concepts of Kubernetes: labels &amp; selectors.</a:t>
+            </a:r>
+          </a:p>
+          <a:p>
+            <a:endParaRPr lang="en-US" dirty="0"/>
+          </a:p>
+          <a:p>
+            <a:r>
+              <a:rPr lang="en-US" dirty="0"/>
+              <a:t>Basically, labels are </a:t>
+            </a:r>
+            <a:r>
+              <a:rPr lang="en-US" b="1" dirty="0"/>
+              <a:t>key-value pairs </a:t>
+            </a:r>
+            <a:r>
+              <a:rPr lang="en-US" dirty="0"/>
+              <a:t>and you can attach them to almost everything in Kubernetes. Keys can have a prefix separated by “/”. The parts of the key must be DNS compatible names. Labels are part of the metadata-section of a resource description and of course you can attach multiple labels to one resource.</a:t>
+            </a:r>
+          </a:p>
+          <a:p>
+            <a:endParaRPr lang="en-US" dirty="0"/>
+          </a:p>
+          <a:p>
+            <a:r>
+              <a:rPr lang="en-US" dirty="0"/>
+              <a:t>But what are labels good for, if there is no selection mechanism to evaluate them? Kubernetes label selectors are the answer to this questions.</a:t>
+            </a:r>
+          </a:p>
+          <a:p>
+            <a:endParaRPr lang="en-US" dirty="0"/>
+          </a:p>
+          <a:p>
+            <a:r>
+              <a:rPr lang="en-US" dirty="0"/>
+              <a:t>Selectors can be used in </a:t>
+            </a:r>
+            <a:r>
+              <a:rPr lang="en-US" dirty="0" err="1"/>
+              <a:t>kubectl</a:t>
+            </a:r>
+            <a:r>
+              <a:rPr lang="en-US" dirty="0"/>
+              <a:t> queries but also as part of resource definitions to define dependencies or even hierarchies of managed objects.</a:t>
+            </a:r>
+          </a:p>
+          <a:p>
+            <a:r>
+              <a:rPr lang="en-US" dirty="0"/>
+              <a:t>Mostly the selectors are part of the resource’s spec sections.</a:t>
+            </a:r>
+          </a:p>
+        </p:txBody>
+      </p:sp>
+      <p:sp>
+        <p:nvSpPr>
+          <p:cNvPr id="4" name="Slide Number Placeholder 3"/>
+          <p:cNvSpPr>
+            <a:spLocks noGrp="1"/>
+          </p:cNvSpPr>
+          <p:nvPr>
+            <p:ph type="sldNum" sz="quarter" idx="10"/>
+          </p:nvPr>
+        </p:nvSpPr>
+        <p:spPr/>
+        <p:txBody>
+          <a:bodyPr/>
+          <a:lstStyle/>
+          <a:p>
+            <a:fld id="{7D8C2C35-2B8A-446E-BEC0-FD36716C29AC}" type="slidenum">
+              <a:rPr lang="de-DE" smtClean="0"/>
+              <a:pPr/>
+              <a:t>11</a:t>
+            </a:fld>
+            <a:endParaRPr lang="de-DE" dirty="0"/>
+          </a:p>
+        </p:txBody>
+      </p:sp>
+    </p:spTree>
+    <p:extLst>
+      <p:ext uri="{BB962C8B-B14F-4D97-AF65-F5344CB8AC3E}">
+        <p14:creationId xmlns:p14="http://schemas.microsoft.com/office/powerpoint/2010/main" val="3157898280"/>
+      </p:ext>
+    </p:extLst>
+  </p:cSld>
+  <p:clrMapOvr>
+    <a:masterClrMapping/>
+  </p:clrMapOvr>
+</p:notes>
+</file>
+
+<file path=ppt/notesSlides/notesSlide11.xml><?xml version="1.0" encoding="utf-8"?>
+<p:notes xmlns:a="http://schemas.openxmlformats.org/drawingml/2006/main" xmlns:r="http://schemas.openxmlformats.org/officeDocument/2006/relationships" xmlns:p="http://schemas.openxmlformats.org/presentationml/2006/main">
+  <p:cSld>
+    <p:spTree>
+      <p:nvGrpSpPr>
+        <p:cNvPr id="1" name=""/>
+        <p:cNvGrpSpPr/>
+        <p:nvPr/>
+      </p:nvGrpSpPr>
+      <p:grpSpPr>
+        <a:xfrm>
+          <a:off x="0" y="0"/>
+          <a:ext cx="0" cy="0"/>
+          <a:chOff x="0" y="0"/>
+          <a:chExt cx="0" cy="0"/>
+        </a:xfrm>
+      </p:grpSpPr>
+      <p:sp>
+        <p:nvSpPr>
+          <p:cNvPr id="4" name="Slide Number Placeholder 3"/>
+          <p:cNvSpPr>
+            <a:spLocks noGrp="1"/>
+          </p:cNvSpPr>
+          <p:nvPr>
+            <p:ph type="sldNum" sz="quarter" idx="10"/>
+          </p:nvPr>
+        </p:nvSpPr>
+        <p:spPr/>
+        <p:txBody>
+          <a:bodyPr/>
+          <a:lstStyle/>
+          <a:p>
+            <a:fld id="{7D8C2C35-2B8A-446E-BEC0-FD36716C29AC}" type="slidenum">
+              <a:rPr lang="de-DE" smtClean="0"/>
+              <a:pPr/>
+              <a:t>12</a:t>
+            </a:fld>
+            <a:endParaRPr lang="de-DE" dirty="0"/>
+          </a:p>
+        </p:txBody>
+      </p:sp>
+      <p:sp>
+        <p:nvSpPr>
+          <p:cNvPr id="6" name="Slide Image Placeholder 5"/>
+          <p:cNvSpPr>
+            <a:spLocks noGrp="1" noRot="1" noChangeAspect="1"/>
+          </p:cNvSpPr>
+          <p:nvPr>
+            <p:ph type="sldImg"/>
+          </p:nvPr>
+        </p:nvSpPr>
+        <p:spPr>
+          <a:xfrm>
+            <a:off x="547688" y="612775"/>
+            <a:ext cx="5762625" cy="3241675"/>
+          </a:xfrm>
+        </p:spPr>
+      </p:sp>
+      <p:sp>
+        <p:nvSpPr>
+          <p:cNvPr id="7" name="Notes Placeholder 6"/>
+          <p:cNvSpPr>
+            <a:spLocks noGrp="1"/>
+          </p:cNvSpPr>
+          <p:nvPr>
+            <p:ph type="body" idx="1"/>
+          </p:nvPr>
+        </p:nvSpPr>
+        <p:spPr/>
+        <p:txBody>
+          <a:bodyPr>
+            <a:normAutofit/>
+          </a:bodyPr>
+          <a:lstStyle/>
+          <a:p>
+            <a:endParaRPr lang="en-US"/>
+          </a:p>
+        </p:txBody>
+      </p:sp>
+    </p:spTree>
+    <p:extLst>
+      <p:ext uri="{BB962C8B-B14F-4D97-AF65-F5344CB8AC3E}">
+        <p14:creationId xmlns:p14="http://schemas.microsoft.com/office/powerpoint/2010/main" val="2544264309"/>
+      </p:ext>
+    </p:extLst>
+  </p:cSld>
+  <p:clrMapOvr>
+    <a:masterClrMapping/>
+  </p:clrMapOvr>
+</p:notes>
+</file>
+
 <file path=ppt/notesSlides/notesSlide2.xml><?xml version="1.0" encoding="utf-8"?>
 <p:notes xmlns:a="http://schemas.openxmlformats.org/drawingml/2006/main" xmlns:r="http://schemas.openxmlformats.org/officeDocument/2006/relationships" xmlns:p="http://schemas.openxmlformats.org/presentationml/2006/main">
   <p:cSld>
@@ -792,7 +1023,15 @@
           <a:p>
             <a:r>
               <a:rPr lang="en-US" dirty="0"/>
-              <a:t>Labels are used to identify and bundle pods or nodes or any other resource, where it seem useful.</a:t>
+              <a:t>Labels are used to </a:t>
+            </a:r>
+            <a:r>
+              <a:rPr lang="en-US" b="1" dirty="0"/>
+              <a:t>identify and bundle</a:t>
+            </a:r>
+            <a:r>
+              <a:rPr lang="en-US" dirty="0"/>
+              <a:t> pods or nodes or any other resource, where it seem useful.</a:t>
             </a:r>
           </a:p>
           <a:p>
@@ -800,8 +1039,12 @@
           </a:p>
           <a:p>
             <a:r>
-              <a:rPr lang="en-US" dirty="0"/>
-              <a:t>Pod names are not reliable because they are usually generated. To identify a set of same pods, a label helps.</a:t>
+              <a:rPr lang="en-US" b="1" dirty="0"/>
+              <a:t>Pod names are not reliable</a:t>
+            </a:r>
+            <a:r>
+              <a:rPr lang="en-US" dirty="0"/>
+              <a:t> because they are usually generated. To identify a set of same pods, a label helps.</a:t>
             </a:r>
           </a:p>
         </p:txBody>
@@ -889,7 +1132,39 @@
           <a:p>
             <a:r>
               <a:rPr lang="en-US" dirty="0"/>
-              <a:t>As already said, labels are part of the metadata section and selectors usually occur in the spec sections.</a:t>
+              <a:t>As already said, </a:t>
+            </a:r>
+            <a:r>
+              <a:rPr lang="en-US" b="1" dirty="0"/>
+              <a:t>labels</a:t>
+            </a:r>
+            <a:r>
+              <a:rPr lang="en-US" dirty="0"/>
+              <a:t> are part of the </a:t>
+            </a:r>
+            <a:r>
+              <a:rPr lang="en-US" b="1" dirty="0"/>
+              <a:t>metadata section</a:t>
+            </a:r>
+            <a:r>
+              <a:rPr lang="en-US" dirty="0"/>
+              <a:t> and </a:t>
+            </a:r>
+            <a:r>
+              <a:rPr lang="en-US" b="1" dirty="0"/>
+              <a:t>selectors</a:t>
+            </a:r>
+            <a:r>
+              <a:rPr lang="en-US" dirty="0"/>
+              <a:t> usually occur in the </a:t>
+            </a:r>
+            <a:r>
+              <a:rPr lang="en-US" b="1" dirty="0"/>
+              <a:t>spec sections</a:t>
+            </a:r>
+            <a:r>
+              <a:rPr lang="en-US" dirty="0"/>
+              <a:t>.</a:t>
             </a:r>
           </a:p>
           <a:p>
@@ -1138,7 +1413,7 @@
             </a:r>
             <a:r>
               <a:rPr lang="en-US" dirty="0"/>
-              <a:t> get pods –n </a:t>
+              <a:t> get pods -n </a:t>
             </a:r>
             <a:r>
               <a:rPr lang="en-US" dirty="0" err="1"/>
@@ -1146,7 +1421,7 @@
             </a:r>
             <a:r>
               <a:rPr lang="en-US" dirty="0"/>
-              <a:t>-system –l component</a:t>
+              <a:t>-system -l component</a:t>
             </a:r>
           </a:p>
           <a:p>
@@ -1787,6 +2062,37 @@
       </p:grpSpPr>
       <p:sp>
         <p:nvSpPr>
+          <p:cNvPr id="2" name="Slide Image Placeholder 1"/>
+          <p:cNvSpPr>
+            <a:spLocks noGrp="1" noRot="1" noChangeAspect="1"/>
+          </p:cNvSpPr>
+          <p:nvPr>
+            <p:ph type="sldImg"/>
+          </p:nvPr>
+        </p:nvSpPr>
+        <p:spPr/>
+      </p:sp>
+      <p:sp>
+        <p:nvSpPr>
+          <p:cNvPr id="3" name="Notes Placeholder 2"/>
+          <p:cNvSpPr>
+            <a:spLocks noGrp="1"/>
+          </p:cNvSpPr>
+          <p:nvPr>
+            <p:ph type="body" idx="1"/>
+          </p:nvPr>
+        </p:nvSpPr>
+        <p:spPr/>
+        <p:txBody>
+          <a:bodyPr/>
+          <a:lstStyle/>
+          <a:p>
+            <a:endParaRPr lang="de-DE" dirty="0"/>
+          </a:p>
+        </p:txBody>
+      </p:sp>
+      <p:sp>
+        <p:nvSpPr>
           <p:cNvPr id="4" name="Slide Number Placeholder 3"/>
           <p:cNvSpPr>
             <a:spLocks noGrp="1"/>
@@ -1809,48 +2115,10 @@
           </a:p>
         </p:txBody>
       </p:sp>
-      <p:sp>
-        <p:nvSpPr>
-          <p:cNvPr id="6" name="Slide Image Placeholder 5"/>
-          <p:cNvSpPr>
-            <a:spLocks noGrp="1" noRot="1" noChangeAspect="1"/>
-          </p:cNvSpPr>
-          <p:nvPr>
-            <p:ph type="sldImg"/>
-          </p:nvPr>
-        </p:nvSpPr>
-        <p:spPr>
-          <a:xfrm>
-            <a:off x="547688" y="612775"/>
-            <a:ext cx="5762625" cy="3241675"/>
-          </a:xfrm>
-        </p:spPr>
-      </p:sp>
-      <p:sp>
-        <p:nvSpPr>
-          <p:cNvPr id="7" name="Notes Placeholder 6"/>
-          <p:cNvSpPr>
-            <a:spLocks noGrp="1"/>
-          </p:cNvSpPr>
-          <p:nvPr>
-            <p:ph type="body" idx="1"/>
-          </p:nvPr>
-        </p:nvSpPr>
-        <p:spPr/>
-        <p:txBody>
-          <a:bodyPr>
-            <a:normAutofit/>
-          </a:bodyPr>
-          <a:lstStyle/>
-          <a:p>
-            <a:endParaRPr lang="en-US"/>
-          </a:p>
-        </p:txBody>
-      </p:sp>
     </p:spTree>
     <p:extLst>
       <p:ext uri="{BB962C8B-B14F-4D97-AF65-F5344CB8AC3E}">
-        <p14:creationId xmlns:p14="http://schemas.microsoft.com/office/powerpoint/2010/main" val="2544264309"/>
+        <p14:creationId xmlns:p14="http://schemas.microsoft.com/office/powerpoint/2010/main" val="3523349476"/>
       </p:ext>
     </p:extLst>
   </p:cSld>
@@ -9389,15 +9657,23 @@
               <a:t>Kubernetes</a:t>
             </a:r>
             <a:br>
-              <a:rPr lang="en-US" dirty="0"/>
+              <a:rPr lang="en-US"/>
             </a:br>
+            <a:r>
+              <a:rPr lang="en-US">
+                <a:solidFill>
+                  <a:schemeClr val="accent1"/>
+                </a:solidFill>
+              </a:rPr>
+              <a:t>Labels </a:t>
+            </a:r>
             <a:r>
               <a:rPr lang="en-US" dirty="0">
                 <a:solidFill>
                   <a:schemeClr val="accent1"/>
                 </a:solidFill>
               </a:rPr>
-              <a:t>Deployments</a:t>
+              <a:t>&amp; Deployments</a:t>
             </a:r>
           </a:p>
         </p:txBody>
@@ -9495,6 +9771,692 @@
 </file>
 
 <file path=ppt/slides/slide10.xml><?xml version="1.0" encoding="utf-8"?>
+<p:sld xmlns:a="http://schemas.openxmlformats.org/drawingml/2006/main" xmlns:r="http://schemas.openxmlformats.org/officeDocument/2006/relationships" xmlns:p="http://schemas.openxmlformats.org/presentationml/2006/main">
+  <p:cSld>
+    <p:spTree>
+      <p:nvGrpSpPr>
+        <p:cNvPr id="1" name=""/>
+        <p:cNvGrpSpPr/>
+        <p:nvPr/>
+      </p:nvGrpSpPr>
+      <p:grpSpPr>
+        <a:xfrm>
+          <a:off x="0" y="0"/>
+          <a:ext cx="0" cy="0"/>
+          <a:chOff x="0" y="0"/>
+          <a:chExt cx="0" cy="0"/>
+        </a:xfrm>
+      </p:grpSpPr>
+      <p:sp>
+        <p:nvSpPr>
+          <p:cNvPr id="4" name="Title 3">
+            <a:extLst>
+              <a:ext uri="{FF2B5EF4-FFF2-40B4-BE49-F238E27FC236}">
+                <a16:creationId xmlns:a16="http://schemas.microsoft.com/office/drawing/2014/main" id="{8CDC0710-079C-43DD-A644-3F0DB6C91085}"/>
+              </a:ext>
+            </a:extLst>
+          </p:cNvPr>
+          <p:cNvSpPr>
+            <a:spLocks noGrp="1"/>
+          </p:cNvSpPr>
+          <p:nvPr>
+            <p:ph type="ctrTitle"/>
+          </p:nvPr>
+        </p:nvSpPr>
+        <p:spPr/>
+        <p:txBody>
+          <a:bodyPr/>
+          <a:lstStyle/>
+          <a:p>
+            <a:r>
+              <a:rPr lang="de-DE" dirty="0"/>
+              <a:t>Appendix</a:t>
+            </a:r>
+          </a:p>
+        </p:txBody>
+      </p:sp>
+    </p:spTree>
+    <p:extLst>
+      <p:ext uri="{BB962C8B-B14F-4D97-AF65-F5344CB8AC3E}">
+        <p14:creationId xmlns:p14="http://schemas.microsoft.com/office/powerpoint/2010/main" val="2934549505"/>
+      </p:ext>
+    </p:extLst>
+  </p:cSld>
+  <p:clrMapOvr>
+    <a:masterClrMapping/>
+  </p:clrMapOvr>
+</p:sld>
+</file>
+
+<file path=ppt/slides/slide11.xml><?xml version="1.0" encoding="utf-8"?>
+<p:sld xmlns:a="http://schemas.openxmlformats.org/drawingml/2006/main" xmlns:r="http://schemas.openxmlformats.org/officeDocument/2006/relationships" xmlns:p="http://schemas.openxmlformats.org/presentationml/2006/main" show="0">
+  <p:cSld>
+    <p:spTree>
+      <p:nvGrpSpPr>
+        <p:cNvPr id="1" name=""/>
+        <p:cNvGrpSpPr/>
+        <p:nvPr/>
+      </p:nvGrpSpPr>
+      <p:grpSpPr>
+        <a:xfrm>
+          <a:off x="0" y="0"/>
+          <a:ext cx="0" cy="0"/>
+          <a:chOff x="0" y="0"/>
+          <a:chExt cx="0" cy="0"/>
+        </a:xfrm>
+      </p:grpSpPr>
+      <p:sp>
+        <p:nvSpPr>
+          <p:cNvPr id="2" name="Title 1"/>
+          <p:cNvSpPr>
+            <a:spLocks noGrp="1"/>
+          </p:cNvSpPr>
+          <p:nvPr>
+            <p:ph type="title"/>
+          </p:nvPr>
+        </p:nvSpPr>
+        <p:spPr/>
+        <p:txBody>
+          <a:bodyPr/>
+          <a:lstStyle/>
+          <a:p>
+            <a:r>
+              <a:rPr lang="de-DE" dirty="0" err="1"/>
+              <a:t>Introducing</a:t>
+            </a:r>
+            <a:r>
+              <a:rPr lang="de-DE" dirty="0"/>
+              <a:t> </a:t>
+            </a:r>
+            <a:r>
+              <a:rPr lang="de-DE" dirty="0" err="1"/>
+              <a:t>labels</a:t>
+            </a:r>
+            <a:r>
+              <a:rPr lang="de-DE" dirty="0"/>
+              <a:t> &amp; </a:t>
+            </a:r>
+            <a:r>
+              <a:rPr lang="de-DE" dirty="0" err="1"/>
+              <a:t>selectors</a:t>
+            </a:r>
+            <a:endParaRPr lang="de-DE" dirty="0"/>
+          </a:p>
+        </p:txBody>
+      </p:sp>
+      <p:sp>
+        <p:nvSpPr>
+          <p:cNvPr id="3" name="Rectangle 2"/>
+          <p:cNvSpPr/>
+          <p:nvPr/>
+        </p:nvSpPr>
+        <p:spPr>
+          <a:xfrm>
+            <a:off x="1647953" y="5794159"/>
+            <a:ext cx="8898572" cy="415498"/>
+          </a:xfrm>
+          <a:prstGeom prst="rect">
+            <a:avLst/>
+          </a:prstGeom>
+        </p:spPr>
+        <p:txBody>
+          <a:bodyPr wrap="square">
+            <a:spAutoFit/>
+          </a:bodyPr>
+          <a:lstStyle/>
+          <a:p>
+            <a:pPr algn="ctr"/>
+            <a:r>
+              <a:rPr lang="de-DE" dirty="0">
+                <a:hlinkClick r:id="rId3"/>
+              </a:rPr>
+              <a:t>https://kubernetes.io/docs/concepts/overview/working-with-objects/labels/</a:t>
+            </a:r>
+            <a:r>
+              <a:rPr lang="de-DE" dirty="0"/>
+              <a:t> </a:t>
+            </a:r>
+          </a:p>
+        </p:txBody>
+      </p:sp>
+      <p:pic>
+        <p:nvPicPr>
+          <p:cNvPr id="4" name="Picture 3"/>
+          <p:cNvPicPr>
+            <a:picLocks noChangeAspect="1"/>
+          </p:cNvPicPr>
+          <p:nvPr/>
+        </p:nvPicPr>
+        <p:blipFill>
+          <a:blip r:embed="rId4"/>
+          <a:stretch>
+            <a:fillRect/>
+          </a:stretch>
+        </p:blipFill>
+        <p:spPr>
+          <a:xfrm>
+            <a:off x="7862751" y="1200733"/>
+            <a:ext cx="2638095" cy="1342857"/>
+          </a:xfrm>
+          <a:prstGeom prst="rect">
+            <a:avLst/>
+          </a:prstGeom>
+        </p:spPr>
+      </p:pic>
+      <p:sp>
+        <p:nvSpPr>
+          <p:cNvPr id="5" name="Text Placeholder 2"/>
+          <p:cNvSpPr txBox="1">
+            <a:spLocks/>
+          </p:cNvSpPr>
+          <p:nvPr/>
+        </p:nvSpPr>
+        <p:spPr>
+          <a:xfrm>
+            <a:off x="504000" y="1124700"/>
+            <a:ext cx="8159939" cy="4727460"/>
+          </a:xfrm>
+          <a:prstGeom prst="rect">
+            <a:avLst/>
+          </a:prstGeom>
+        </p:spPr>
+        <p:txBody>
+          <a:bodyPr/>
+          <a:lstStyle>
+            <a:lvl1pPr marL="0" indent="0" algn="l" defTabSz="1088558" rtl="0" eaLnBrk="1" latinLnBrk="0" hangingPunct="1">
+              <a:spcBef>
+                <a:spcPts val="1800"/>
+              </a:spcBef>
+              <a:buClr>
+                <a:schemeClr val="accent1"/>
+              </a:buClr>
+              <a:buSzPct val="80000"/>
+              <a:buFontTx/>
+              <a:buNone/>
+              <a:defRPr sz="2000" b="0" kern="1200">
+                <a:solidFill>
+                  <a:schemeClr val="tx1"/>
+                </a:solidFill>
+                <a:latin typeface="+mn-lt"/>
+                <a:ea typeface="+mn-ea"/>
+                <a:cs typeface="+mn-cs"/>
+              </a:defRPr>
+            </a:lvl1pPr>
+            <a:lvl2pPr marL="179964" indent="-179964" algn="l" defTabSz="1088558" rtl="0" eaLnBrk="1" latinLnBrk="0" hangingPunct="1">
+              <a:spcBef>
+                <a:spcPts val="600"/>
+              </a:spcBef>
+              <a:buClr>
+                <a:schemeClr val="accent1"/>
+              </a:buClr>
+              <a:buSzPct val="100000"/>
+              <a:buFont typeface="Wingdings" pitchFamily="2" charset="2"/>
+              <a:buChar char="§"/>
+              <a:defRPr sz="1800" kern="1200">
+                <a:solidFill>
+                  <a:schemeClr val="tx1"/>
+                </a:solidFill>
+                <a:latin typeface="+mn-lt"/>
+                <a:ea typeface="+mn-ea"/>
+                <a:cs typeface="+mn-cs"/>
+              </a:defRPr>
+            </a:lvl2pPr>
+            <a:lvl3pPr marL="358775" indent="-179388" algn="l" defTabSz="1088558" rtl="0" eaLnBrk="1" latinLnBrk="0" hangingPunct="1">
+              <a:spcBef>
+                <a:spcPts val="300"/>
+              </a:spcBef>
+              <a:buClr>
+                <a:schemeClr val="tx1"/>
+              </a:buClr>
+              <a:buSzPct val="100000"/>
+              <a:buFont typeface="Arial" panose="020B0604020202020204" pitchFamily="34" charset="0"/>
+              <a:buChar char="–"/>
+              <a:defRPr lang="en-US" sz="1800" kern="1200" noProof="0" dirty="0" smtClean="0">
+                <a:solidFill>
+                  <a:schemeClr val="tx1"/>
+                </a:solidFill>
+                <a:latin typeface="+mn-lt"/>
+                <a:ea typeface="+mn-ea"/>
+                <a:cs typeface="+mn-cs"/>
+              </a:defRPr>
+            </a:lvl3pPr>
+            <a:lvl4pPr marL="539892" indent="-179964" algn="l" defTabSz="1088558" rtl="0" eaLnBrk="1" latinLnBrk="0" hangingPunct="1">
+              <a:spcBef>
+                <a:spcPts val="300"/>
+              </a:spcBef>
+              <a:buClr>
+                <a:schemeClr val="tx1"/>
+              </a:buClr>
+              <a:buSzPct val="120000"/>
+              <a:buFont typeface="Arial" pitchFamily="34" charset="0"/>
+              <a:buChar char="▫"/>
+              <a:defRPr sz="1600" kern="1200">
+                <a:solidFill>
+                  <a:schemeClr val="tx1"/>
+                </a:solidFill>
+                <a:latin typeface="+mn-lt"/>
+                <a:ea typeface="+mn-ea"/>
+                <a:cs typeface="+mn-cs"/>
+              </a:defRPr>
+            </a:lvl4pPr>
+            <a:lvl5pPr marL="719856" indent="-179964" algn="l" defTabSz="1088558" rtl="0" eaLnBrk="1" latinLnBrk="0" hangingPunct="1">
+              <a:spcBef>
+                <a:spcPts val="100"/>
+              </a:spcBef>
+              <a:buClr>
+                <a:schemeClr val="tx1"/>
+              </a:buClr>
+              <a:buSzPct val="100000"/>
+              <a:buFont typeface="Symbol" panose="05050102010706020507" pitchFamily="18" charset="2"/>
+              <a:buChar char="-"/>
+              <a:defRPr sz="1400" kern="1200" baseline="0">
+                <a:solidFill>
+                  <a:schemeClr val="tx1"/>
+                </a:solidFill>
+                <a:latin typeface="+mn-lt"/>
+                <a:ea typeface="+mn-ea"/>
+                <a:cs typeface="+mn-cs"/>
+              </a:defRPr>
+            </a:lvl5pPr>
+            <a:lvl6pPr marL="2993535" indent="-272140" algn="l" defTabSz="1088558" rtl="0" eaLnBrk="1" latinLnBrk="0" hangingPunct="1">
+              <a:spcBef>
+                <a:spcPct val="20000"/>
+              </a:spcBef>
+              <a:buFont typeface="Arial" pitchFamily="34" charset="0"/>
+              <a:buChar char="•"/>
+              <a:defRPr sz="2400" kern="1200">
+                <a:solidFill>
+                  <a:schemeClr val="tx1"/>
+                </a:solidFill>
+                <a:latin typeface="+mn-lt"/>
+                <a:ea typeface="+mn-ea"/>
+                <a:cs typeface="+mn-cs"/>
+              </a:defRPr>
+            </a:lvl6pPr>
+            <a:lvl7pPr marL="3537814" indent="-272140" algn="l" defTabSz="1088558" rtl="0" eaLnBrk="1" latinLnBrk="0" hangingPunct="1">
+              <a:spcBef>
+                <a:spcPct val="20000"/>
+              </a:spcBef>
+              <a:buFont typeface="Arial" pitchFamily="34" charset="0"/>
+              <a:buChar char="•"/>
+              <a:defRPr sz="2400" kern="1200">
+                <a:solidFill>
+                  <a:schemeClr val="tx1"/>
+                </a:solidFill>
+                <a:latin typeface="+mn-lt"/>
+                <a:ea typeface="+mn-ea"/>
+                <a:cs typeface="+mn-cs"/>
+              </a:defRPr>
+            </a:lvl7pPr>
+            <a:lvl8pPr marL="4082093" indent="-272140" algn="l" defTabSz="1088558" rtl="0" eaLnBrk="1" latinLnBrk="0" hangingPunct="1">
+              <a:spcBef>
+                <a:spcPct val="20000"/>
+              </a:spcBef>
+              <a:buFont typeface="Arial" pitchFamily="34" charset="0"/>
+              <a:buChar char="•"/>
+              <a:defRPr sz="2400" kern="1200">
+                <a:solidFill>
+                  <a:schemeClr val="tx1"/>
+                </a:solidFill>
+                <a:latin typeface="+mn-lt"/>
+                <a:ea typeface="+mn-ea"/>
+                <a:cs typeface="+mn-cs"/>
+              </a:defRPr>
+            </a:lvl8pPr>
+            <a:lvl9pPr marL="4626373" indent="-272140" algn="l" defTabSz="1088558" rtl="0" eaLnBrk="1" latinLnBrk="0" hangingPunct="1">
+              <a:spcBef>
+                <a:spcPct val="20000"/>
+              </a:spcBef>
+              <a:buFont typeface="Arial" pitchFamily="34" charset="0"/>
+              <a:buChar char="•"/>
+              <a:defRPr sz="2400" kern="1200">
+                <a:solidFill>
+                  <a:schemeClr val="tx1"/>
+                </a:solidFill>
+                <a:latin typeface="+mn-lt"/>
+                <a:ea typeface="+mn-ea"/>
+                <a:cs typeface="+mn-cs"/>
+              </a:defRPr>
+            </a:lvl9pPr>
+          </a:lstStyle>
+          <a:p>
+            <a:pPr lvl="1"/>
+            <a:r>
+              <a:rPr lang="en-US" dirty="0"/>
+              <a:t>Labels are </a:t>
+            </a:r>
+            <a:r>
+              <a:rPr lang="en-US" dirty="0" err="1"/>
+              <a:t>key:value</a:t>
+            </a:r>
+            <a:r>
+              <a:rPr lang="en-US" dirty="0"/>
+              <a:t> pairs in </a:t>
+            </a:r>
+            <a:r>
+              <a:rPr lang="en-US" dirty="0" err="1"/>
+              <a:t>kubernetes</a:t>
+            </a:r>
+            <a:endParaRPr lang="en-US" dirty="0"/>
+          </a:p>
+          <a:p>
+            <a:pPr lvl="1"/>
+            <a:r>
+              <a:rPr lang="en-US" dirty="0"/>
+              <a:t>Labels are part of the “metadata” section of a resource</a:t>
+            </a:r>
+          </a:p>
+          <a:p>
+            <a:pPr lvl="1"/>
+            <a:r>
+              <a:rPr lang="en-US" dirty="0"/>
+              <a:t>Basically everything can be labeled (pods, nodes, …)</a:t>
+            </a:r>
+          </a:p>
+          <a:p>
+            <a:pPr lvl="1"/>
+            <a:r>
+              <a:rPr lang="en-US" dirty="0"/>
+              <a:t>Example: “</a:t>
+            </a:r>
+            <a:r>
+              <a:rPr lang="en-US" dirty="0" err="1"/>
+              <a:t>release”:”stable</a:t>
+            </a:r>
+            <a:r>
+              <a:rPr lang="en-US" dirty="0"/>
+              <a:t>”, “</a:t>
+            </a:r>
+            <a:r>
+              <a:rPr lang="en-US" dirty="0" err="1"/>
+              <a:t>release”:”canary</a:t>
+            </a:r>
+            <a:r>
+              <a:rPr lang="en-US" dirty="0"/>
+              <a:t>”, </a:t>
+            </a:r>
+            <a:br>
+              <a:rPr lang="en-US" dirty="0"/>
+            </a:br>
+            <a:r>
+              <a:rPr lang="en-US" dirty="0"/>
+              <a:t>“</a:t>
+            </a:r>
+            <a:r>
+              <a:rPr lang="en-US" dirty="0" err="1"/>
+              <a:t>com.sap</a:t>
+            </a:r>
+            <a:r>
+              <a:rPr lang="en-US" dirty="0"/>
+              <a:t>/product-name”:”</a:t>
+            </a:r>
+            <a:r>
+              <a:rPr lang="en-US" dirty="0" err="1"/>
+              <a:t>hana</a:t>
+            </a:r>
+            <a:r>
+              <a:rPr lang="en-US" dirty="0"/>
+              <a:t>”</a:t>
+            </a:r>
+          </a:p>
+          <a:p>
+            <a:pPr lvl="1"/>
+            <a:endParaRPr lang="en-US" dirty="0"/>
+          </a:p>
+          <a:p>
+            <a:pPr lvl="1"/>
+            <a:endParaRPr lang="en-US" dirty="0"/>
+          </a:p>
+          <a:p>
+            <a:pPr lvl="1"/>
+            <a:r>
+              <a:rPr lang="en-US" dirty="0"/>
+              <a:t>Based on labels Kubernetes offers selection / filtering / assignments</a:t>
+            </a:r>
+          </a:p>
+          <a:p>
+            <a:pPr lvl="1"/>
+            <a:r>
+              <a:rPr lang="en-US" dirty="0"/>
+              <a:t>Equality-based selectors (true / false)</a:t>
+            </a:r>
+          </a:p>
+          <a:p>
+            <a:pPr lvl="1"/>
+            <a:r>
+              <a:rPr lang="en-US" dirty="0"/>
+              <a:t>Set-based selectors (in, </a:t>
+            </a:r>
+            <a:r>
+              <a:rPr lang="en-US" dirty="0" err="1"/>
+              <a:t>notin</a:t>
+            </a:r>
+            <a:r>
+              <a:rPr lang="en-US" dirty="0"/>
+              <a:t>, exists)</a:t>
+            </a:r>
+          </a:p>
+          <a:p>
+            <a:pPr marL="0" lvl="1" indent="0">
+              <a:buNone/>
+            </a:pPr>
+            <a:endParaRPr lang="en-US" dirty="0"/>
+          </a:p>
+        </p:txBody>
+      </p:sp>
+      <p:pic>
+        <p:nvPicPr>
+          <p:cNvPr id="6" name="Picture 5"/>
+          <p:cNvPicPr>
+            <a:picLocks noChangeAspect="1"/>
+          </p:cNvPicPr>
+          <p:nvPr/>
+        </p:nvPicPr>
+        <p:blipFill>
+          <a:blip r:embed="rId5"/>
+          <a:stretch>
+            <a:fillRect/>
+          </a:stretch>
+        </p:blipFill>
+        <p:spPr>
+          <a:xfrm>
+            <a:off x="7862751" y="3213685"/>
+            <a:ext cx="3076190" cy="742857"/>
+          </a:xfrm>
+          <a:prstGeom prst="rect">
+            <a:avLst/>
+          </a:prstGeom>
+        </p:spPr>
+      </p:pic>
+      <p:pic>
+        <p:nvPicPr>
+          <p:cNvPr id="7" name="Picture 6"/>
+          <p:cNvPicPr>
+            <a:picLocks noChangeAspect="1"/>
+          </p:cNvPicPr>
+          <p:nvPr/>
+        </p:nvPicPr>
+        <p:blipFill>
+          <a:blip r:embed="rId6"/>
+          <a:stretch>
+            <a:fillRect/>
+          </a:stretch>
+        </p:blipFill>
+        <p:spPr>
+          <a:xfrm>
+            <a:off x="7862751" y="4082226"/>
+            <a:ext cx="3971429" cy="1266667"/>
+          </a:xfrm>
+          <a:prstGeom prst="rect">
+            <a:avLst/>
+          </a:prstGeom>
+        </p:spPr>
+      </p:pic>
+      <p:pic>
+        <p:nvPicPr>
+          <p:cNvPr id="8" name="Picture 7">
+            <a:extLst>
+              <a:ext uri="{FF2B5EF4-FFF2-40B4-BE49-F238E27FC236}">
+                <a16:creationId xmlns:a16="http://schemas.microsoft.com/office/drawing/2014/main" id="{9E0A5F9B-3AEC-4598-A134-09D4835E4ABA}"/>
+              </a:ext>
+            </a:extLst>
+          </p:cNvPr>
+          <p:cNvPicPr>
+            <a:picLocks noChangeAspect="1"/>
+          </p:cNvPicPr>
+          <p:nvPr/>
+        </p:nvPicPr>
+        <p:blipFill>
+          <a:blip r:embed="rId7"/>
+          <a:stretch>
+            <a:fillRect/>
+          </a:stretch>
+        </p:blipFill>
+        <p:spPr>
+          <a:xfrm>
+            <a:off x="7862751" y="473337"/>
+            <a:ext cx="2778572" cy="5528571"/>
+          </a:xfrm>
+          <a:prstGeom prst="rect">
+            <a:avLst/>
+          </a:prstGeom>
+        </p:spPr>
+      </p:pic>
+    </p:spTree>
+    <p:extLst>
+      <p:ext uri="{BB962C8B-B14F-4D97-AF65-F5344CB8AC3E}">
+        <p14:creationId xmlns:p14="http://schemas.microsoft.com/office/powerpoint/2010/main" val="3954323756"/>
+      </p:ext>
+    </p:extLst>
+  </p:cSld>
+  <p:clrMapOvr>
+    <a:masterClrMapping/>
+  </p:clrMapOvr>
+  <p:timing>
+    <p:tnLst>
+      <p:par>
+        <p:cTn id="1" dur="indefinite" restart="never" nodeType="tmRoot">
+          <p:childTnLst>
+            <p:seq concurrent="1" nextAc="seek">
+              <p:cTn id="2" dur="indefinite" nodeType="mainSeq">
+                <p:childTnLst>
+                  <p:par>
+                    <p:cTn id="3" fill="hold">
+                      <p:stCondLst>
+                        <p:cond delay="indefinite"/>
+                      </p:stCondLst>
+                      <p:childTnLst>
+                        <p:par>
+                          <p:cTn id="4" fill="hold">
+                            <p:stCondLst>
+                              <p:cond delay="0"/>
+                            </p:stCondLst>
+                            <p:childTnLst>
+                              <p:par>
+                                <p:cTn id="5" presetID="2" presetClass="entr" presetSubtype="4" fill="hold" nodeType="clickEffect">
+                                  <p:stCondLst>
+                                    <p:cond delay="0"/>
+                                  </p:stCondLst>
+                                  <p:childTnLst>
+                                    <p:set>
+                                      <p:cBhvr>
+                                        <p:cTn id="6" dur="1" fill="hold">
+                                          <p:stCondLst>
+                                            <p:cond delay="0"/>
+                                          </p:stCondLst>
+                                        </p:cTn>
+                                        <p:tgtEl>
+                                          <p:spTgt spid="8"/>
+                                        </p:tgtEl>
+                                        <p:attrNameLst>
+                                          <p:attrName>style.visibility</p:attrName>
+                                        </p:attrNameLst>
+                                      </p:cBhvr>
+                                      <p:to>
+                                        <p:strVal val="visible"/>
+                                      </p:to>
+                                    </p:set>
+                                    <p:anim calcmode="lin" valueType="num">
+                                      <p:cBhvr additive="base">
+                                        <p:cTn id="7" dur="500" fill="hold"/>
+                                        <p:tgtEl>
+                                          <p:spTgt spid="8"/>
+                                        </p:tgtEl>
+                                        <p:attrNameLst>
+                                          <p:attrName>ppt_x</p:attrName>
+                                        </p:attrNameLst>
+                                      </p:cBhvr>
+                                      <p:tavLst>
+                                        <p:tav tm="0">
+                                          <p:val>
+                                            <p:strVal val="#ppt_x"/>
+                                          </p:val>
+                                        </p:tav>
+                                        <p:tav tm="100000">
+                                          <p:val>
+                                            <p:strVal val="#ppt_x"/>
+                                          </p:val>
+                                        </p:tav>
+                                      </p:tavLst>
+                                    </p:anim>
+                                    <p:anim calcmode="lin" valueType="num">
+                                      <p:cBhvr additive="base">
+                                        <p:cTn id="8" dur="500" fill="hold"/>
+                                        <p:tgtEl>
+                                          <p:spTgt spid="8"/>
+                                        </p:tgtEl>
+                                        <p:attrNameLst>
+                                          <p:attrName>ppt_y</p:attrName>
+                                        </p:attrNameLst>
+                                      </p:cBhvr>
+                                      <p:tavLst>
+                                        <p:tav tm="0">
+                                          <p:val>
+                                            <p:strVal val="1+#ppt_h/2"/>
+                                          </p:val>
+                                        </p:tav>
+                                        <p:tav tm="100000">
+                                          <p:val>
+                                            <p:strVal val="#ppt_y"/>
+                                          </p:val>
+                                        </p:tav>
+                                      </p:tavLst>
+                                    </p:anim>
+                                  </p:childTnLst>
+                                </p:cTn>
+                              </p:par>
+                            </p:childTnLst>
+                          </p:cTn>
+                        </p:par>
+                      </p:childTnLst>
+                    </p:cTn>
+                  </p:par>
+                </p:childTnLst>
+              </p:cTn>
+              <p:prevCondLst>
+                <p:cond evt="onPrev" delay="0">
+                  <p:tgtEl>
+                    <p:sldTgt/>
+                  </p:tgtEl>
+                </p:cond>
+              </p:prevCondLst>
+              <p:nextCondLst>
+                <p:cond evt="onNext" delay="0">
+                  <p:tgtEl>
+                    <p:sldTgt/>
+                  </p:tgtEl>
+                </p:cond>
+              </p:nextCondLst>
+            </p:seq>
+          </p:childTnLst>
+        </p:cTn>
+      </p:par>
+    </p:tnLst>
+  </p:timing>
+</p:sld>
+</file>
+
+<file path=ppt/slides/slide12.xml><?xml version="1.0" encoding="utf-8"?>
 <p:sld xmlns:a="http://schemas.openxmlformats.org/drawingml/2006/main" xmlns:r="http://schemas.openxmlformats.org/officeDocument/2006/relationships" xmlns:p="http://schemas.openxmlformats.org/presentationml/2006/main" show="0">
   <p:cSld>
     <p:spTree>
@@ -12827,13 +13789,8 @@
             <a:pPr lvl="1"/>
             <a:r>
               <a:rPr lang="en-US" dirty="0"/>
-              <a:t>All parts belonging to a deployment are identified by labels and corresponding </a:t>
-            </a:r>
-            <a:r>
-              <a:rPr lang="en-US" dirty="0" err="1"/>
-              <a:t>selctors</a:t>
-            </a:r>
-            <a:endParaRPr lang="en-US" dirty="0"/>
+              <a:t>All parts belonging to a deployment are identified by labels and corresponding selectors</a:t>
+            </a:r>
           </a:p>
           <a:p>
             <a:pPr lvl="1"/>

</xml_diff>

<commit_message>
demo description extended with rollback
</commit_message>
<xml_diff>
--- a/kubernetes/03_labels_and_deployments.pptx
+++ b/kubernetes/03_labels_and_deployments.pptx
@@ -652,7 +652,9 @@
         </p:nvSpPr>
         <p:spPr/>
         <p:txBody>
-          <a:bodyPr/>
+          <a:bodyPr>
+            <a:normAutofit lnSpcReduction="10000"/>
+          </a:bodyPr>
           <a:lstStyle/>
           <a:p>
             <a:pPr marL="0" indent="0">
@@ -800,6 +802,436 @@
               <a:rPr lang="en-US" dirty="0"/>
               <a:t> file (with way more options to customize -&gt; like the labels).</a:t>
             </a:r>
+          </a:p>
+          <a:p>
+            <a:pPr marL="0" indent="0">
+              <a:buFontTx/>
+              <a:buNone/>
+            </a:pPr>
+            <a:endParaRPr lang="en-US" dirty="0"/>
+          </a:p>
+          <a:p>
+            <a:pPr marL="0" indent="0">
+              <a:buFontTx/>
+              <a:buNone/>
+            </a:pPr>
+            <a:r>
+              <a:rPr lang="en-US" dirty="0"/>
+              <a:t>Optional: do a demo for updating (assuming your deployment is called “</a:t>
+            </a:r>
+            <a:r>
+              <a:rPr lang="en-US" dirty="0" err="1"/>
+              <a:t>nginx</a:t>
+            </a:r>
+            <a:r>
+              <a:rPr lang="en-US" dirty="0"/>
+              <a:t>”)</a:t>
+            </a:r>
+          </a:p>
+          <a:p>
+            <a:pPr marL="285750" marR="0" lvl="0" indent="-285750" algn="l" defTabSz="1088776" rtl="0" eaLnBrk="1" fontAlgn="auto" latinLnBrk="0" hangingPunct="1">
+              <a:lnSpc>
+                <a:spcPct val="100000"/>
+              </a:lnSpc>
+              <a:spcBef>
+                <a:spcPts val="0"/>
+              </a:spcBef>
+              <a:spcAft>
+                <a:spcPts val="0"/>
+              </a:spcAft>
+              <a:buClrTx/>
+              <a:buSzTx/>
+              <a:buFontTx/>
+              <a:buChar char="-"/>
+              <a:tabLst/>
+              <a:defRPr/>
+            </a:pPr>
+            <a:r>
+              <a:rPr lang="en-US" dirty="0">
+                <a:sym typeface="Wingdings" panose="05000000000000000000" pitchFamily="2" charset="2"/>
+              </a:rPr>
+              <a:t>Run “</a:t>
+            </a:r>
+            <a:r>
+              <a:rPr lang="en-US" dirty="0" err="1">
+                <a:sym typeface="Wingdings" panose="05000000000000000000" pitchFamily="2" charset="2"/>
+              </a:rPr>
+              <a:t>kubectl</a:t>
+            </a:r>
+            <a:r>
+              <a:rPr lang="en-US" dirty="0">
+                <a:sym typeface="Wingdings" panose="05000000000000000000" pitchFamily="2" charset="2"/>
+              </a:rPr>
+              <a:t> rollout status deployment </a:t>
+            </a:r>
+            <a:r>
+              <a:rPr lang="en-US" dirty="0" err="1">
+                <a:sym typeface="Wingdings" panose="05000000000000000000" pitchFamily="2" charset="2"/>
+              </a:rPr>
+              <a:t>nginx</a:t>
+            </a:r>
+            <a:r>
+              <a:rPr lang="en-US" dirty="0">
+                <a:sym typeface="Wingdings" panose="05000000000000000000" pitchFamily="2" charset="2"/>
+              </a:rPr>
+              <a:t>” in a separate shell </a:t>
+            </a:r>
+          </a:p>
+          <a:p>
+            <a:pPr marL="285750" marR="0" lvl="0" indent="-285750" algn="l" defTabSz="1088776" rtl="0" eaLnBrk="1" fontAlgn="auto" latinLnBrk="0" hangingPunct="1">
+              <a:lnSpc>
+                <a:spcPct val="100000"/>
+              </a:lnSpc>
+              <a:spcBef>
+                <a:spcPts val="0"/>
+              </a:spcBef>
+              <a:spcAft>
+                <a:spcPts val="0"/>
+              </a:spcAft>
+              <a:buClrTx/>
+              <a:buSzTx/>
+              <a:buFontTx/>
+              <a:buChar char="-"/>
+              <a:tabLst/>
+              <a:defRPr/>
+            </a:pPr>
+            <a:r>
+              <a:rPr lang="en-US" dirty="0">
+                <a:sym typeface="Wingdings" panose="05000000000000000000" pitchFamily="2" charset="2"/>
+              </a:rPr>
+              <a:t>In parallel: </a:t>
+            </a:r>
+            <a:r>
+              <a:rPr lang="en-US" dirty="0"/>
+              <a:t>“</a:t>
+            </a:r>
+            <a:r>
+              <a:rPr lang="en-US" dirty="0" err="1"/>
+              <a:t>kubectl</a:t>
+            </a:r>
+            <a:r>
+              <a:rPr lang="en-US" dirty="0"/>
+              <a:t> set image deployment/</a:t>
+            </a:r>
+            <a:r>
+              <a:rPr lang="en-US" dirty="0" err="1"/>
+              <a:t>nginx</a:t>
+            </a:r>
+            <a:r>
+              <a:rPr lang="en-US" dirty="0"/>
+              <a:t> </a:t>
+            </a:r>
+            <a:r>
+              <a:rPr lang="en-US" dirty="0" err="1"/>
+              <a:t>nginx</a:t>
+            </a:r>
+            <a:r>
+              <a:rPr lang="en-US" dirty="0"/>
+              <a:t>=</a:t>
+            </a:r>
+            <a:r>
+              <a:rPr lang="en-US" dirty="0" err="1"/>
+              <a:t>nginx:mainline</a:t>
+            </a:r>
+            <a:r>
+              <a:rPr lang="en-US" dirty="0"/>
+              <a:t> --record” </a:t>
+            </a:r>
+            <a:r>
+              <a:rPr lang="en-US" dirty="0">
+                <a:sym typeface="Wingdings" panose="05000000000000000000" pitchFamily="2" charset="2"/>
+              </a:rPr>
+              <a:t> make sure to set an image tag that differs from your first revision</a:t>
+            </a:r>
+          </a:p>
+          <a:p>
+            <a:pPr marL="285750" indent="-285750">
+              <a:buFontTx/>
+              <a:buChar char="-"/>
+            </a:pPr>
+            <a:r>
+              <a:rPr lang="en-US" dirty="0">
+                <a:sym typeface="Wingdings" panose="05000000000000000000" pitchFamily="2" charset="2"/>
+              </a:rPr>
+              <a:t>Point out, that the “--record“ parameter will “ log” the command and write it to the deployment’s annotations</a:t>
+            </a:r>
+          </a:p>
+          <a:p>
+            <a:pPr marL="285750" marR="0" lvl="0" indent="-285750" algn="l" defTabSz="1088776" rtl="0" eaLnBrk="1" fontAlgn="auto" latinLnBrk="0" hangingPunct="1">
+              <a:lnSpc>
+                <a:spcPct val="100000"/>
+              </a:lnSpc>
+              <a:spcBef>
+                <a:spcPts val="0"/>
+              </a:spcBef>
+              <a:spcAft>
+                <a:spcPts val="0"/>
+              </a:spcAft>
+              <a:buClrTx/>
+              <a:buSzTx/>
+              <a:buFontTx/>
+              <a:buChar char="-"/>
+              <a:tabLst/>
+              <a:defRPr/>
+            </a:pPr>
+            <a:r>
+              <a:rPr lang="en-US" dirty="0">
+                <a:sym typeface="Wingdings" panose="05000000000000000000" pitchFamily="2" charset="2"/>
+              </a:rPr>
+              <a:t>“</a:t>
+            </a:r>
+            <a:r>
+              <a:rPr lang="en-US" dirty="0" err="1">
+                <a:sym typeface="Wingdings" panose="05000000000000000000" pitchFamily="2" charset="2"/>
+              </a:rPr>
+              <a:t>kubectl</a:t>
+            </a:r>
+            <a:r>
+              <a:rPr lang="en-US" dirty="0">
+                <a:sym typeface="Wingdings" panose="05000000000000000000" pitchFamily="2" charset="2"/>
+              </a:rPr>
+              <a:t> rollout history deployment </a:t>
+            </a:r>
+            <a:r>
+              <a:rPr lang="en-US" dirty="0" err="1">
+                <a:sym typeface="Wingdings" panose="05000000000000000000" pitchFamily="2" charset="2"/>
+              </a:rPr>
+              <a:t>nginx</a:t>
+            </a:r>
+            <a:r>
+              <a:rPr lang="en-US" dirty="0">
+                <a:sym typeface="Wingdings" panose="05000000000000000000" pitchFamily="2" charset="2"/>
+              </a:rPr>
+              <a:t>”  you should see 2 revisions incl. the “change-cause”</a:t>
+            </a:r>
+          </a:p>
+          <a:p>
+            <a:pPr marL="0" marR="0" lvl="0" indent="0" algn="l" defTabSz="1088776" rtl="0" eaLnBrk="1" fontAlgn="auto" latinLnBrk="0" hangingPunct="1">
+              <a:lnSpc>
+                <a:spcPct val="100000"/>
+              </a:lnSpc>
+              <a:spcBef>
+                <a:spcPts val="0"/>
+              </a:spcBef>
+              <a:spcAft>
+                <a:spcPts val="0"/>
+              </a:spcAft>
+              <a:buClrTx/>
+              <a:buSzTx/>
+              <a:buFontTx/>
+              <a:buNone/>
+              <a:tabLst/>
+              <a:defRPr/>
+            </a:pPr>
+            <a:r>
+              <a:rPr lang="en-US" dirty="0"/>
+              <a:t>Optional: do a demo for a rollback</a:t>
+            </a:r>
+            <a:endParaRPr lang="en-US" dirty="0">
+              <a:sym typeface="Wingdings" panose="05000000000000000000" pitchFamily="2" charset="2"/>
+            </a:endParaRPr>
+          </a:p>
+          <a:p>
+            <a:pPr marL="285750" marR="0" lvl="0" indent="-285750" algn="l" defTabSz="1088776" rtl="0" eaLnBrk="1" fontAlgn="auto" latinLnBrk="0" hangingPunct="1">
+              <a:lnSpc>
+                <a:spcPct val="100000"/>
+              </a:lnSpc>
+              <a:spcBef>
+                <a:spcPts val="0"/>
+              </a:spcBef>
+              <a:spcAft>
+                <a:spcPts val="0"/>
+              </a:spcAft>
+              <a:buClrTx/>
+              <a:buSzTx/>
+              <a:buFontTx/>
+              <a:buChar char="-"/>
+              <a:tabLst/>
+              <a:defRPr/>
+            </a:pPr>
+            <a:r>
+              <a:rPr lang="en-US" dirty="0"/>
+              <a:t>Re-run the “set image” command while using an invalid version tag (like “invalid” or something with a typo)</a:t>
+            </a:r>
+          </a:p>
+          <a:p>
+            <a:pPr marL="285750" marR="0" lvl="0" indent="-285750" algn="l" defTabSz="1088776" rtl="0" eaLnBrk="1" fontAlgn="auto" latinLnBrk="0" hangingPunct="1">
+              <a:lnSpc>
+                <a:spcPct val="100000"/>
+              </a:lnSpc>
+              <a:spcBef>
+                <a:spcPts val="0"/>
+              </a:spcBef>
+              <a:spcAft>
+                <a:spcPts val="0"/>
+              </a:spcAft>
+              <a:buClrTx/>
+              <a:buSzTx/>
+              <a:buFontTx/>
+              <a:buChar char="-"/>
+              <a:tabLst/>
+              <a:defRPr/>
+            </a:pPr>
+            <a:r>
+              <a:rPr lang="en-US" dirty="0"/>
+              <a:t>Check the rollout status </a:t>
+            </a:r>
+            <a:r>
+              <a:rPr lang="en-US" dirty="0">
+                <a:sym typeface="Wingdings" panose="05000000000000000000" pitchFamily="2" charset="2"/>
+              </a:rPr>
+              <a:t> there should be one pod with the new image version in an error status &amp; at least 2 pods of the previous revision up and running.</a:t>
+            </a:r>
+            <a:endParaRPr lang="en-US" dirty="0"/>
+          </a:p>
+          <a:p>
+            <a:pPr marL="285750" marR="0" lvl="0" indent="-285750" algn="l" defTabSz="1088776" rtl="0" eaLnBrk="1" fontAlgn="auto" latinLnBrk="0" hangingPunct="1">
+              <a:lnSpc>
+                <a:spcPct val="100000"/>
+              </a:lnSpc>
+              <a:spcBef>
+                <a:spcPts val="0"/>
+              </a:spcBef>
+              <a:spcAft>
+                <a:spcPts val="0"/>
+              </a:spcAft>
+              <a:buClrTx/>
+              <a:buSzTx/>
+              <a:buFontTx/>
+              <a:buChar char="-"/>
+              <a:tabLst/>
+              <a:defRPr/>
+            </a:pPr>
+            <a:r>
+              <a:rPr lang="en-US" dirty="0"/>
+              <a:t>Explain the rolling update strategy and why there is only one pod in status error </a:t>
+            </a:r>
+            <a:r>
+              <a:rPr lang="en-US" dirty="0">
+                <a:sym typeface="Wingdings" panose="05000000000000000000" pitchFamily="2" charset="2"/>
+              </a:rPr>
+              <a:t> </a:t>
+            </a:r>
+            <a:r>
+              <a:rPr lang="en-US" dirty="0" err="1">
+                <a:sym typeface="Wingdings" panose="05000000000000000000" pitchFamily="2" charset="2"/>
+              </a:rPr>
+              <a:t>maxUnavailable</a:t>
+            </a:r>
+            <a:r>
+              <a:rPr lang="en-US" dirty="0">
+                <a:sym typeface="Wingdings" panose="05000000000000000000" pitchFamily="2" charset="2"/>
+              </a:rPr>
+              <a:t> (</a:t>
+            </a:r>
+            <a:r>
+              <a:rPr lang="de-DE" sz="1400" b="0" kern="1200" dirty="0" err="1">
+                <a:solidFill>
+                  <a:schemeClr val="tx1"/>
+                </a:solidFill>
+                <a:effectLst/>
+                <a:latin typeface="+mn-lt"/>
+                <a:ea typeface="+mn-ea"/>
+                <a:cs typeface="+mn-cs"/>
+              </a:rPr>
+              <a:t>kubectl</a:t>
+            </a:r>
+            <a:r>
+              <a:rPr lang="de-DE" sz="1400" b="0" kern="1200" dirty="0">
+                <a:solidFill>
+                  <a:schemeClr val="tx1"/>
+                </a:solidFill>
+                <a:effectLst/>
+                <a:latin typeface="+mn-lt"/>
+                <a:ea typeface="+mn-ea"/>
+                <a:cs typeface="+mn-cs"/>
+              </a:rPr>
+              <a:t> </a:t>
+            </a:r>
+            <a:r>
+              <a:rPr lang="de-DE" sz="1400" b="0" kern="1200" dirty="0" err="1">
+                <a:solidFill>
+                  <a:schemeClr val="tx1"/>
+                </a:solidFill>
+                <a:effectLst/>
+                <a:latin typeface="+mn-lt"/>
+                <a:ea typeface="+mn-ea"/>
+                <a:cs typeface="+mn-cs"/>
+              </a:rPr>
+              <a:t>explain</a:t>
+            </a:r>
+            <a:r>
+              <a:rPr lang="de-DE" sz="1400" b="0" kern="1200" dirty="0">
+                <a:solidFill>
+                  <a:schemeClr val="tx1"/>
+                </a:solidFill>
+                <a:effectLst/>
+                <a:latin typeface="+mn-lt"/>
+                <a:ea typeface="+mn-ea"/>
+                <a:cs typeface="+mn-cs"/>
+              </a:rPr>
+              <a:t> </a:t>
+            </a:r>
+            <a:r>
+              <a:rPr lang="de-DE" sz="1400" b="0" kern="1200" dirty="0" err="1">
+                <a:solidFill>
+                  <a:schemeClr val="tx1"/>
+                </a:solidFill>
+                <a:effectLst/>
+                <a:latin typeface="+mn-lt"/>
+                <a:ea typeface="+mn-ea"/>
+                <a:cs typeface="+mn-cs"/>
+              </a:rPr>
+              <a:t>deployment.spec.strategy.rollingUpdate</a:t>
+            </a:r>
+            <a:r>
+              <a:rPr lang="de-DE" sz="1400" b="0" kern="1200" dirty="0">
+                <a:solidFill>
+                  <a:schemeClr val="tx1"/>
+                </a:solidFill>
+                <a:effectLst/>
+                <a:latin typeface="+mn-lt"/>
+                <a:ea typeface="+mn-ea"/>
+                <a:cs typeface="+mn-cs"/>
+              </a:rPr>
+              <a:t>)</a:t>
+            </a:r>
+          </a:p>
+          <a:p>
+            <a:pPr marL="285750" marR="0" lvl="0" indent="-285750" algn="l" defTabSz="1088776" rtl="0" eaLnBrk="1" fontAlgn="auto" latinLnBrk="0" hangingPunct="1">
+              <a:lnSpc>
+                <a:spcPct val="100000"/>
+              </a:lnSpc>
+              <a:spcBef>
+                <a:spcPts val="0"/>
+              </a:spcBef>
+              <a:spcAft>
+                <a:spcPts val="0"/>
+              </a:spcAft>
+              <a:buClrTx/>
+              <a:buSzTx/>
+              <a:buFontTx/>
+              <a:buChar char="-"/>
+              <a:tabLst/>
+              <a:defRPr/>
+            </a:pPr>
+            <a:r>
+              <a:rPr lang="en-US" dirty="0"/>
+              <a:t> Do the rollback: </a:t>
+            </a:r>
+            <a:r>
+              <a:rPr lang="en-US" dirty="0" err="1"/>
+              <a:t>kubectl</a:t>
+            </a:r>
+            <a:r>
+              <a:rPr lang="en-US" dirty="0"/>
+              <a:t> rollout undo deployment </a:t>
+            </a:r>
+            <a:r>
+              <a:rPr lang="en-US" dirty="0" err="1"/>
+              <a:t>nginx</a:t>
+            </a:r>
+            <a:endParaRPr lang="en-US" dirty="0"/>
           </a:p>
           <a:p>
             <a:pPr marL="285750" indent="-285750">

</xml_diff>

<commit_message>
#190 deprected run generator
</commit_message>
<xml_diff>
--- a/kubernetes/03_labels_and_deployments.pptx
+++ b/kubernetes/03_labels_and_deployments.pptx
@@ -1001,7 +1001,7 @@
             </a:r>
             <a:r>
               <a:rPr lang="en-US" dirty="0"/>
-              <a:t> run” command to create a deployment</a:t>
+              <a:t> create deployment &lt;name&gt; --image=&lt;image&gt;” command to create a deployment (note that “run” generators are deprecated for everything but pods)</a:t>
             </a:r>
           </a:p>
           <a:p>
@@ -19628,15 +19628,7 @@
             </a:r>
             <a:r>
               <a:rPr lang="en-US" dirty="0"/>
-              <a:t>/</a:t>
-            </a:r>
-            <a:r>
-              <a:rPr lang="en-US" dirty="0" err="1"/>
-              <a:t>json</a:t>
-            </a:r>
-            <a:r>
-              <a:rPr lang="en-US" dirty="0"/>
-              <a:t> file or by “</a:t>
+              <a:t>/json file or by “</a:t>
             </a:r>
             <a:r>
               <a:rPr lang="en-US" dirty="0" err="1"/>
@@ -19644,7 +19636,7 @@
             </a:r>
             <a:r>
               <a:rPr lang="en-US" dirty="0"/>
-              <a:t> run &lt;name&gt; --image=&lt;image&gt;</a:t>
+              <a:t> create deployment &lt;name&gt; --image=&lt;image&gt;</a:t>
             </a:r>
           </a:p>
           <a:p>

</xml_diff>